<commit_message>
add adf pipeline concepts
</commit_message>
<xml_diff>
--- a/Architecture/az-databricks-hol-arch.pptx
+++ b/Architecture/az-databricks-hol-arch.pptx
@@ -10,15 +10,16 @@
     <p:sldId id="269" r:id="rId4"/>
     <p:sldId id="258" r:id="rId5"/>
     <p:sldId id="270" r:id="rId6"/>
-    <p:sldId id="261" r:id="rId7"/>
-    <p:sldId id="262" r:id="rId8"/>
-    <p:sldId id="263" r:id="rId9"/>
-    <p:sldId id="264" r:id="rId10"/>
-    <p:sldId id="265" r:id="rId11"/>
-    <p:sldId id="257" r:id="rId12"/>
-    <p:sldId id="259" r:id="rId13"/>
-    <p:sldId id="260" r:id="rId14"/>
-    <p:sldId id="266" r:id="rId15"/>
+    <p:sldId id="271" r:id="rId7"/>
+    <p:sldId id="261" r:id="rId8"/>
+    <p:sldId id="262" r:id="rId9"/>
+    <p:sldId id="263" r:id="rId10"/>
+    <p:sldId id="264" r:id="rId11"/>
+    <p:sldId id="265" r:id="rId12"/>
+    <p:sldId id="257" r:id="rId13"/>
+    <p:sldId id="259" r:id="rId14"/>
+    <p:sldId id="260" r:id="rId15"/>
+    <p:sldId id="266" r:id="rId16"/>
   </p:sldIdLst>
   <p:sldSz cx="12192000" cy="6858000"/>
   <p:notesSz cx="6858000" cy="9144000"/>
@@ -128,7 +129,7 @@
 <file path=ppt/revisionInfo.xml><?xml version="1.0" encoding="utf-8"?>
 <p1510:revInfo xmlns:a="http://schemas.openxmlformats.org/drawingml/2006/main" xmlns:r="http://schemas.openxmlformats.org/officeDocument/2006/relationships" xmlns:p1510="http://schemas.microsoft.com/office/powerpoint/2015/10/main">
   <p1510:revLst>
-    <p1510:client id="{58D268DE-E521-4C39-9951-7DC2A3645C34}" v="120" dt="2018-09-21T07:39:29.147"/>
+    <p1510:client id="{58D268DE-E521-4C39-9951-7DC2A3645C34}" v="125" dt="2018-09-21T07:57:45.369"/>
   </p1510:revLst>
 </p1510:revInfo>
 </file>
@@ -138,7 +139,7 @@
   <pc:docChgLst>
     <pc:chgData name="Hyun Suk Shin (MTC SEATTLE)" userId="066a5242-16bf-4435-a097-69b4e8274bba" providerId="ADAL" clId="{58D268DE-E521-4C39-9951-7DC2A3645C34}"/>
     <pc:docChg chg="undo custSel addSld delSld modSld sldOrd">
-      <pc:chgData name="Hyun Suk Shin (MTC SEATTLE)" userId="066a5242-16bf-4435-a097-69b4e8274bba" providerId="ADAL" clId="{58D268DE-E521-4C39-9951-7DC2A3645C34}" dt="2018-09-21T07:39:45.500" v="852" actId="113"/>
+      <pc:chgData name="Hyun Suk Shin (MTC SEATTLE)" userId="066a5242-16bf-4435-a097-69b4e8274bba" providerId="ADAL" clId="{58D268DE-E521-4C39-9951-7DC2A3645C34}" dt="2018-09-21T07:59:30.916" v="863" actId="108"/>
       <pc:docMkLst>
         <pc:docMk/>
       </pc:docMkLst>
@@ -2973,6 +2974,109 @@
             <pc:docMk/>
             <pc:sldMk cId="228928882" sldId="270"/>
             <ac:cxnSpMk id="33" creationId="{5400DE88-D188-4D1A-92B5-BE5B36AC90AB}"/>
+          </ac:cxnSpMkLst>
+        </pc:cxnChg>
+      </pc:sldChg>
+      <pc:sldChg chg="delSp modSp add">
+        <pc:chgData name="Hyun Suk Shin (MTC SEATTLE)" userId="066a5242-16bf-4435-a097-69b4e8274bba" providerId="ADAL" clId="{58D268DE-E521-4C39-9951-7DC2A3645C34}" dt="2018-09-21T07:59:30.916" v="863" actId="108"/>
+        <pc:sldMkLst>
+          <pc:docMk/>
+          <pc:sldMk cId="1549081979" sldId="271"/>
+        </pc:sldMkLst>
+        <pc:spChg chg="mod">
+          <ac:chgData name="Hyun Suk Shin (MTC SEATTLE)" userId="066a5242-16bf-4435-a097-69b4e8274bba" providerId="ADAL" clId="{58D268DE-E521-4C39-9951-7DC2A3645C34}" dt="2018-09-21T07:58:16.491" v="858" actId="108"/>
+          <ac:spMkLst>
+            <pc:docMk/>
+            <pc:sldMk cId="1549081979" sldId="271"/>
+            <ac:spMk id="11" creationId="{360B7439-512D-4487-8029-50868871269E}"/>
+          </ac:spMkLst>
+        </pc:spChg>
+        <pc:spChg chg="mod">
+          <ac:chgData name="Hyun Suk Shin (MTC SEATTLE)" userId="066a5242-16bf-4435-a097-69b4e8274bba" providerId="ADAL" clId="{58D268DE-E521-4C39-9951-7DC2A3645C34}" dt="2018-09-21T07:58:41.258" v="859" actId="108"/>
+          <ac:spMkLst>
+            <pc:docMk/>
+            <pc:sldMk cId="1549081979" sldId="271"/>
+            <ac:spMk id="12" creationId="{0BAE03A8-4D87-480E-910C-88BB56186E6A}"/>
+          </ac:spMkLst>
+        </pc:spChg>
+        <pc:spChg chg="mod">
+          <ac:chgData name="Hyun Suk Shin (MTC SEATTLE)" userId="066a5242-16bf-4435-a097-69b4e8274bba" providerId="ADAL" clId="{58D268DE-E521-4C39-9951-7DC2A3645C34}" dt="2018-09-21T07:59:01.743" v="860" actId="108"/>
+          <ac:spMkLst>
+            <pc:docMk/>
+            <pc:sldMk cId="1549081979" sldId="271"/>
+            <ac:spMk id="13" creationId="{75589767-2C35-47B8-BEC5-5928FD9B8A26}"/>
+          </ac:spMkLst>
+        </pc:spChg>
+        <pc:spChg chg="mod">
+          <ac:chgData name="Hyun Suk Shin (MTC SEATTLE)" userId="066a5242-16bf-4435-a097-69b4e8274bba" providerId="ADAL" clId="{58D268DE-E521-4C39-9951-7DC2A3645C34}" dt="2018-09-21T07:59:25.217" v="862" actId="108"/>
+          <ac:spMkLst>
+            <pc:docMk/>
+            <pc:sldMk cId="1549081979" sldId="271"/>
+            <ac:spMk id="14" creationId="{6597E4FB-2DD0-4046-96B1-FB0642D1CAC4}"/>
+          </ac:spMkLst>
+        </pc:spChg>
+        <pc:spChg chg="mod">
+          <ac:chgData name="Hyun Suk Shin (MTC SEATTLE)" userId="066a5242-16bf-4435-a097-69b4e8274bba" providerId="ADAL" clId="{58D268DE-E521-4C39-9951-7DC2A3645C34}" dt="2018-09-21T07:59:30.916" v="863" actId="108"/>
+          <ac:spMkLst>
+            <pc:docMk/>
+            <pc:sldMk cId="1549081979" sldId="271"/>
+            <ac:spMk id="15" creationId="{15002FC6-8CBF-40B9-BE48-7276765EAC7B}"/>
+          </ac:spMkLst>
+        </pc:spChg>
+        <pc:spChg chg="mod">
+          <ac:chgData name="Hyun Suk Shin (MTC SEATTLE)" userId="066a5242-16bf-4435-a097-69b4e8274bba" providerId="ADAL" clId="{58D268DE-E521-4C39-9951-7DC2A3645C34}" dt="2018-09-21T07:57:19.805" v="855" actId="207"/>
+          <ac:spMkLst>
+            <pc:docMk/>
+            <pc:sldMk cId="1549081979" sldId="271"/>
+            <ac:spMk id="44" creationId="{5CBD0CBD-32A1-4178-9030-43A194809507}"/>
+          </ac:spMkLst>
+        </pc:spChg>
+        <pc:spChg chg="mod">
+          <ac:chgData name="Hyun Suk Shin (MTC SEATTLE)" userId="066a5242-16bf-4435-a097-69b4e8274bba" providerId="ADAL" clId="{58D268DE-E521-4C39-9951-7DC2A3645C34}" dt="2018-09-21T07:57:19.805" v="855" actId="207"/>
+          <ac:spMkLst>
+            <pc:docMk/>
+            <pc:sldMk cId="1549081979" sldId="271"/>
+            <ac:spMk id="45" creationId="{C60E1BCF-77DF-43C4-92C3-3ECFD6A30CFF}"/>
+          </ac:spMkLst>
+        </pc:spChg>
+        <pc:spChg chg="mod">
+          <ac:chgData name="Hyun Suk Shin (MTC SEATTLE)" userId="066a5242-16bf-4435-a097-69b4e8274bba" providerId="ADAL" clId="{58D268DE-E521-4C39-9951-7DC2A3645C34}" dt="2018-09-21T07:57:19.805" v="855" actId="207"/>
+          <ac:spMkLst>
+            <pc:docMk/>
+            <pc:sldMk cId="1549081979" sldId="271"/>
+            <ac:spMk id="46" creationId="{D9CD7322-C34E-43BA-B5E6-83793EDD9EC3}"/>
+          </ac:spMkLst>
+        </pc:spChg>
+        <pc:picChg chg="del">
+          <ac:chgData name="Hyun Suk Shin (MTC SEATTLE)" userId="066a5242-16bf-4435-a097-69b4e8274bba" providerId="ADAL" clId="{58D268DE-E521-4C39-9951-7DC2A3645C34}" dt="2018-09-21T07:56:56.074" v="854" actId="478"/>
+          <ac:picMkLst>
+            <pc:docMk/>
+            <pc:sldMk cId="1549081979" sldId="271"/>
+            <ac:picMk id="1026" creationId="{89CE6503-7548-42A0-B6D8-91033D5DA8D7}"/>
+          </ac:picMkLst>
+        </pc:picChg>
+        <pc:cxnChg chg="mod">
+          <ac:chgData name="Hyun Suk Shin (MTC SEATTLE)" userId="066a5242-16bf-4435-a097-69b4e8274bba" providerId="ADAL" clId="{58D268DE-E521-4C39-9951-7DC2A3645C34}" dt="2018-09-21T07:57:19.805" v="855" actId="207"/>
+          <ac:cxnSpMkLst>
+            <pc:docMk/>
+            <pc:sldMk cId="1549081979" sldId="271"/>
+            <ac:cxnSpMk id="16" creationId="{0D0986D4-9AD0-454E-954B-F84D8690D873}"/>
+          </ac:cxnSpMkLst>
+        </pc:cxnChg>
+        <pc:cxnChg chg="mod">
+          <ac:chgData name="Hyun Suk Shin (MTC SEATTLE)" userId="066a5242-16bf-4435-a097-69b4e8274bba" providerId="ADAL" clId="{58D268DE-E521-4C39-9951-7DC2A3645C34}" dt="2018-09-21T07:57:19.805" v="855" actId="207"/>
+          <ac:cxnSpMkLst>
+            <pc:docMk/>
+            <pc:sldMk cId="1549081979" sldId="271"/>
+            <ac:cxnSpMk id="18" creationId="{D7E4D646-020F-4D8B-A079-9F6752CD4C8F}"/>
+          </ac:cxnSpMkLst>
+        </pc:cxnChg>
+        <pc:cxnChg chg="mod">
+          <ac:chgData name="Hyun Suk Shin (MTC SEATTLE)" userId="066a5242-16bf-4435-a097-69b4e8274bba" providerId="ADAL" clId="{58D268DE-E521-4C39-9951-7DC2A3645C34}" dt="2018-09-21T07:57:19.805" v="855" actId="207"/>
+          <ac:cxnSpMkLst>
+            <pc:docMk/>
+            <pc:sldMk cId="1549081979" sldId="271"/>
+            <ac:cxnSpMk id="21" creationId="{A2A86E57-DB5C-4D5E-8EB4-5A76EC301D39}"/>
           </ac:cxnSpMkLst>
         </pc:cxnChg>
       </pc:sldChg>
@@ -5078,6 +5182,1869 @@
           <p:cNvPr id="2" name="Title 1">
             <a:extLst>
               <a:ext uri="{FF2B5EF4-FFF2-40B4-BE49-F238E27FC236}">
+                <a16:creationId xmlns:a16="http://schemas.microsoft.com/office/drawing/2014/main" id="{EB121C98-1EA4-4ACE-8817-B3D6E75BCB48}"/>
+              </a:ext>
+            </a:extLst>
+          </p:cNvPr>
+          <p:cNvSpPr>
+            <a:spLocks noGrp="1"/>
+          </p:cNvSpPr>
+          <p:nvPr>
+            <p:ph type="title"/>
+          </p:nvPr>
+        </p:nvSpPr>
+        <p:spPr/>
+        <p:txBody>
+          <a:bodyPr/>
+          <a:lstStyle/>
+          <a:p>
+            <a:r>
+              <a:rPr lang="en-US" dirty="0"/>
+              <a:t>5. Run ML in a Batch</a:t>
+            </a:r>
+          </a:p>
+        </p:txBody>
+      </p:sp>
+      <p:sp>
+        <p:nvSpPr>
+          <p:cNvPr id="4" name="Text Placeholder 3">
+            <a:extLst>
+              <a:ext uri="{FF2B5EF4-FFF2-40B4-BE49-F238E27FC236}">
+                <a16:creationId xmlns:a16="http://schemas.microsoft.com/office/drawing/2014/main" id="{506E42F2-0333-4672-B9B3-41D33D2DC1BD}"/>
+              </a:ext>
+            </a:extLst>
+          </p:cNvPr>
+          <p:cNvSpPr>
+            <a:spLocks noGrp="1"/>
+          </p:cNvSpPr>
+          <p:nvPr>
+            <p:ph type="body" sz="quarter" idx="10"/>
+          </p:nvPr>
+        </p:nvSpPr>
+        <p:spPr/>
+        <p:txBody>
+          <a:bodyPr/>
+          <a:lstStyle/>
+          <a:p>
+            <a:endParaRPr lang="en-US"/>
+          </a:p>
+        </p:txBody>
+      </p:sp>
+      <p:sp>
+        <p:nvSpPr>
+          <p:cNvPr id="5" name="TextBox 4">
+            <a:extLst>
+              <a:ext uri="{FF2B5EF4-FFF2-40B4-BE49-F238E27FC236}">
+                <a16:creationId xmlns:a16="http://schemas.microsoft.com/office/drawing/2014/main" id="{901A374F-E220-4BE3-BBB0-4A8099C4815D}"/>
+              </a:ext>
+            </a:extLst>
+          </p:cNvPr>
+          <p:cNvSpPr txBox="1"/>
+          <p:nvPr/>
+        </p:nvSpPr>
+        <p:spPr>
+          <a:xfrm>
+            <a:off x="666841" y="2999758"/>
+            <a:ext cx="967418" cy="253916"/>
+          </a:xfrm>
+          <a:prstGeom prst="rect">
+            <a:avLst/>
+          </a:prstGeom>
+          <a:noFill/>
+        </p:spPr>
+        <p:txBody>
+          <a:bodyPr wrap="square" lIns="91440" tIns="45720" rIns="91440" bIns="45720" rtlCol="0">
+            <a:spAutoFit/>
+          </a:bodyPr>
+          <a:lstStyle/>
+          <a:p>
+            <a:pPr marL="0" marR="0" lvl="0" indent="0" algn="ctr" defTabSz="932597" rtl="0" eaLnBrk="1" fontAlgn="auto" latinLnBrk="0" hangingPunct="1">
+              <a:lnSpc>
+                <a:spcPct val="100000"/>
+              </a:lnSpc>
+              <a:spcBef>
+                <a:spcPts val="0"/>
+              </a:spcBef>
+              <a:spcAft>
+                <a:spcPts val="0"/>
+              </a:spcAft>
+              <a:buClrTx/>
+              <a:buSzTx/>
+              <a:buFontTx/>
+              <a:buNone/>
+              <a:tabLst/>
+              <a:defRPr/>
+            </a:pPr>
+            <a:r>
+              <a:rPr kumimoji="0" lang="en-US" sz="1050" b="0" i="0" u="none" strike="noStrike" kern="0" cap="none" spc="0" normalizeH="0" baseline="0" noProof="0" dirty="0">
+                <a:ln>
+                  <a:noFill/>
+                </a:ln>
+                <a:solidFill>
+                  <a:srgbClr val="505050"/>
+                </a:solidFill>
+                <a:effectLst/>
+                <a:uLnTx/>
+                <a:uFillTx/>
+                <a:latin typeface="Segoe UI Semibold" panose="020B0702040204020203" pitchFamily="34" charset="0"/>
+                <a:ea typeface="+mn-ea"/>
+                <a:cs typeface="Segoe UI Semibold" panose="020B0702040204020203" pitchFamily="34" charset="0"/>
+              </a:rPr>
+              <a:t>Web Service</a:t>
+            </a:r>
+          </a:p>
+        </p:txBody>
+      </p:sp>
+      <p:pic>
+        <p:nvPicPr>
+          <p:cNvPr id="6" name="Content Placeholder 11">
+            <a:extLst>
+              <a:ext uri="{FF2B5EF4-FFF2-40B4-BE49-F238E27FC236}">
+                <a16:creationId xmlns:a16="http://schemas.microsoft.com/office/drawing/2014/main" id="{E273149E-4D55-4B42-B3DA-113E868679CA}"/>
+              </a:ext>
+            </a:extLst>
+          </p:cNvPr>
+          <p:cNvPicPr>
+            <a:picLocks noChangeAspect="1"/>
+          </p:cNvPicPr>
+          <p:nvPr/>
+        </p:nvPicPr>
+        <p:blipFill>
+          <a:blip r:embed="rId2">
+            <a:extLst>
+              <a:ext uri="{28A0092B-C50C-407E-A947-70E740481C1C}">
+                <a14:useLocalDpi xmlns:a14="http://schemas.microsoft.com/office/drawing/2010/main" val="0"/>
+              </a:ext>
+            </a:extLst>
+          </a:blip>
+          <a:stretch>
+            <a:fillRect/>
+          </a:stretch>
+        </p:blipFill>
+        <p:spPr>
+          <a:xfrm>
+            <a:off x="760405" y="2125839"/>
+            <a:ext cx="780290" cy="780290"/>
+          </a:xfrm>
+          <a:prstGeom prst="rect">
+            <a:avLst/>
+          </a:prstGeom>
+        </p:spPr>
+      </p:pic>
+      <p:sp>
+        <p:nvSpPr>
+          <p:cNvPr id="7" name="Rectangle 6">
+            <a:extLst>
+              <a:ext uri="{FF2B5EF4-FFF2-40B4-BE49-F238E27FC236}">
+                <a16:creationId xmlns:a16="http://schemas.microsoft.com/office/drawing/2014/main" id="{FCA18B42-CFA3-428D-BD8B-8447A88B824B}"/>
+              </a:ext>
+            </a:extLst>
+          </p:cNvPr>
+          <p:cNvSpPr/>
+          <p:nvPr/>
+        </p:nvSpPr>
+        <p:spPr bwMode="auto">
+          <a:xfrm>
+            <a:off x="2008282" y="1312066"/>
+            <a:ext cx="8175437" cy="4023555"/>
+          </a:xfrm>
+          <a:prstGeom prst="rect">
+            <a:avLst/>
+          </a:prstGeom>
+          <a:noFill/>
+          <a:ln w="12700">
+            <a:solidFill>
+              <a:schemeClr val="tx2"/>
+            </a:solidFill>
+            <a:headEnd type="none" w="med" len="med"/>
+            <a:tailEnd type="none" w="med" len="med"/>
+          </a:ln>
+          <a:effectLst/>
+        </p:spPr>
+        <p:style>
+          <a:lnRef idx="1">
+            <a:schemeClr val="accent2"/>
+          </a:lnRef>
+          <a:fillRef idx="3">
+            <a:schemeClr val="accent2"/>
+          </a:fillRef>
+          <a:effectRef idx="2">
+            <a:schemeClr val="accent2"/>
+          </a:effectRef>
+          <a:fontRef idx="minor">
+            <a:schemeClr val="lt1"/>
+          </a:fontRef>
+        </p:style>
+        <p:txBody>
+          <a:bodyPr rot="0" spcFirstLastPara="0" vertOverflow="overflow" horzOverflow="overflow" vert="horz" wrap="square" lIns="182880" tIns="146304" rIns="182880" bIns="146304" numCol="1" spcCol="0" rtlCol="0" fromWordArt="0" anchor="t" anchorCtr="0" forceAA="0" compatLnSpc="1">
+            <a:prstTxWarp prst="textNoShape">
+              <a:avLst/>
+            </a:prstTxWarp>
+            <a:noAutofit/>
+          </a:bodyPr>
+          <a:lstStyle/>
+          <a:p>
+            <a:pPr marL="0" marR="0" lvl="0" indent="0" algn="ctr" defTabSz="932472" rtl="0" eaLnBrk="1" fontAlgn="base" latinLnBrk="0" hangingPunct="1">
+              <a:lnSpc>
+                <a:spcPct val="90000"/>
+              </a:lnSpc>
+              <a:spcBef>
+                <a:spcPct val="0"/>
+              </a:spcBef>
+              <a:spcAft>
+                <a:spcPct val="0"/>
+              </a:spcAft>
+              <a:buClrTx/>
+              <a:buSzTx/>
+              <a:buFontTx/>
+              <a:buNone/>
+              <a:tabLst/>
+              <a:defRPr/>
+            </a:pPr>
+            <a:endParaRPr kumimoji="0" lang="en-US" sz="2400" b="0" i="0" u="none" strike="noStrike" kern="1200" cap="none" spc="0" normalizeH="0" baseline="0" noProof="0" dirty="0">
+              <a:ln>
+                <a:noFill/>
+              </a:ln>
+              <a:gradFill>
+                <a:gsLst>
+                  <a:gs pos="0">
+                    <a:srgbClr val="FFFFFF"/>
+                  </a:gs>
+                  <a:gs pos="100000">
+                    <a:srgbClr val="FFFFFF"/>
+                  </a:gs>
+                </a:gsLst>
+                <a:lin ang="5400000" scaled="0"/>
+              </a:gradFill>
+              <a:effectLst/>
+              <a:uLnTx/>
+              <a:uFillTx/>
+              <a:latin typeface="Segoe UI"/>
+              <a:ea typeface="Segoe UI" pitchFamily="34" charset="0"/>
+              <a:cs typeface="Segoe UI" pitchFamily="34" charset="0"/>
+            </a:endParaRPr>
+          </a:p>
+        </p:txBody>
+      </p:sp>
+      <p:sp>
+        <p:nvSpPr>
+          <p:cNvPr id="8" name="Rectangle 7">
+            <a:extLst>
+              <a:ext uri="{FF2B5EF4-FFF2-40B4-BE49-F238E27FC236}">
+                <a16:creationId xmlns:a16="http://schemas.microsoft.com/office/drawing/2014/main" id="{B5C8E2AE-611C-4FAE-8AE6-F23DD936E05A}"/>
+              </a:ext>
+            </a:extLst>
+          </p:cNvPr>
+          <p:cNvSpPr/>
+          <p:nvPr/>
+        </p:nvSpPr>
+        <p:spPr bwMode="auto">
+          <a:xfrm>
+            <a:off x="8430647" y="1514811"/>
+            <a:ext cx="1432897" cy="307777"/>
+          </a:xfrm>
+          <a:prstGeom prst="rect">
+            <a:avLst/>
+          </a:prstGeom>
+          <a:noFill/>
+          <a:ln w="3175">
+            <a:noFill/>
+          </a:ln>
+        </p:spPr>
+        <p:style>
+          <a:lnRef idx="0">
+            <a:scrgbClr r="0" g="0" b="0"/>
+          </a:lnRef>
+          <a:fillRef idx="0">
+            <a:scrgbClr r="0" g="0" b="0"/>
+          </a:fillRef>
+          <a:effectRef idx="0">
+            <a:scrgbClr r="0" g="0" b="0"/>
+          </a:effectRef>
+          <a:fontRef idx="minor">
+            <a:schemeClr val="lt1"/>
+          </a:fontRef>
+        </p:style>
+        <p:txBody>
+          <a:bodyPr spcFirstLastPara="0" vert="horz" wrap="square" lIns="91440" tIns="45720" rIns="91440" bIns="45720" numCol="1" spcCol="1270" anchor="t" anchorCtr="0">
+            <a:spAutoFit/>
+          </a:bodyPr>
+          <a:lstStyle/>
+          <a:p>
+            <a:pPr marL="0" marR="0" lvl="0" indent="0" algn="ctr" defTabSz="710593" rtl="0" eaLnBrk="1" fontAlgn="auto" latinLnBrk="0" hangingPunct="1">
+              <a:lnSpc>
+                <a:spcPct val="100000"/>
+              </a:lnSpc>
+              <a:spcBef>
+                <a:spcPct val="0"/>
+              </a:spcBef>
+              <a:spcAft>
+                <a:spcPct val="35000"/>
+              </a:spcAft>
+              <a:buClrTx/>
+              <a:buSzTx/>
+              <a:buFontTx/>
+              <a:buNone/>
+              <a:tabLst/>
+              <a:defRPr/>
+            </a:pPr>
+            <a:r>
+              <a:rPr kumimoji="0" lang="en-US" sz="1400" b="0" i="0" u="none" strike="noStrike" kern="0" cap="none" spc="0" normalizeH="0" baseline="0" noProof="0" dirty="0">
+                <a:ln>
+                  <a:noFill/>
+                </a:ln>
+                <a:solidFill>
+                  <a:srgbClr val="0078D7"/>
+                </a:solidFill>
+                <a:effectLst/>
+                <a:uLnTx/>
+                <a:uFillTx/>
+                <a:latin typeface="Segoe UI Semibold" panose="020B0702040204020203" pitchFamily="34" charset="0"/>
+                <a:ea typeface="+mn-ea"/>
+                <a:cs typeface="Segoe UI Semibold" panose="020B0702040204020203" pitchFamily="34" charset="0"/>
+              </a:rPr>
+              <a:t>Model &amp; Serve</a:t>
+            </a:r>
+          </a:p>
+        </p:txBody>
+      </p:sp>
+      <p:sp>
+        <p:nvSpPr>
+          <p:cNvPr id="9" name="Rectangle 8">
+            <a:extLst>
+              <a:ext uri="{FF2B5EF4-FFF2-40B4-BE49-F238E27FC236}">
+                <a16:creationId xmlns:a16="http://schemas.microsoft.com/office/drawing/2014/main" id="{32C056B2-DAC0-4210-899A-0DD3FE71DBFF}"/>
+              </a:ext>
+            </a:extLst>
+          </p:cNvPr>
+          <p:cNvSpPr/>
+          <p:nvPr/>
+        </p:nvSpPr>
+        <p:spPr bwMode="auto">
+          <a:xfrm>
+            <a:off x="6423624" y="1514811"/>
+            <a:ext cx="1377453" cy="307777"/>
+          </a:xfrm>
+          <a:prstGeom prst="rect">
+            <a:avLst/>
+          </a:prstGeom>
+          <a:noFill/>
+          <a:ln w="3175">
+            <a:noFill/>
+          </a:ln>
+        </p:spPr>
+        <p:style>
+          <a:lnRef idx="0">
+            <a:scrgbClr r="0" g="0" b="0"/>
+          </a:lnRef>
+          <a:fillRef idx="0">
+            <a:scrgbClr r="0" g="0" b="0"/>
+          </a:fillRef>
+          <a:effectRef idx="0">
+            <a:scrgbClr r="0" g="0" b="0"/>
+          </a:effectRef>
+          <a:fontRef idx="minor">
+            <a:schemeClr val="lt1"/>
+          </a:fontRef>
+        </p:style>
+        <p:txBody>
+          <a:bodyPr spcFirstLastPara="0" vert="horz" wrap="square" lIns="91440" tIns="45720" rIns="91440" bIns="45720" numCol="1" spcCol="1270" anchor="t" anchorCtr="0">
+            <a:spAutoFit/>
+          </a:bodyPr>
+          <a:lstStyle/>
+          <a:p>
+            <a:pPr marL="0" marR="0" lvl="0" indent="0" algn="ctr" defTabSz="710593" rtl="0" eaLnBrk="1" fontAlgn="auto" latinLnBrk="0" hangingPunct="1">
+              <a:lnSpc>
+                <a:spcPct val="100000"/>
+              </a:lnSpc>
+              <a:spcBef>
+                <a:spcPct val="0"/>
+              </a:spcBef>
+              <a:spcAft>
+                <a:spcPct val="35000"/>
+              </a:spcAft>
+              <a:buClrTx/>
+              <a:buSzTx/>
+              <a:buFontTx/>
+              <a:buNone/>
+              <a:tabLst/>
+              <a:defRPr/>
+            </a:pPr>
+            <a:r>
+              <a:rPr kumimoji="0" lang="en-US" sz="1400" b="0" i="0" u="none" strike="noStrike" kern="0" cap="none" spc="0" normalizeH="0" baseline="0" noProof="0" dirty="0">
+                <a:ln>
+                  <a:noFill/>
+                </a:ln>
+                <a:solidFill>
+                  <a:srgbClr val="0078D7"/>
+                </a:solidFill>
+                <a:effectLst/>
+                <a:uLnTx/>
+                <a:uFillTx/>
+                <a:latin typeface="Segoe UI Semibold" panose="020B0702040204020203" pitchFamily="34" charset="0"/>
+                <a:ea typeface="+mn-ea"/>
+                <a:cs typeface="Segoe UI Semibold" panose="020B0702040204020203" pitchFamily="34" charset="0"/>
+              </a:rPr>
+              <a:t>Prep &amp; Train</a:t>
+            </a:r>
+          </a:p>
+        </p:txBody>
+      </p:sp>
+      <p:sp>
+        <p:nvSpPr>
+          <p:cNvPr id="10" name="Rectangle 9">
+            <a:extLst>
+              <a:ext uri="{FF2B5EF4-FFF2-40B4-BE49-F238E27FC236}">
+                <a16:creationId xmlns:a16="http://schemas.microsoft.com/office/drawing/2014/main" id="{D77565BA-EC05-4935-B6C0-36E19D7A0AE5}"/>
+              </a:ext>
+            </a:extLst>
+          </p:cNvPr>
+          <p:cNvSpPr/>
+          <p:nvPr/>
+        </p:nvSpPr>
+        <p:spPr bwMode="auto">
+          <a:xfrm>
+            <a:off x="4379443" y="1514811"/>
+            <a:ext cx="1392554" cy="307777"/>
+          </a:xfrm>
+          <a:prstGeom prst="rect">
+            <a:avLst/>
+          </a:prstGeom>
+          <a:noFill/>
+          <a:ln w="3175">
+            <a:noFill/>
+          </a:ln>
+        </p:spPr>
+        <p:style>
+          <a:lnRef idx="0">
+            <a:scrgbClr r="0" g="0" b="0"/>
+          </a:lnRef>
+          <a:fillRef idx="0">
+            <a:scrgbClr r="0" g="0" b="0"/>
+          </a:fillRef>
+          <a:effectRef idx="0">
+            <a:scrgbClr r="0" g="0" b="0"/>
+          </a:effectRef>
+          <a:fontRef idx="minor">
+            <a:schemeClr val="lt1"/>
+          </a:fontRef>
+        </p:style>
+        <p:txBody>
+          <a:bodyPr spcFirstLastPara="0" vert="horz" wrap="square" lIns="91440" tIns="45720" rIns="91440" bIns="45720" numCol="1" spcCol="1270" anchor="t" anchorCtr="0">
+            <a:spAutoFit/>
+          </a:bodyPr>
+          <a:lstStyle/>
+          <a:p>
+            <a:pPr marL="0" marR="0" lvl="0" indent="0" algn="ctr" defTabSz="522599" rtl="0" eaLnBrk="1" fontAlgn="auto" latinLnBrk="0" hangingPunct="1">
+              <a:lnSpc>
+                <a:spcPct val="100000"/>
+              </a:lnSpc>
+              <a:spcBef>
+                <a:spcPct val="0"/>
+              </a:spcBef>
+              <a:spcAft>
+                <a:spcPct val="35000"/>
+              </a:spcAft>
+              <a:buClrTx/>
+              <a:buSzTx/>
+              <a:buFontTx/>
+              <a:buNone/>
+              <a:tabLst/>
+              <a:defRPr/>
+            </a:pPr>
+            <a:r>
+              <a:rPr kumimoji="0" lang="en-US" sz="1400" b="0" i="0" u="none" strike="noStrike" kern="0" cap="none" spc="0" normalizeH="0" baseline="0" noProof="0" dirty="0">
+                <a:ln>
+                  <a:noFill/>
+                </a:ln>
+                <a:solidFill>
+                  <a:srgbClr val="0078D7"/>
+                </a:solidFill>
+                <a:effectLst/>
+                <a:uLnTx/>
+                <a:uFillTx/>
+                <a:latin typeface="Segoe UI Semibold" panose="020B0702040204020203" pitchFamily="34" charset="0"/>
+                <a:ea typeface="+mn-ea"/>
+                <a:cs typeface="Segoe UI Semibold" panose="020B0702040204020203" pitchFamily="34" charset="0"/>
+              </a:rPr>
+              <a:t>Store</a:t>
+            </a:r>
+          </a:p>
+        </p:txBody>
+      </p:sp>
+      <p:sp>
+        <p:nvSpPr>
+          <p:cNvPr id="11" name="Rectangle 10">
+            <a:extLst>
+              <a:ext uri="{FF2B5EF4-FFF2-40B4-BE49-F238E27FC236}">
+                <a16:creationId xmlns:a16="http://schemas.microsoft.com/office/drawing/2014/main" id="{B24C8F5C-B2B7-48E0-9030-A0732434489D}"/>
+              </a:ext>
+            </a:extLst>
+          </p:cNvPr>
+          <p:cNvSpPr/>
+          <p:nvPr/>
+        </p:nvSpPr>
+        <p:spPr bwMode="auto">
+          <a:xfrm>
+            <a:off x="2423926" y="1514811"/>
+            <a:ext cx="1384695" cy="307777"/>
+          </a:xfrm>
+          <a:prstGeom prst="rect">
+            <a:avLst/>
+          </a:prstGeom>
+          <a:noFill/>
+          <a:ln w="3175">
+            <a:noFill/>
+          </a:ln>
+        </p:spPr>
+        <p:style>
+          <a:lnRef idx="0">
+            <a:scrgbClr r="0" g="0" b="0"/>
+          </a:lnRef>
+          <a:fillRef idx="0">
+            <a:scrgbClr r="0" g="0" b="0"/>
+          </a:fillRef>
+          <a:effectRef idx="0">
+            <a:scrgbClr r="0" g="0" b="0"/>
+          </a:effectRef>
+          <a:fontRef idx="minor">
+            <a:schemeClr val="lt1"/>
+          </a:fontRef>
+        </p:style>
+        <p:txBody>
+          <a:bodyPr spcFirstLastPara="0" vert="horz" wrap="square" lIns="91440" tIns="45720" rIns="91440" bIns="45720" numCol="1" spcCol="1270" anchor="t" anchorCtr="0">
+            <a:spAutoFit/>
+          </a:bodyPr>
+          <a:lstStyle/>
+          <a:p>
+            <a:pPr marL="0" marR="0" lvl="0" indent="0" algn="ctr" defTabSz="710593" rtl="0" eaLnBrk="1" fontAlgn="auto" latinLnBrk="0" hangingPunct="1">
+              <a:lnSpc>
+                <a:spcPct val="100000"/>
+              </a:lnSpc>
+              <a:spcBef>
+                <a:spcPct val="0"/>
+              </a:spcBef>
+              <a:spcAft>
+                <a:spcPct val="35000"/>
+              </a:spcAft>
+              <a:buClrTx/>
+              <a:buSzTx/>
+              <a:buFontTx/>
+              <a:buNone/>
+              <a:tabLst/>
+              <a:defRPr/>
+            </a:pPr>
+            <a:r>
+              <a:rPr kumimoji="0" lang="en-US" sz="1400" b="0" i="0" u="none" strike="noStrike" kern="0" cap="none" spc="0" normalizeH="0" baseline="0" noProof="0" dirty="0">
+                <a:ln>
+                  <a:noFill/>
+                </a:ln>
+                <a:solidFill>
+                  <a:srgbClr val="0078D7"/>
+                </a:solidFill>
+                <a:effectLst/>
+                <a:uLnTx/>
+                <a:uFillTx/>
+                <a:latin typeface="Segoe UI Semibold" panose="020B0702040204020203" pitchFamily="34" charset="0"/>
+                <a:ea typeface="+mn-ea"/>
+                <a:cs typeface="Segoe UI Semibold" panose="020B0702040204020203" pitchFamily="34" charset="0"/>
+              </a:rPr>
+              <a:t>Ingest</a:t>
+            </a:r>
+          </a:p>
+        </p:txBody>
+      </p:sp>
+      <p:sp>
+        <p:nvSpPr>
+          <p:cNvPr id="12" name="Rectangle 11">
+            <a:extLst>
+              <a:ext uri="{FF2B5EF4-FFF2-40B4-BE49-F238E27FC236}">
+                <a16:creationId xmlns:a16="http://schemas.microsoft.com/office/drawing/2014/main" id="{A360B252-EED7-4404-AA98-E617E10595BE}"/>
+              </a:ext>
+            </a:extLst>
+          </p:cNvPr>
+          <p:cNvSpPr/>
+          <p:nvPr/>
+        </p:nvSpPr>
+        <p:spPr>
+          <a:xfrm>
+            <a:off x="8520015" y="2977512"/>
+            <a:ext cx="1163884" cy="253916"/>
+          </a:xfrm>
+          <a:prstGeom prst="rect">
+            <a:avLst/>
+          </a:prstGeom>
+        </p:spPr>
+        <p:txBody>
+          <a:bodyPr wrap="square">
+            <a:spAutoFit/>
+          </a:bodyPr>
+          <a:lstStyle/>
+          <a:p>
+            <a:pPr marL="0" marR="0" lvl="0" indent="0" algn="ctr" defTabSz="932597" rtl="0" eaLnBrk="1" fontAlgn="auto" latinLnBrk="0" hangingPunct="1">
+              <a:lnSpc>
+                <a:spcPct val="100000"/>
+              </a:lnSpc>
+              <a:spcBef>
+                <a:spcPts val="0"/>
+              </a:spcBef>
+              <a:spcAft>
+                <a:spcPts val="0"/>
+              </a:spcAft>
+              <a:buClrTx/>
+              <a:buSzTx/>
+              <a:buFontTx/>
+              <a:buNone/>
+              <a:tabLst/>
+              <a:defRPr/>
+            </a:pPr>
+            <a:r>
+              <a:rPr kumimoji="0" lang="en-US" sz="1050" b="0" i="0" u="none" strike="noStrike" kern="0" cap="none" spc="0" normalizeH="0" baseline="0" noProof="0" dirty="0">
+                <a:ln>
+                  <a:noFill/>
+                </a:ln>
+                <a:solidFill>
+                  <a:srgbClr val="505050"/>
+                </a:solidFill>
+                <a:effectLst/>
+                <a:uLnTx/>
+                <a:uFillTx/>
+                <a:latin typeface="Segoe UI Semibold" panose="020B0702040204020203" pitchFamily="34" charset="0"/>
+                <a:ea typeface="+mn-ea"/>
+                <a:cs typeface="Segoe UI Semibold" panose="020B0702040204020203" pitchFamily="34" charset="0"/>
+              </a:rPr>
+              <a:t>SQL Database</a:t>
+            </a:r>
+          </a:p>
+        </p:txBody>
+      </p:sp>
+      <p:grpSp>
+        <p:nvGrpSpPr>
+          <p:cNvPr id="13" name="Group 12">
+            <a:extLst>
+              <a:ext uri="{FF2B5EF4-FFF2-40B4-BE49-F238E27FC236}">
+                <a16:creationId xmlns:a16="http://schemas.microsoft.com/office/drawing/2014/main" id="{1C708A3A-98BD-4861-9850-34C936D435FB}"/>
+              </a:ext>
+            </a:extLst>
+          </p:cNvPr>
+          <p:cNvGrpSpPr/>
+          <p:nvPr/>
+        </p:nvGrpSpPr>
+        <p:grpSpPr>
+          <a:xfrm>
+            <a:off x="4651477" y="2235826"/>
+            <a:ext cx="860592" cy="995602"/>
+            <a:chOff x="4064302" y="3325697"/>
+            <a:chExt cx="860592" cy="995602"/>
+          </a:xfrm>
+        </p:grpSpPr>
+        <p:sp>
+          <p:nvSpPr>
+            <p:cNvPr id="14" name="Rectangle 13">
+              <a:extLst>
+                <a:ext uri="{FF2B5EF4-FFF2-40B4-BE49-F238E27FC236}">
+                  <a16:creationId xmlns:a16="http://schemas.microsoft.com/office/drawing/2014/main" id="{F737F1F3-6511-47AF-A419-7D7EF81A4A4C}"/>
+                </a:ext>
+              </a:extLst>
+            </p:cNvPr>
+            <p:cNvSpPr/>
+            <p:nvPr/>
+          </p:nvSpPr>
+          <p:spPr>
+            <a:xfrm>
+              <a:off x="4064302" y="4067383"/>
+              <a:ext cx="860592" cy="253916"/>
+            </a:xfrm>
+            <a:prstGeom prst="rect">
+              <a:avLst/>
+            </a:prstGeom>
+          </p:spPr>
+          <p:txBody>
+            <a:bodyPr wrap="square">
+              <a:spAutoFit/>
+            </a:bodyPr>
+            <a:lstStyle/>
+            <a:p>
+              <a:pPr marL="0" marR="0" lvl="0" indent="0" algn="ctr" defTabSz="914400" rtl="0" eaLnBrk="1" fontAlgn="auto" latinLnBrk="0" hangingPunct="1">
+                <a:lnSpc>
+                  <a:spcPct val="100000"/>
+                </a:lnSpc>
+                <a:spcBef>
+                  <a:spcPts val="0"/>
+                </a:spcBef>
+                <a:spcAft>
+                  <a:spcPts val="0"/>
+                </a:spcAft>
+                <a:buClrTx/>
+                <a:buSzTx/>
+                <a:buFontTx/>
+                <a:buNone/>
+                <a:tabLst/>
+                <a:defRPr/>
+              </a:pPr>
+              <a:r>
+                <a:rPr kumimoji="0" lang="en-US" sz="1050" b="0" i="0" u="none" strike="noStrike" kern="0" cap="none" spc="0" normalizeH="0" baseline="0" noProof="0" dirty="0">
+                  <a:ln>
+                    <a:noFill/>
+                  </a:ln>
+                  <a:solidFill>
+                    <a:srgbClr val="505050"/>
+                  </a:solidFill>
+                  <a:effectLst/>
+                  <a:uLnTx/>
+                  <a:uFillTx/>
+                  <a:latin typeface="Segoe UI Semibold" panose="020B0702040204020203" pitchFamily="34" charset="0"/>
+                  <a:ea typeface="+mn-ea"/>
+                  <a:cs typeface="Segoe UI Semibold" panose="020B0702040204020203" pitchFamily="34" charset="0"/>
+                </a:rPr>
+                <a:t>Blobs</a:t>
+              </a:r>
+            </a:p>
+          </p:txBody>
+        </p:sp>
+        <p:pic>
+          <p:nvPicPr>
+            <p:cNvPr id="15" name="Picture 14" descr="A stop sign&#10;&#10;Description generated with high confidence">
+              <a:extLst>
+                <a:ext uri="{FF2B5EF4-FFF2-40B4-BE49-F238E27FC236}">
+                  <a16:creationId xmlns:a16="http://schemas.microsoft.com/office/drawing/2014/main" id="{9A9E1EE2-BCFA-4DB1-939B-0B666176D145}"/>
+                </a:ext>
+              </a:extLst>
+            </p:cNvPr>
+            <p:cNvPicPr>
+              <a:picLocks noChangeAspect="1"/>
+            </p:cNvPicPr>
+            <p:nvPr/>
+          </p:nvPicPr>
+          <p:blipFill>
+            <a:blip r:embed="rId3">
+              <a:extLst>
+                <a:ext uri="{28A0092B-C50C-407E-A947-70E740481C1C}">
+                  <a14:useLocalDpi xmlns:a14="http://schemas.microsoft.com/office/drawing/2010/main" val="0"/>
+                </a:ext>
+              </a:extLst>
+            </a:blip>
+            <a:stretch>
+              <a:fillRect/>
+            </a:stretch>
+          </p:blipFill>
+          <p:spPr>
+            <a:xfrm>
+              <a:off x="4104453" y="3325697"/>
+              <a:ext cx="780290" cy="780290"/>
+            </a:xfrm>
+            <a:prstGeom prst="rect">
+              <a:avLst/>
+            </a:prstGeom>
+          </p:spPr>
+        </p:pic>
+      </p:grpSp>
+      <p:grpSp>
+        <p:nvGrpSpPr>
+          <p:cNvPr id="16" name="Group 15">
+            <a:extLst>
+              <a:ext uri="{FF2B5EF4-FFF2-40B4-BE49-F238E27FC236}">
+                <a16:creationId xmlns:a16="http://schemas.microsoft.com/office/drawing/2014/main" id="{98B55D6A-373D-4F0C-BCC4-108B3DFCCCBE}"/>
+              </a:ext>
+            </a:extLst>
+          </p:cNvPr>
+          <p:cNvGrpSpPr/>
+          <p:nvPr/>
+        </p:nvGrpSpPr>
+        <p:grpSpPr>
+          <a:xfrm>
+            <a:off x="2881144" y="5527901"/>
+            <a:ext cx="860592" cy="1034206"/>
+            <a:chOff x="2293969" y="5512832"/>
+            <a:chExt cx="860592" cy="1034206"/>
+          </a:xfrm>
+        </p:grpSpPr>
+        <p:pic>
+          <p:nvPicPr>
+            <p:cNvPr id="17" name="Picture 16">
+              <a:extLst>
+                <a:ext uri="{FF2B5EF4-FFF2-40B4-BE49-F238E27FC236}">
+                  <a16:creationId xmlns:a16="http://schemas.microsoft.com/office/drawing/2014/main" id="{83AC9C7D-C816-40E1-8044-5ECEE41E8EDF}"/>
+                </a:ext>
+              </a:extLst>
+            </p:cNvPr>
+            <p:cNvPicPr>
+              <a:picLocks noChangeAspect="1"/>
+            </p:cNvPicPr>
+            <p:nvPr/>
+          </p:nvPicPr>
+          <p:blipFill>
+            <a:blip r:embed="rId4">
+              <a:extLst>
+                <a:ext uri="{28A0092B-C50C-407E-A947-70E740481C1C}">
+                  <a14:useLocalDpi xmlns:a14="http://schemas.microsoft.com/office/drawing/2010/main" val="0"/>
+                </a:ext>
+              </a:extLst>
+            </a:blip>
+            <a:stretch>
+              <a:fillRect/>
+            </a:stretch>
+          </p:blipFill>
+          <p:spPr>
+            <a:xfrm>
+              <a:off x="2325896" y="5512832"/>
+              <a:ext cx="780290" cy="780290"/>
+            </a:xfrm>
+            <a:prstGeom prst="rect">
+              <a:avLst/>
+            </a:prstGeom>
+          </p:spPr>
+        </p:pic>
+        <p:sp>
+          <p:nvSpPr>
+            <p:cNvPr id="18" name="Rectangle 17">
+              <a:extLst>
+                <a:ext uri="{FF2B5EF4-FFF2-40B4-BE49-F238E27FC236}">
+                  <a16:creationId xmlns:a16="http://schemas.microsoft.com/office/drawing/2014/main" id="{2B6E201E-69D1-4E97-84C3-5E228A7ABCFF}"/>
+                </a:ext>
+              </a:extLst>
+            </p:cNvPr>
+            <p:cNvSpPr/>
+            <p:nvPr/>
+          </p:nvSpPr>
+          <p:spPr>
+            <a:xfrm>
+              <a:off x="2293969" y="6293122"/>
+              <a:ext cx="860592" cy="253916"/>
+            </a:xfrm>
+            <a:prstGeom prst="rect">
+              <a:avLst/>
+            </a:prstGeom>
+          </p:spPr>
+          <p:txBody>
+            <a:bodyPr wrap="square">
+              <a:spAutoFit/>
+            </a:bodyPr>
+            <a:lstStyle/>
+            <a:p>
+              <a:pPr marL="0" marR="0" lvl="0" indent="0" algn="ctr" defTabSz="914400" rtl="0" eaLnBrk="1" fontAlgn="auto" latinLnBrk="0" hangingPunct="1">
+                <a:lnSpc>
+                  <a:spcPct val="100000"/>
+                </a:lnSpc>
+                <a:spcBef>
+                  <a:spcPts val="0"/>
+                </a:spcBef>
+                <a:spcAft>
+                  <a:spcPts val="0"/>
+                </a:spcAft>
+                <a:buClrTx/>
+                <a:buSzTx/>
+                <a:buFontTx/>
+                <a:buNone/>
+                <a:tabLst/>
+                <a:defRPr/>
+              </a:pPr>
+              <a:r>
+                <a:rPr kumimoji="0" lang="en-US" sz="1050" b="0" i="0" u="none" strike="noStrike" kern="0" cap="none" spc="0" normalizeH="0" baseline="0" noProof="0" dirty="0">
+                  <a:ln>
+                    <a:noFill/>
+                  </a:ln>
+                  <a:solidFill>
+                    <a:srgbClr val="505050"/>
+                  </a:solidFill>
+                  <a:effectLst/>
+                  <a:uLnTx/>
+                  <a:uFillTx/>
+                  <a:latin typeface="Segoe UI Semibold" panose="020B0702040204020203" pitchFamily="34" charset="0"/>
+                  <a:ea typeface="+mn-ea"/>
+                  <a:cs typeface="Segoe UI Semibold" panose="020B0702040204020203" pitchFamily="34" charset="0"/>
+                </a:rPr>
+                <a:t>AKV</a:t>
+              </a:r>
+            </a:p>
+          </p:txBody>
+        </p:sp>
+      </p:grpSp>
+      <p:grpSp>
+        <p:nvGrpSpPr>
+          <p:cNvPr id="19" name="Group 18">
+            <a:extLst>
+              <a:ext uri="{FF2B5EF4-FFF2-40B4-BE49-F238E27FC236}">
+                <a16:creationId xmlns:a16="http://schemas.microsoft.com/office/drawing/2014/main" id="{05AE2C53-3BA2-4A32-92CD-BAE1F85A7AAE}"/>
+              </a:ext>
+            </a:extLst>
+          </p:cNvPr>
+          <p:cNvGrpSpPr/>
+          <p:nvPr/>
+        </p:nvGrpSpPr>
+        <p:grpSpPr>
+          <a:xfrm>
+            <a:off x="6369801" y="2025333"/>
+            <a:ext cx="1381617" cy="1249963"/>
+            <a:chOff x="5557683" y="3115204"/>
+            <a:chExt cx="1381617" cy="1249963"/>
+          </a:xfrm>
+        </p:grpSpPr>
+        <p:sp>
+          <p:nvSpPr>
+            <p:cNvPr id="20" name="Rectangle 19">
+              <a:extLst>
+                <a:ext uri="{FF2B5EF4-FFF2-40B4-BE49-F238E27FC236}">
+                  <a16:creationId xmlns:a16="http://schemas.microsoft.com/office/drawing/2014/main" id="{8CC5C208-C858-4679-974F-19F137AB7BFA}"/>
+                </a:ext>
+              </a:extLst>
+            </p:cNvPr>
+            <p:cNvSpPr/>
+            <p:nvPr/>
+          </p:nvSpPr>
+          <p:spPr>
+            <a:xfrm>
+              <a:off x="5557683" y="4111251"/>
+              <a:ext cx="1381617" cy="253916"/>
+            </a:xfrm>
+            <a:prstGeom prst="rect">
+              <a:avLst/>
+            </a:prstGeom>
+          </p:spPr>
+          <p:txBody>
+            <a:bodyPr wrap="square">
+              <a:spAutoFit/>
+            </a:bodyPr>
+            <a:lstStyle/>
+            <a:p>
+              <a:pPr marL="0" marR="0" lvl="0" indent="0" algn="ctr" defTabSz="914192" rtl="0" eaLnBrk="1" fontAlgn="auto" latinLnBrk="0" hangingPunct="1">
+                <a:lnSpc>
+                  <a:spcPct val="100000"/>
+                </a:lnSpc>
+                <a:spcBef>
+                  <a:spcPts val="0"/>
+                </a:spcBef>
+                <a:spcAft>
+                  <a:spcPts val="0"/>
+                </a:spcAft>
+                <a:buClrTx/>
+                <a:buSzTx/>
+                <a:buFontTx/>
+                <a:buNone/>
+                <a:tabLst/>
+                <a:defRPr/>
+              </a:pPr>
+              <a:r>
+                <a:rPr lang="en-US" sz="1050" kern="0" dirty="0">
+                  <a:solidFill>
+                    <a:srgbClr val="505050"/>
+                  </a:solidFill>
+                  <a:latin typeface="Segoe UI Semibold" panose="020B0702040204020203" pitchFamily="34" charset="0"/>
+                  <a:ea typeface="MS PGothic" panose="020B0600070205080204" pitchFamily="34" charset="-128"/>
+                  <a:cs typeface="Segoe UI Semibold" panose="020B0702040204020203" pitchFamily="34" charset="0"/>
+                </a:rPr>
+                <a:t>Databricks</a:t>
+              </a:r>
+            </a:p>
+          </p:txBody>
+        </p:sp>
+        <p:pic>
+          <p:nvPicPr>
+            <p:cNvPr id="21" name="Picture 4" descr="Image result for databricks">
+              <a:extLst>
+                <a:ext uri="{FF2B5EF4-FFF2-40B4-BE49-F238E27FC236}">
+                  <a16:creationId xmlns:a16="http://schemas.microsoft.com/office/drawing/2014/main" id="{83BC0486-BBEE-4C72-8412-46C09C12959E}"/>
+                </a:ext>
+              </a:extLst>
+            </p:cNvPr>
+            <p:cNvPicPr>
+              <a:picLocks noChangeAspect="1" noChangeArrowheads="1"/>
+            </p:cNvPicPr>
+            <p:nvPr/>
+          </p:nvPicPr>
+          <p:blipFill>
+            <a:blip r:embed="rId5">
+              <a:clrChange>
+                <a:clrFrom>
+                  <a:srgbClr val="FFFFFF"/>
+                </a:clrFrom>
+                <a:clrTo>
+                  <a:srgbClr val="FFFFFF">
+                    <a:alpha val="0"/>
+                  </a:srgbClr>
+                </a:clrTo>
+              </a:clrChange>
+              <a:extLst>
+                <a:ext uri="{28A0092B-C50C-407E-A947-70E740481C1C}">
+                  <a14:useLocalDpi xmlns:a14="http://schemas.microsoft.com/office/drawing/2010/main" val="0"/>
+                </a:ext>
+              </a:extLst>
+            </a:blip>
+            <a:srcRect/>
+            <a:stretch>
+              <a:fillRect/>
+            </a:stretch>
+          </p:blipFill>
+          <p:spPr bwMode="auto">
+            <a:xfrm>
+              <a:off x="5657057" y="3115204"/>
+              <a:ext cx="1182868" cy="1182868"/>
+            </a:xfrm>
+            <a:prstGeom prst="rect">
+              <a:avLst/>
+            </a:prstGeom>
+            <a:noFill/>
+            <a:extLst>
+              <a:ext uri="{909E8E84-426E-40DD-AFC4-6F175D3DCCD1}">
+                <a14:hiddenFill xmlns:a14="http://schemas.microsoft.com/office/drawing/2010/main">
+                  <a:solidFill>
+                    <a:srgbClr val="FFFFFF"/>
+                  </a:solidFill>
+                </a14:hiddenFill>
+              </a:ext>
+            </a:extLst>
+          </p:spPr>
+        </p:pic>
+      </p:grpSp>
+      <p:grpSp>
+        <p:nvGrpSpPr>
+          <p:cNvPr id="22" name="Group 21">
+            <a:extLst>
+              <a:ext uri="{FF2B5EF4-FFF2-40B4-BE49-F238E27FC236}">
+                <a16:creationId xmlns:a16="http://schemas.microsoft.com/office/drawing/2014/main" id="{112EC862-6A18-448C-AA18-6F6CBB6EFAC4}"/>
+              </a:ext>
+            </a:extLst>
+          </p:cNvPr>
+          <p:cNvGrpSpPr/>
+          <p:nvPr/>
+        </p:nvGrpSpPr>
+        <p:grpSpPr>
+          <a:xfrm>
+            <a:off x="6108553" y="3920329"/>
+            <a:ext cx="1917467" cy="1052261"/>
+            <a:chOff x="5399147" y="4515474"/>
+            <a:chExt cx="1917467" cy="1052261"/>
+          </a:xfrm>
+        </p:grpSpPr>
+        <p:sp>
+          <p:nvSpPr>
+            <p:cNvPr id="23" name="Rectangle 22">
+              <a:extLst>
+                <a:ext uri="{FF2B5EF4-FFF2-40B4-BE49-F238E27FC236}">
+                  <a16:creationId xmlns:a16="http://schemas.microsoft.com/office/drawing/2014/main" id="{E6129983-C29E-4F8F-B004-A942016E8A3C}"/>
+                </a:ext>
+              </a:extLst>
+            </p:cNvPr>
+            <p:cNvSpPr/>
+            <p:nvPr/>
+          </p:nvSpPr>
+          <p:spPr>
+            <a:xfrm>
+              <a:off x="5399147" y="5313819"/>
+              <a:ext cx="1917467" cy="253916"/>
+            </a:xfrm>
+            <a:prstGeom prst="rect">
+              <a:avLst/>
+            </a:prstGeom>
+          </p:spPr>
+          <p:txBody>
+            <a:bodyPr wrap="square">
+              <a:spAutoFit/>
+            </a:bodyPr>
+            <a:lstStyle/>
+            <a:p>
+              <a:pPr marL="0" marR="0" lvl="0" indent="0" algn="ctr" defTabSz="914192" rtl="0" eaLnBrk="1" fontAlgn="auto" latinLnBrk="0" hangingPunct="1">
+                <a:lnSpc>
+                  <a:spcPct val="100000"/>
+                </a:lnSpc>
+                <a:spcBef>
+                  <a:spcPts val="0"/>
+                </a:spcBef>
+                <a:spcAft>
+                  <a:spcPts val="0"/>
+                </a:spcAft>
+                <a:buClrTx/>
+                <a:buSzTx/>
+                <a:buFontTx/>
+                <a:buNone/>
+                <a:tabLst/>
+                <a:defRPr/>
+              </a:pPr>
+              <a:r>
+                <a:rPr kumimoji="0" lang="en-US" sz="1050" b="0" i="0" u="none" strike="noStrike" kern="0" cap="none" spc="0" normalizeH="0" baseline="0" noProof="0" dirty="0">
+                  <a:ln>
+                    <a:noFill/>
+                  </a:ln>
+                  <a:solidFill>
+                    <a:srgbClr val="505050"/>
+                  </a:solidFill>
+                  <a:effectLst/>
+                  <a:uLnTx/>
+                  <a:uFillTx/>
+                  <a:latin typeface="Segoe UI Semibold" panose="020B0702040204020203" pitchFamily="34" charset="0"/>
+                  <a:ea typeface="MS PGothic" panose="020B0600070205080204" pitchFamily="34" charset="-128"/>
+                  <a:cs typeface="Segoe UI Semibold" panose="020B0702040204020203" pitchFamily="34" charset="0"/>
+                </a:rPr>
+                <a:t>Machine Learning </a:t>
+              </a:r>
+              <a:r>
+                <a:rPr lang="en-US" sz="1050" kern="0" dirty="0">
+                  <a:solidFill>
+                    <a:srgbClr val="505050"/>
+                  </a:solidFill>
+                  <a:latin typeface="Segoe UI Semibold" panose="020B0702040204020203" pitchFamily="34" charset="0"/>
+                  <a:ea typeface="MS PGothic" panose="020B0600070205080204" pitchFamily="34" charset="-128"/>
+                  <a:cs typeface="Segoe UI Semibold" panose="020B0702040204020203" pitchFamily="34" charset="0"/>
+                </a:rPr>
+                <a:t>Studio</a:t>
+              </a:r>
+              <a:endParaRPr kumimoji="0" lang="en-US" sz="1050" b="0" i="0" u="none" strike="noStrike" kern="0" cap="none" spc="0" normalizeH="0" baseline="0" noProof="0" dirty="0">
+                <a:ln>
+                  <a:noFill/>
+                </a:ln>
+                <a:solidFill>
+                  <a:srgbClr val="505050"/>
+                </a:solidFill>
+                <a:effectLst/>
+                <a:uLnTx/>
+                <a:uFillTx/>
+                <a:latin typeface="Segoe UI Semibold" panose="020B0702040204020203" pitchFamily="34" charset="0"/>
+                <a:ea typeface="MS PGothic" panose="020B0600070205080204" pitchFamily="34" charset="-128"/>
+                <a:cs typeface="Segoe UI Semibold" panose="020B0702040204020203" pitchFamily="34" charset="0"/>
+              </a:endParaRPr>
+            </a:p>
+          </p:txBody>
+        </p:sp>
+        <p:pic>
+          <p:nvPicPr>
+            <p:cNvPr id="24" name="Picture 23">
+              <a:extLst>
+                <a:ext uri="{FF2B5EF4-FFF2-40B4-BE49-F238E27FC236}">
+                  <a16:creationId xmlns:a16="http://schemas.microsoft.com/office/drawing/2014/main" id="{798A42A9-32E8-40B7-9BE6-A71FACD12B55}"/>
+                </a:ext>
+              </a:extLst>
+            </p:cNvPr>
+            <p:cNvPicPr>
+              <a:picLocks noChangeAspect="1"/>
+            </p:cNvPicPr>
+            <p:nvPr/>
+          </p:nvPicPr>
+          <p:blipFill>
+            <a:blip r:embed="rId6">
+              <a:extLst>
+                <a:ext uri="{28A0092B-C50C-407E-A947-70E740481C1C}">
+                  <a14:useLocalDpi xmlns:a14="http://schemas.microsoft.com/office/drawing/2010/main" val="0"/>
+                </a:ext>
+              </a:extLst>
+            </a:blip>
+            <a:stretch>
+              <a:fillRect/>
+            </a:stretch>
+          </p:blipFill>
+          <p:spPr>
+            <a:xfrm>
+              <a:off x="5967735" y="4515474"/>
+              <a:ext cx="780290" cy="780290"/>
+            </a:xfrm>
+            <a:prstGeom prst="rect">
+              <a:avLst/>
+            </a:prstGeom>
+          </p:spPr>
+        </p:pic>
+      </p:grpSp>
+      <p:pic>
+        <p:nvPicPr>
+          <p:cNvPr id="25" name="Picture 24" descr="A close up of a sign&#10;&#10;Description generated with high confidence">
+            <a:extLst>
+              <a:ext uri="{FF2B5EF4-FFF2-40B4-BE49-F238E27FC236}">
+                <a16:creationId xmlns:a16="http://schemas.microsoft.com/office/drawing/2014/main" id="{50169FB7-1B6C-45E1-886C-72F89DEE93AE}"/>
+              </a:ext>
+            </a:extLst>
+          </p:cNvPr>
+          <p:cNvPicPr>
+            <a:picLocks noChangeAspect="1"/>
+          </p:cNvPicPr>
+          <p:nvPr/>
+        </p:nvPicPr>
+        <p:blipFill>
+          <a:blip r:embed="rId7">
+            <a:extLst>
+              <a:ext uri="{28A0092B-C50C-407E-A947-70E740481C1C}">
+                <a14:useLocalDpi xmlns:a14="http://schemas.microsoft.com/office/drawing/2010/main" val="0"/>
+              </a:ext>
+            </a:extLst>
+          </a:blip>
+          <a:stretch>
+            <a:fillRect/>
+          </a:stretch>
+        </p:blipFill>
+        <p:spPr>
+          <a:xfrm>
+            <a:off x="8711812" y="2183385"/>
+            <a:ext cx="780290" cy="780290"/>
+          </a:xfrm>
+          <a:prstGeom prst="rect">
+            <a:avLst/>
+          </a:prstGeom>
+        </p:spPr>
+      </p:pic>
+      <p:grpSp>
+        <p:nvGrpSpPr>
+          <p:cNvPr id="26" name="Group 25">
+            <a:extLst>
+              <a:ext uri="{FF2B5EF4-FFF2-40B4-BE49-F238E27FC236}">
+                <a16:creationId xmlns:a16="http://schemas.microsoft.com/office/drawing/2014/main" id="{68EEFA0E-1C64-4FE7-BB5E-66BA12914DAF}"/>
+              </a:ext>
+            </a:extLst>
+          </p:cNvPr>
+          <p:cNvGrpSpPr/>
+          <p:nvPr/>
+        </p:nvGrpSpPr>
+        <p:grpSpPr>
+          <a:xfrm>
+            <a:off x="2728462" y="2149145"/>
+            <a:ext cx="1165956" cy="1034206"/>
+            <a:chOff x="1937217" y="3317591"/>
+            <a:chExt cx="1165956" cy="1034206"/>
+          </a:xfrm>
+        </p:grpSpPr>
+        <p:sp>
+          <p:nvSpPr>
+            <p:cNvPr id="27" name="Rectangle 26">
+              <a:extLst>
+                <a:ext uri="{FF2B5EF4-FFF2-40B4-BE49-F238E27FC236}">
+                  <a16:creationId xmlns:a16="http://schemas.microsoft.com/office/drawing/2014/main" id="{40BC2589-5998-4879-B3F5-AC311A86D83F}"/>
+                </a:ext>
+              </a:extLst>
+            </p:cNvPr>
+            <p:cNvSpPr/>
+            <p:nvPr/>
+          </p:nvSpPr>
+          <p:spPr>
+            <a:xfrm>
+              <a:off x="1937217" y="4097881"/>
+              <a:ext cx="1165956" cy="253916"/>
+            </a:xfrm>
+            <a:prstGeom prst="rect">
+              <a:avLst/>
+            </a:prstGeom>
+          </p:spPr>
+          <p:txBody>
+            <a:bodyPr wrap="square">
+              <a:spAutoFit/>
+            </a:bodyPr>
+            <a:lstStyle/>
+            <a:p>
+              <a:pPr marL="0" marR="0" lvl="0" indent="0" algn="ctr" defTabSz="914192" rtl="0" eaLnBrk="1" fontAlgn="auto" latinLnBrk="0" hangingPunct="1">
+                <a:lnSpc>
+                  <a:spcPct val="100000"/>
+                </a:lnSpc>
+                <a:spcBef>
+                  <a:spcPts val="0"/>
+                </a:spcBef>
+                <a:spcAft>
+                  <a:spcPts val="0"/>
+                </a:spcAft>
+                <a:buClrTx/>
+                <a:buSzTx/>
+                <a:buFontTx/>
+                <a:buNone/>
+                <a:tabLst/>
+                <a:defRPr/>
+              </a:pPr>
+              <a:r>
+                <a:rPr kumimoji="0" lang="en-US" sz="1050" b="0" i="0" u="none" strike="noStrike" kern="0" cap="none" spc="0" normalizeH="0" baseline="0" noProof="0" dirty="0">
+                  <a:ln>
+                    <a:noFill/>
+                  </a:ln>
+                  <a:solidFill>
+                    <a:srgbClr val="505050"/>
+                  </a:solidFill>
+                  <a:effectLst/>
+                  <a:uLnTx/>
+                  <a:uFillTx/>
+                  <a:latin typeface="Segoe UI Semibold" panose="020B0702040204020203" pitchFamily="34" charset="0"/>
+                  <a:ea typeface="MS PGothic" panose="020B0600070205080204" pitchFamily="34" charset="-128"/>
+                  <a:cs typeface="Segoe UI Semibold" panose="020B0702040204020203" pitchFamily="34" charset="0"/>
+                </a:rPr>
+                <a:t>Data Factory</a:t>
+              </a:r>
+            </a:p>
+          </p:txBody>
+        </p:sp>
+        <p:pic>
+          <p:nvPicPr>
+            <p:cNvPr id="28" name="Picture 27">
+              <a:extLst>
+                <a:ext uri="{FF2B5EF4-FFF2-40B4-BE49-F238E27FC236}">
+                  <a16:creationId xmlns:a16="http://schemas.microsoft.com/office/drawing/2014/main" id="{8DB7F6F2-29E2-49AF-B650-174F1BC40ABC}"/>
+                </a:ext>
+              </a:extLst>
+            </p:cNvPr>
+            <p:cNvPicPr>
+              <a:picLocks noChangeAspect="1"/>
+            </p:cNvPicPr>
+            <p:nvPr/>
+          </p:nvPicPr>
+          <p:blipFill>
+            <a:blip r:embed="rId8">
+              <a:extLst>
+                <a:ext uri="{28A0092B-C50C-407E-A947-70E740481C1C}">
+                  <a14:useLocalDpi xmlns:a14="http://schemas.microsoft.com/office/drawing/2010/main" val="0"/>
+                </a:ext>
+              </a:extLst>
+            </a:blip>
+            <a:stretch>
+              <a:fillRect/>
+            </a:stretch>
+          </p:blipFill>
+          <p:spPr>
+            <a:xfrm>
+              <a:off x="2130050" y="3317591"/>
+              <a:ext cx="780290" cy="780290"/>
+            </a:xfrm>
+            <a:prstGeom prst="rect">
+              <a:avLst/>
+            </a:prstGeom>
+          </p:spPr>
+        </p:pic>
+      </p:grpSp>
+      <p:sp>
+        <p:nvSpPr>
+          <p:cNvPr id="29" name="Rectangle 28">
+            <a:extLst>
+              <a:ext uri="{FF2B5EF4-FFF2-40B4-BE49-F238E27FC236}">
+                <a16:creationId xmlns:a16="http://schemas.microsoft.com/office/drawing/2014/main" id="{511B96B3-0B55-4B12-BA0C-3009ED86E754}"/>
+              </a:ext>
+            </a:extLst>
+          </p:cNvPr>
+          <p:cNvSpPr/>
+          <p:nvPr/>
+        </p:nvSpPr>
+        <p:spPr bwMode="auto">
+          <a:xfrm>
+            <a:off x="2008282" y="5413528"/>
+            <a:ext cx="8175437" cy="1262952"/>
+          </a:xfrm>
+          <a:prstGeom prst="rect">
+            <a:avLst/>
+          </a:prstGeom>
+          <a:noFill/>
+          <a:ln w="12700">
+            <a:solidFill>
+              <a:schemeClr val="tx2"/>
+            </a:solidFill>
+            <a:headEnd type="none" w="med" len="med"/>
+            <a:tailEnd type="none" w="med" len="med"/>
+          </a:ln>
+          <a:effectLst/>
+        </p:spPr>
+        <p:style>
+          <a:lnRef idx="1">
+            <a:schemeClr val="accent2"/>
+          </a:lnRef>
+          <a:fillRef idx="3">
+            <a:schemeClr val="accent2"/>
+          </a:fillRef>
+          <a:effectRef idx="2">
+            <a:schemeClr val="accent2"/>
+          </a:effectRef>
+          <a:fontRef idx="minor">
+            <a:schemeClr val="lt1"/>
+          </a:fontRef>
+        </p:style>
+        <p:txBody>
+          <a:bodyPr rot="0" spcFirstLastPara="0" vertOverflow="overflow" horzOverflow="overflow" vert="horz" wrap="square" lIns="182880" tIns="146304" rIns="182880" bIns="146304" numCol="1" spcCol="0" rtlCol="0" fromWordArt="0" anchor="t" anchorCtr="0" forceAA="0" compatLnSpc="1">
+            <a:prstTxWarp prst="textNoShape">
+              <a:avLst/>
+            </a:prstTxWarp>
+            <a:noAutofit/>
+          </a:bodyPr>
+          <a:lstStyle/>
+          <a:p>
+            <a:pPr marL="0" marR="0" lvl="0" indent="0" algn="ctr" defTabSz="932472" rtl="0" eaLnBrk="1" fontAlgn="base" latinLnBrk="0" hangingPunct="1">
+              <a:lnSpc>
+                <a:spcPct val="90000"/>
+              </a:lnSpc>
+              <a:spcBef>
+                <a:spcPct val="0"/>
+              </a:spcBef>
+              <a:spcAft>
+                <a:spcPct val="0"/>
+              </a:spcAft>
+              <a:buClrTx/>
+              <a:buSzTx/>
+              <a:buFontTx/>
+              <a:buNone/>
+              <a:tabLst/>
+              <a:defRPr/>
+            </a:pPr>
+            <a:endParaRPr kumimoji="0" lang="en-US" sz="2400" b="0" i="0" u="none" strike="noStrike" kern="1200" cap="none" spc="0" normalizeH="0" baseline="0" noProof="0" dirty="0">
+              <a:ln>
+                <a:noFill/>
+              </a:ln>
+              <a:gradFill>
+                <a:gsLst>
+                  <a:gs pos="0">
+                    <a:srgbClr val="FFFFFF"/>
+                  </a:gs>
+                  <a:gs pos="100000">
+                    <a:srgbClr val="FFFFFF"/>
+                  </a:gs>
+                </a:gsLst>
+                <a:lin ang="5400000" scaled="0"/>
+              </a:gradFill>
+              <a:effectLst/>
+              <a:uLnTx/>
+              <a:uFillTx/>
+              <a:latin typeface="Segoe UI"/>
+              <a:ea typeface="Segoe UI" pitchFamily="34" charset="0"/>
+              <a:cs typeface="Segoe UI" pitchFamily="34" charset="0"/>
+            </a:endParaRPr>
+          </a:p>
+        </p:txBody>
+      </p:sp>
+      <p:sp>
+        <p:nvSpPr>
+          <p:cNvPr id="30" name="Rectangle 29">
+            <a:extLst>
+              <a:ext uri="{FF2B5EF4-FFF2-40B4-BE49-F238E27FC236}">
+                <a16:creationId xmlns:a16="http://schemas.microsoft.com/office/drawing/2014/main" id="{A792D267-517F-44A8-BD1E-0224C0520800}"/>
+              </a:ext>
+            </a:extLst>
+          </p:cNvPr>
+          <p:cNvSpPr/>
+          <p:nvPr/>
+        </p:nvSpPr>
+        <p:spPr bwMode="auto">
+          <a:xfrm>
+            <a:off x="10335242" y="1514811"/>
+            <a:ext cx="1432897" cy="307777"/>
+          </a:xfrm>
+          <a:prstGeom prst="rect">
+            <a:avLst/>
+          </a:prstGeom>
+          <a:noFill/>
+          <a:ln w="3175">
+            <a:noFill/>
+          </a:ln>
+        </p:spPr>
+        <p:style>
+          <a:lnRef idx="0">
+            <a:scrgbClr r="0" g="0" b="0"/>
+          </a:lnRef>
+          <a:fillRef idx="0">
+            <a:scrgbClr r="0" g="0" b="0"/>
+          </a:fillRef>
+          <a:effectRef idx="0">
+            <a:scrgbClr r="0" g="0" b="0"/>
+          </a:effectRef>
+          <a:fontRef idx="minor">
+            <a:schemeClr val="lt1"/>
+          </a:fontRef>
+        </p:style>
+        <p:txBody>
+          <a:bodyPr spcFirstLastPara="0" vert="horz" wrap="square" lIns="91440" tIns="45720" rIns="91440" bIns="45720" numCol="1" spcCol="1270" anchor="t" anchorCtr="0">
+            <a:spAutoFit/>
+          </a:bodyPr>
+          <a:lstStyle/>
+          <a:p>
+            <a:pPr marL="0" marR="0" lvl="0" indent="0" algn="ctr" defTabSz="710593" rtl="0" eaLnBrk="1" fontAlgn="auto" latinLnBrk="0" hangingPunct="1">
+              <a:lnSpc>
+                <a:spcPct val="100000"/>
+              </a:lnSpc>
+              <a:spcBef>
+                <a:spcPct val="0"/>
+              </a:spcBef>
+              <a:spcAft>
+                <a:spcPct val="35000"/>
+              </a:spcAft>
+              <a:buClrTx/>
+              <a:buSzTx/>
+              <a:buFontTx/>
+              <a:buNone/>
+              <a:tabLst/>
+              <a:defRPr/>
+            </a:pPr>
+            <a:r>
+              <a:rPr kumimoji="0" lang="en-US" sz="1400" b="0" i="0" u="none" strike="noStrike" kern="0" cap="none" spc="0" normalizeH="0" baseline="0" noProof="0" dirty="0">
+                <a:ln>
+                  <a:noFill/>
+                </a:ln>
+                <a:solidFill>
+                  <a:srgbClr val="0078D7"/>
+                </a:solidFill>
+                <a:effectLst/>
+                <a:uLnTx/>
+                <a:uFillTx/>
+                <a:latin typeface="Segoe UI Semibold" panose="020B0702040204020203" pitchFamily="34" charset="0"/>
+                <a:ea typeface="+mn-ea"/>
+                <a:cs typeface="Segoe UI Semibold" panose="020B0702040204020203" pitchFamily="34" charset="0"/>
+              </a:rPr>
+              <a:t>Intelligence</a:t>
+            </a:r>
+          </a:p>
+        </p:txBody>
+      </p:sp>
+      <p:grpSp>
+        <p:nvGrpSpPr>
+          <p:cNvPr id="31" name="Group 30">
+            <a:extLst>
+              <a:ext uri="{FF2B5EF4-FFF2-40B4-BE49-F238E27FC236}">
+                <a16:creationId xmlns:a16="http://schemas.microsoft.com/office/drawing/2014/main" id="{89E7614B-FDE2-42A3-88E7-0A944FD83A62}"/>
+              </a:ext>
+            </a:extLst>
+          </p:cNvPr>
+          <p:cNvGrpSpPr/>
+          <p:nvPr/>
+        </p:nvGrpSpPr>
+        <p:grpSpPr>
+          <a:xfrm>
+            <a:off x="8492266" y="3910177"/>
+            <a:ext cx="1309656" cy="1062413"/>
+            <a:chOff x="8492266" y="3842422"/>
+            <a:chExt cx="1309656" cy="1062413"/>
+          </a:xfrm>
+        </p:grpSpPr>
+        <p:pic>
+          <p:nvPicPr>
+            <p:cNvPr id="32" name="Picture 31" descr="A picture containing vector graphics&#10;&#10;Description generated with high confidence">
+              <a:extLst>
+                <a:ext uri="{FF2B5EF4-FFF2-40B4-BE49-F238E27FC236}">
+                  <a16:creationId xmlns:a16="http://schemas.microsoft.com/office/drawing/2014/main" id="{EC86D363-06D3-453D-8CE6-551737C3551A}"/>
+                </a:ext>
+              </a:extLst>
+            </p:cNvPr>
+            <p:cNvPicPr>
+              <a:picLocks noChangeAspect="1"/>
+            </p:cNvPicPr>
+            <p:nvPr/>
+          </p:nvPicPr>
+          <p:blipFill>
+            <a:blip r:embed="rId9">
+              <a:extLst>
+                <a:ext uri="{28A0092B-C50C-407E-A947-70E740481C1C}">
+                  <a14:useLocalDpi xmlns:a14="http://schemas.microsoft.com/office/drawing/2010/main" val="0"/>
+                </a:ext>
+              </a:extLst>
+            </a:blip>
+            <a:stretch>
+              <a:fillRect/>
+            </a:stretch>
+          </p:blipFill>
+          <p:spPr>
+            <a:xfrm>
+              <a:off x="8756950" y="3842422"/>
+              <a:ext cx="780290" cy="780290"/>
+            </a:xfrm>
+            <a:prstGeom prst="rect">
+              <a:avLst/>
+            </a:prstGeom>
+          </p:spPr>
+        </p:pic>
+        <p:sp>
+          <p:nvSpPr>
+            <p:cNvPr id="33" name="Rectangle 32">
+              <a:extLst>
+                <a:ext uri="{FF2B5EF4-FFF2-40B4-BE49-F238E27FC236}">
+                  <a16:creationId xmlns:a16="http://schemas.microsoft.com/office/drawing/2014/main" id="{7FD2A5B0-8126-49B4-87CE-83FE659939FC}"/>
+                </a:ext>
+              </a:extLst>
+            </p:cNvPr>
+            <p:cNvSpPr/>
+            <p:nvPr/>
+          </p:nvSpPr>
+          <p:spPr>
+            <a:xfrm>
+              <a:off x="8492266" y="4650919"/>
+              <a:ext cx="1309656" cy="253916"/>
+            </a:xfrm>
+            <a:prstGeom prst="rect">
+              <a:avLst/>
+            </a:prstGeom>
+          </p:spPr>
+          <p:txBody>
+            <a:bodyPr wrap="square">
+              <a:spAutoFit/>
+            </a:bodyPr>
+            <a:lstStyle/>
+            <a:p>
+              <a:pPr marL="0" marR="0" lvl="0" indent="0" algn="ctr" defTabSz="914192" rtl="0" eaLnBrk="1" fontAlgn="auto" latinLnBrk="0" hangingPunct="1">
+                <a:lnSpc>
+                  <a:spcPct val="100000"/>
+                </a:lnSpc>
+                <a:spcBef>
+                  <a:spcPts val="0"/>
+                </a:spcBef>
+                <a:spcAft>
+                  <a:spcPts val="0"/>
+                </a:spcAft>
+                <a:buClrTx/>
+                <a:buSzTx/>
+                <a:buFontTx/>
+                <a:buNone/>
+                <a:tabLst/>
+                <a:defRPr/>
+              </a:pPr>
+              <a:r>
+                <a:rPr kumimoji="0" lang="en-US" sz="1050" b="0" i="0" u="none" strike="noStrike" kern="0" cap="none" spc="0" normalizeH="0" baseline="0" noProof="0" dirty="0">
+                  <a:ln>
+                    <a:noFill/>
+                  </a:ln>
+                  <a:solidFill>
+                    <a:srgbClr val="505050"/>
+                  </a:solidFill>
+                  <a:effectLst/>
+                  <a:uLnTx/>
+                  <a:uFillTx/>
+                  <a:latin typeface="Segoe UI Semibold" panose="020B0702040204020203" pitchFamily="34" charset="0"/>
+                  <a:ea typeface="MS PGothic" panose="020B0600070205080204" pitchFamily="34" charset="-128"/>
+                  <a:cs typeface="Segoe UI Semibold" panose="020B0702040204020203" pitchFamily="34" charset="0"/>
+                </a:rPr>
+                <a:t>ML Web Service</a:t>
+              </a:r>
+            </a:p>
+          </p:txBody>
+        </p:sp>
+      </p:grpSp>
+      <p:cxnSp>
+        <p:nvCxnSpPr>
+          <p:cNvPr id="34" name="Straight Arrow Connector 33">
+            <a:extLst>
+              <a:ext uri="{FF2B5EF4-FFF2-40B4-BE49-F238E27FC236}">
+                <a16:creationId xmlns:a16="http://schemas.microsoft.com/office/drawing/2014/main" id="{47516809-3FD5-4CBA-BC8A-444D092D2CE4}"/>
+              </a:ext>
+            </a:extLst>
+          </p:cNvPr>
+          <p:cNvCxnSpPr>
+            <a:cxnSpLocks/>
+          </p:cNvCxnSpPr>
+          <p:nvPr/>
+        </p:nvCxnSpPr>
+        <p:spPr>
+          <a:xfrm>
+            <a:off x="9147094" y="3275296"/>
+            <a:ext cx="0" cy="540845"/>
+          </a:xfrm>
+          <a:prstGeom prst="straightConnector1">
+            <a:avLst/>
+          </a:prstGeom>
+          <a:ln>
+            <a:headEnd type="none" w="med" len="med"/>
+            <a:tailEnd type="arrow" w="med" len="med"/>
+          </a:ln>
+        </p:spPr>
+        <p:style>
+          <a:lnRef idx="3">
+            <a:schemeClr val="accent1"/>
+          </a:lnRef>
+          <a:fillRef idx="0">
+            <a:schemeClr val="accent1"/>
+          </a:fillRef>
+          <a:effectRef idx="2">
+            <a:schemeClr val="accent1"/>
+          </a:effectRef>
+          <a:fontRef idx="minor">
+            <a:schemeClr val="tx1"/>
+          </a:fontRef>
+        </p:style>
+      </p:cxnSp>
+      <p:cxnSp>
+        <p:nvCxnSpPr>
+          <p:cNvPr id="39" name="Straight Arrow Connector 38">
+            <a:extLst>
+              <a:ext uri="{FF2B5EF4-FFF2-40B4-BE49-F238E27FC236}">
+                <a16:creationId xmlns:a16="http://schemas.microsoft.com/office/drawing/2014/main" id="{EAF49339-BB45-423C-8684-875EBE122235}"/>
+              </a:ext>
+            </a:extLst>
+          </p:cNvPr>
+          <p:cNvCxnSpPr/>
+          <p:nvPr/>
+        </p:nvCxnSpPr>
+        <p:spPr>
+          <a:xfrm flipV="1">
+            <a:off x="7457431" y="4310474"/>
+            <a:ext cx="1231643" cy="5127"/>
+          </a:xfrm>
+          <a:prstGeom prst="straightConnector1">
+            <a:avLst/>
+          </a:prstGeom>
+          <a:ln>
+            <a:headEnd type="oval" w="med" len="med"/>
+            <a:tailEnd type="oval" w="med" len="med"/>
+          </a:ln>
+        </p:spPr>
+        <p:style>
+          <a:lnRef idx="3">
+            <a:schemeClr val="accent6"/>
+          </a:lnRef>
+          <a:fillRef idx="0">
+            <a:schemeClr val="accent6"/>
+          </a:fillRef>
+          <a:effectRef idx="2">
+            <a:schemeClr val="accent6"/>
+          </a:effectRef>
+          <a:fontRef idx="minor">
+            <a:schemeClr val="tx1"/>
+          </a:fontRef>
+        </p:style>
+      </p:cxnSp>
+      <p:cxnSp>
+        <p:nvCxnSpPr>
+          <p:cNvPr id="40" name="Straight Arrow Connector 39">
+            <a:extLst>
+              <a:ext uri="{FF2B5EF4-FFF2-40B4-BE49-F238E27FC236}">
+                <a16:creationId xmlns:a16="http://schemas.microsoft.com/office/drawing/2014/main" id="{D73C6256-FFA3-4A27-85C0-76D5AE583BAD}"/>
+              </a:ext>
+            </a:extLst>
+          </p:cNvPr>
+          <p:cNvCxnSpPr>
+            <a:cxnSpLocks/>
+          </p:cNvCxnSpPr>
+          <p:nvPr/>
+        </p:nvCxnSpPr>
+        <p:spPr>
+          <a:xfrm flipH="1" flipV="1">
+            <a:off x="5471919" y="2963676"/>
+            <a:ext cx="3368938" cy="1016946"/>
+          </a:xfrm>
+          <a:prstGeom prst="straightConnector1">
+            <a:avLst/>
+          </a:prstGeom>
+          <a:ln>
+            <a:headEnd type="none" w="med" len="med"/>
+            <a:tailEnd type="arrow" w="med" len="med"/>
+          </a:ln>
+        </p:spPr>
+        <p:style>
+          <a:lnRef idx="3">
+            <a:schemeClr val="accent1"/>
+          </a:lnRef>
+          <a:fillRef idx="0">
+            <a:schemeClr val="accent1"/>
+          </a:fillRef>
+          <a:effectRef idx="2">
+            <a:schemeClr val="accent1"/>
+          </a:effectRef>
+          <a:fontRef idx="minor">
+            <a:schemeClr val="tx1"/>
+          </a:fontRef>
+        </p:style>
+      </p:cxnSp>
+      <p:cxnSp>
+        <p:nvCxnSpPr>
+          <p:cNvPr id="43" name="Straight Arrow Connector 42">
+            <a:extLst>
+              <a:ext uri="{FF2B5EF4-FFF2-40B4-BE49-F238E27FC236}">
+                <a16:creationId xmlns:a16="http://schemas.microsoft.com/office/drawing/2014/main" id="{2D38E30E-8AF8-4DC4-BF1D-DF989A64E028}"/>
+              </a:ext>
+            </a:extLst>
+          </p:cNvPr>
+          <p:cNvCxnSpPr>
+            <a:cxnSpLocks/>
+            <a:stCxn id="27" idx="2"/>
+          </p:cNvCxnSpPr>
+          <p:nvPr/>
+        </p:nvCxnSpPr>
+        <p:spPr>
+          <a:xfrm>
+            <a:off x="3311440" y="3183351"/>
+            <a:ext cx="3260" cy="2308019"/>
+          </a:xfrm>
+          <a:prstGeom prst="straightConnector1">
+            <a:avLst/>
+          </a:prstGeom>
+          <a:ln>
+            <a:headEnd type="oval" w="med" len="med"/>
+            <a:tailEnd type="oval" w="med" len="med"/>
+          </a:ln>
+        </p:spPr>
+        <p:style>
+          <a:lnRef idx="3">
+            <a:schemeClr val="accent6"/>
+          </a:lnRef>
+          <a:fillRef idx="0">
+            <a:schemeClr val="accent6"/>
+          </a:fillRef>
+          <a:effectRef idx="2">
+            <a:schemeClr val="accent6"/>
+          </a:effectRef>
+          <a:fontRef idx="minor">
+            <a:schemeClr val="tx1"/>
+          </a:fontRef>
+        </p:style>
+      </p:cxnSp>
+      <p:cxnSp>
+        <p:nvCxnSpPr>
+          <p:cNvPr id="49" name="Connector: Elbow 48">
+            <a:extLst>
+              <a:ext uri="{FF2B5EF4-FFF2-40B4-BE49-F238E27FC236}">
+                <a16:creationId xmlns:a16="http://schemas.microsoft.com/office/drawing/2014/main" id="{D7228200-E159-4479-83D1-6429329772EB}"/>
+              </a:ext>
+            </a:extLst>
+          </p:cNvPr>
+          <p:cNvCxnSpPr>
+            <a:cxnSpLocks/>
+            <a:stCxn id="27" idx="2"/>
+            <a:endCxn id="12" idx="2"/>
+          </p:cNvCxnSpPr>
+          <p:nvPr/>
+        </p:nvCxnSpPr>
+        <p:spPr>
+          <a:xfrm rot="16200000" flipH="1">
+            <a:off x="6182660" y="312130"/>
+            <a:ext cx="48077" cy="5790517"/>
+          </a:xfrm>
+          <a:prstGeom prst="bentConnector3">
+            <a:avLst>
+              <a:gd name="adj1" fmla="val 575487"/>
+            </a:avLst>
+          </a:prstGeom>
+          <a:ln>
+            <a:headEnd type="oval" w="med" len="med"/>
+            <a:tailEnd type="oval" w="med" len="med"/>
+          </a:ln>
+        </p:spPr>
+        <p:style>
+          <a:lnRef idx="3">
+            <a:schemeClr val="accent6"/>
+          </a:lnRef>
+          <a:fillRef idx="0">
+            <a:schemeClr val="accent6"/>
+          </a:fillRef>
+          <a:effectRef idx="2">
+            <a:schemeClr val="accent6"/>
+          </a:effectRef>
+          <a:fontRef idx="minor">
+            <a:schemeClr val="tx1"/>
+          </a:fontRef>
+        </p:style>
+      </p:cxnSp>
+    </p:spTree>
+    <p:extLst>
+      <p:ext uri="{BB962C8B-B14F-4D97-AF65-F5344CB8AC3E}">
+        <p14:creationId xmlns:p14="http://schemas.microsoft.com/office/powerpoint/2010/main" val="1166646050"/>
+      </p:ext>
+    </p:extLst>
+  </p:cSld>
+  <p:clrMapOvr>
+    <a:masterClrMapping/>
+  </p:clrMapOvr>
+</p:sld>
+</file>
+
+<file path=ppt/slides/slide11.xml><?xml version="1.0" encoding="utf-8"?>
+<p:sld xmlns:a="http://schemas.openxmlformats.org/drawingml/2006/main" xmlns:r="http://schemas.openxmlformats.org/officeDocument/2006/relationships" xmlns:p="http://schemas.openxmlformats.org/presentationml/2006/main">
+  <p:cSld>
+    <p:spTree>
+      <p:nvGrpSpPr>
+        <p:cNvPr id="1" name=""/>
+        <p:cNvGrpSpPr/>
+        <p:nvPr/>
+      </p:nvGrpSpPr>
+      <p:grpSpPr>
+        <a:xfrm>
+          <a:off x="0" y="0"/>
+          <a:ext cx="0" cy="0"/>
+          <a:chOff x="0" y="0"/>
+          <a:chExt cx="0" cy="0"/>
+        </a:xfrm>
+      </p:grpSpPr>
+      <p:sp>
+        <p:nvSpPr>
+          <p:cNvPr id="2" name="Title 1">
+            <a:extLst>
+              <a:ext uri="{FF2B5EF4-FFF2-40B4-BE49-F238E27FC236}">
                 <a16:creationId xmlns:a16="http://schemas.microsoft.com/office/drawing/2014/main" id="{3CBAEFAC-E18A-4578-98E0-F46D8F4E34CA}"/>
               </a:ext>
             </a:extLst>
@@ -5161,7 +7128,7 @@
 </p:sld>
 </file>
 
-<file path=ppt/slides/slide11.xml><?xml version="1.0" encoding="utf-8"?>
+<file path=ppt/slides/slide12.xml><?xml version="1.0" encoding="utf-8"?>
 <p:sld xmlns:a="http://schemas.openxmlformats.org/drawingml/2006/main" xmlns:r="http://schemas.openxmlformats.org/officeDocument/2006/relationships" xmlns:p="http://schemas.openxmlformats.org/presentationml/2006/main">
   <p:cSld>
     <p:spTree>
@@ -6437,7 +8404,7 @@
 </p:sld>
 </file>
 
-<file path=ppt/slides/slide12.xml><?xml version="1.0" encoding="utf-8"?>
+<file path=ppt/slides/slide13.xml><?xml version="1.0" encoding="utf-8"?>
 <p:sld xmlns:a="http://schemas.openxmlformats.org/drawingml/2006/main" xmlns:r="http://schemas.openxmlformats.org/officeDocument/2006/relationships" xmlns:p="http://schemas.openxmlformats.org/presentationml/2006/main">
   <p:cSld>
     <p:spTree>
@@ -7485,7 +9452,7 @@
 </p:sld>
 </file>
 
-<file path=ppt/slides/slide13.xml><?xml version="1.0" encoding="utf-8"?>
+<file path=ppt/slides/slide14.xml><?xml version="1.0" encoding="utf-8"?>
 <p:sld xmlns:a="http://schemas.openxmlformats.org/drawingml/2006/main" xmlns:r="http://schemas.openxmlformats.org/officeDocument/2006/relationships" xmlns:p="http://schemas.openxmlformats.org/presentationml/2006/main">
   <p:cSld>
     <p:spTree>
@@ -8533,7 +10500,7 @@
 </p:sld>
 </file>
 
-<file path=ppt/slides/slide14.xml><?xml version="1.0" encoding="utf-8"?>
+<file path=ppt/slides/slide15.xml><?xml version="1.0" encoding="utf-8"?>
 <p:sld xmlns:a="http://schemas.openxmlformats.org/drawingml/2006/main" xmlns:r="http://schemas.openxmlformats.org/officeDocument/2006/relationships" xmlns:p="http://schemas.openxmlformats.org/presentationml/2006/main">
   <p:cSld>
     <p:spTree>
@@ -14042,6 +16009,1019 @@
           <p:cNvPr id="2" name="Title 1">
             <a:extLst>
               <a:ext uri="{FF2B5EF4-FFF2-40B4-BE49-F238E27FC236}">
+                <a16:creationId xmlns:a16="http://schemas.microsoft.com/office/drawing/2014/main" id="{A09C3E10-4C49-4C06-81FD-2A1DAB42F7FD}"/>
+              </a:ext>
+            </a:extLst>
+          </p:cNvPr>
+          <p:cNvSpPr>
+            <a:spLocks noGrp="1"/>
+          </p:cNvSpPr>
+          <p:nvPr>
+            <p:ph type="title"/>
+          </p:nvPr>
+        </p:nvSpPr>
+        <p:spPr/>
+        <p:txBody>
+          <a:bodyPr/>
+          <a:lstStyle/>
+          <a:p>
+            <a:r>
+              <a:rPr lang="en-US" dirty="0"/>
+              <a:t>1. Ingest Data</a:t>
+            </a:r>
+          </a:p>
+        </p:txBody>
+      </p:sp>
+      <p:sp>
+        <p:nvSpPr>
+          <p:cNvPr id="4" name="Text Placeholder 3">
+            <a:extLst>
+              <a:ext uri="{FF2B5EF4-FFF2-40B4-BE49-F238E27FC236}">
+                <a16:creationId xmlns:a16="http://schemas.microsoft.com/office/drawing/2014/main" id="{3985CB0D-D297-42BE-99C8-D109F979D0EB}"/>
+              </a:ext>
+            </a:extLst>
+          </p:cNvPr>
+          <p:cNvSpPr>
+            <a:spLocks noGrp="1"/>
+          </p:cNvSpPr>
+          <p:nvPr>
+            <p:ph type="body" sz="quarter" idx="10"/>
+          </p:nvPr>
+        </p:nvSpPr>
+        <p:spPr/>
+        <p:txBody>
+          <a:bodyPr/>
+          <a:lstStyle/>
+          <a:p>
+            <a:r>
+              <a:rPr lang="en-US" dirty="0"/>
+              <a:t>Pipeline</a:t>
+            </a:r>
+          </a:p>
+        </p:txBody>
+      </p:sp>
+      <p:sp>
+        <p:nvSpPr>
+          <p:cNvPr id="9" name="Rectangle: Rounded Corners 8">
+            <a:extLst>
+              <a:ext uri="{FF2B5EF4-FFF2-40B4-BE49-F238E27FC236}">
+                <a16:creationId xmlns:a16="http://schemas.microsoft.com/office/drawing/2014/main" id="{C40012D6-BC85-461E-95A3-21ABA7EC131E}"/>
+              </a:ext>
+            </a:extLst>
+          </p:cNvPr>
+          <p:cNvSpPr/>
+          <p:nvPr/>
+        </p:nvSpPr>
+        <p:spPr>
+          <a:xfrm>
+            <a:off x="611554" y="4084982"/>
+            <a:ext cx="2345036" cy="675861"/>
+          </a:xfrm>
+          <a:prstGeom prst="roundRect">
+            <a:avLst/>
+          </a:prstGeom>
+        </p:spPr>
+        <p:style>
+          <a:lnRef idx="3">
+            <a:schemeClr val="lt1"/>
+          </a:lnRef>
+          <a:fillRef idx="1">
+            <a:schemeClr val="accent5"/>
+          </a:fillRef>
+          <a:effectRef idx="1">
+            <a:schemeClr val="accent5"/>
+          </a:effectRef>
+          <a:fontRef idx="minor">
+            <a:schemeClr val="lt1"/>
+          </a:fontRef>
+        </p:style>
+        <p:txBody>
+          <a:bodyPr rtlCol="0" anchor="ctr"/>
+          <a:lstStyle/>
+          <a:p>
+            <a:pPr algn="ctr"/>
+            <a:r>
+              <a:rPr lang="en-US" sz="1400" b="1" dirty="0"/>
+              <a:t>Source </a:t>
+            </a:r>
+          </a:p>
+          <a:p>
+            <a:pPr algn="ctr"/>
+            <a:r>
+              <a:rPr lang="en-US" sz="1400" b="1" dirty="0"/>
+              <a:t>Linked Service</a:t>
+            </a:r>
+          </a:p>
+        </p:txBody>
+      </p:sp>
+      <p:sp>
+        <p:nvSpPr>
+          <p:cNvPr id="11" name="Rectangle: Rounded Corners 10">
+            <a:extLst>
+              <a:ext uri="{FF2B5EF4-FFF2-40B4-BE49-F238E27FC236}">
+                <a16:creationId xmlns:a16="http://schemas.microsoft.com/office/drawing/2014/main" id="{360B7439-512D-4487-8029-50868871269E}"/>
+              </a:ext>
+            </a:extLst>
+          </p:cNvPr>
+          <p:cNvSpPr/>
+          <p:nvPr/>
+        </p:nvSpPr>
+        <p:spPr>
+          <a:xfrm>
+            <a:off x="611554" y="5436704"/>
+            <a:ext cx="2345036" cy="675861"/>
+          </a:xfrm>
+          <a:prstGeom prst="roundRect">
+            <a:avLst/>
+          </a:prstGeom>
+        </p:spPr>
+        <p:style>
+          <a:lnRef idx="3">
+            <a:schemeClr val="lt1"/>
+          </a:lnRef>
+          <a:fillRef idx="1">
+            <a:schemeClr val="accent5"/>
+          </a:fillRef>
+          <a:effectRef idx="1">
+            <a:schemeClr val="accent5"/>
+          </a:effectRef>
+          <a:fontRef idx="minor">
+            <a:schemeClr val="lt1"/>
+          </a:fontRef>
+        </p:style>
+        <p:txBody>
+          <a:bodyPr rtlCol="0" anchor="ctr"/>
+          <a:lstStyle/>
+          <a:p>
+            <a:pPr algn="ctr"/>
+            <a:r>
+              <a:rPr lang="en-US" sz="1400" b="1" dirty="0"/>
+              <a:t>Destination</a:t>
+            </a:r>
+          </a:p>
+          <a:p>
+            <a:pPr algn="ctr"/>
+            <a:r>
+              <a:rPr lang="en-US" sz="1400" b="1" dirty="0"/>
+              <a:t>Linked Service</a:t>
+            </a:r>
+          </a:p>
+        </p:txBody>
+      </p:sp>
+      <p:sp>
+        <p:nvSpPr>
+          <p:cNvPr id="12" name="Rectangle: Rounded Corners 11">
+            <a:extLst>
+              <a:ext uri="{FF2B5EF4-FFF2-40B4-BE49-F238E27FC236}">
+                <a16:creationId xmlns:a16="http://schemas.microsoft.com/office/drawing/2014/main" id="{0BAE03A8-4D87-480E-910C-88BB56186E6A}"/>
+              </a:ext>
+            </a:extLst>
+          </p:cNvPr>
+          <p:cNvSpPr/>
+          <p:nvPr/>
+        </p:nvSpPr>
+        <p:spPr>
+          <a:xfrm>
+            <a:off x="3600748" y="4084982"/>
+            <a:ext cx="2345036" cy="675861"/>
+          </a:xfrm>
+          <a:prstGeom prst="roundRect">
+            <a:avLst/>
+          </a:prstGeom>
+        </p:spPr>
+        <p:style>
+          <a:lnRef idx="3">
+            <a:schemeClr val="lt1"/>
+          </a:lnRef>
+          <a:fillRef idx="1">
+            <a:schemeClr val="accent5"/>
+          </a:fillRef>
+          <a:effectRef idx="1">
+            <a:schemeClr val="accent5"/>
+          </a:effectRef>
+          <a:fontRef idx="minor">
+            <a:schemeClr val="lt1"/>
+          </a:fontRef>
+        </p:style>
+        <p:txBody>
+          <a:bodyPr rtlCol="0" anchor="ctr"/>
+          <a:lstStyle/>
+          <a:p>
+            <a:pPr algn="ctr"/>
+            <a:r>
+              <a:rPr lang="en-US" sz="1400" b="1" dirty="0"/>
+              <a:t>Source </a:t>
+            </a:r>
+          </a:p>
+          <a:p>
+            <a:pPr algn="ctr"/>
+            <a:r>
+              <a:rPr lang="en-US" sz="1400" b="1" dirty="0"/>
+              <a:t>Dataset</a:t>
+            </a:r>
+          </a:p>
+        </p:txBody>
+      </p:sp>
+      <p:sp>
+        <p:nvSpPr>
+          <p:cNvPr id="13" name="Rectangle: Rounded Corners 12">
+            <a:extLst>
+              <a:ext uri="{FF2B5EF4-FFF2-40B4-BE49-F238E27FC236}">
+                <a16:creationId xmlns:a16="http://schemas.microsoft.com/office/drawing/2014/main" id="{75589767-2C35-47B8-BEC5-5928FD9B8A26}"/>
+              </a:ext>
+            </a:extLst>
+          </p:cNvPr>
+          <p:cNvSpPr/>
+          <p:nvPr/>
+        </p:nvSpPr>
+        <p:spPr>
+          <a:xfrm>
+            <a:off x="3600748" y="5436704"/>
+            <a:ext cx="2345036" cy="675861"/>
+          </a:xfrm>
+          <a:prstGeom prst="roundRect">
+            <a:avLst/>
+          </a:prstGeom>
+        </p:spPr>
+        <p:style>
+          <a:lnRef idx="3">
+            <a:schemeClr val="lt1"/>
+          </a:lnRef>
+          <a:fillRef idx="1">
+            <a:schemeClr val="accent5"/>
+          </a:fillRef>
+          <a:effectRef idx="1">
+            <a:schemeClr val="accent5"/>
+          </a:effectRef>
+          <a:fontRef idx="minor">
+            <a:schemeClr val="lt1"/>
+          </a:fontRef>
+        </p:style>
+        <p:txBody>
+          <a:bodyPr rtlCol="0" anchor="ctr"/>
+          <a:lstStyle/>
+          <a:p>
+            <a:pPr algn="ctr"/>
+            <a:r>
+              <a:rPr lang="en-US" sz="1400" b="1" dirty="0"/>
+              <a:t>Destination</a:t>
+            </a:r>
+          </a:p>
+          <a:p>
+            <a:pPr algn="ctr"/>
+            <a:r>
+              <a:rPr lang="en-US" sz="1400" b="1" dirty="0"/>
+              <a:t>Dataset</a:t>
+            </a:r>
+          </a:p>
+        </p:txBody>
+      </p:sp>
+      <p:sp>
+        <p:nvSpPr>
+          <p:cNvPr id="14" name="Rectangle: Rounded Corners 13">
+            <a:extLst>
+              <a:ext uri="{FF2B5EF4-FFF2-40B4-BE49-F238E27FC236}">
+                <a16:creationId xmlns:a16="http://schemas.microsoft.com/office/drawing/2014/main" id="{6597E4FB-2DD0-4046-96B1-FB0642D1CAC4}"/>
+              </a:ext>
+            </a:extLst>
+          </p:cNvPr>
+          <p:cNvSpPr/>
+          <p:nvPr/>
+        </p:nvSpPr>
+        <p:spPr>
+          <a:xfrm>
+            <a:off x="6589941" y="4760843"/>
+            <a:ext cx="2345036" cy="675861"/>
+          </a:xfrm>
+          <a:prstGeom prst="roundRect">
+            <a:avLst/>
+          </a:prstGeom>
+          <a:solidFill>
+            <a:schemeClr val="bg1">
+              <a:lumMod val="85000"/>
+            </a:schemeClr>
+          </a:solidFill>
+        </p:spPr>
+        <p:style>
+          <a:lnRef idx="3">
+            <a:schemeClr val="lt1"/>
+          </a:lnRef>
+          <a:fillRef idx="1">
+            <a:schemeClr val="accent5"/>
+          </a:fillRef>
+          <a:effectRef idx="1">
+            <a:schemeClr val="accent5"/>
+          </a:effectRef>
+          <a:fontRef idx="minor">
+            <a:schemeClr val="lt1"/>
+          </a:fontRef>
+        </p:style>
+        <p:txBody>
+          <a:bodyPr rtlCol="0" anchor="ctr"/>
+          <a:lstStyle/>
+          <a:p>
+            <a:pPr algn="ctr"/>
+            <a:r>
+              <a:rPr lang="en-US" sz="1400" b="1" dirty="0">
+                <a:solidFill>
+                  <a:schemeClr val="bg1">
+                    <a:lumMod val="50000"/>
+                  </a:schemeClr>
+                </a:solidFill>
+              </a:rPr>
+              <a:t>Activity</a:t>
+            </a:r>
+          </a:p>
+        </p:txBody>
+      </p:sp>
+      <p:sp>
+        <p:nvSpPr>
+          <p:cNvPr id="15" name="Rectangle: Rounded Corners 14">
+            <a:extLst>
+              <a:ext uri="{FF2B5EF4-FFF2-40B4-BE49-F238E27FC236}">
+                <a16:creationId xmlns:a16="http://schemas.microsoft.com/office/drawing/2014/main" id="{15002FC6-8CBF-40B9-BE48-7276765EAC7B}"/>
+              </a:ext>
+            </a:extLst>
+          </p:cNvPr>
+          <p:cNvSpPr/>
+          <p:nvPr/>
+        </p:nvSpPr>
+        <p:spPr>
+          <a:xfrm>
+            <a:off x="9579135" y="4760843"/>
+            <a:ext cx="2345036" cy="675861"/>
+          </a:xfrm>
+          <a:prstGeom prst="roundRect">
+            <a:avLst/>
+          </a:prstGeom>
+        </p:spPr>
+        <p:style>
+          <a:lnRef idx="3">
+            <a:schemeClr val="lt1"/>
+          </a:lnRef>
+          <a:fillRef idx="1">
+            <a:schemeClr val="accent5"/>
+          </a:fillRef>
+          <a:effectRef idx="1">
+            <a:schemeClr val="accent5"/>
+          </a:effectRef>
+          <a:fontRef idx="minor">
+            <a:schemeClr val="lt1"/>
+          </a:fontRef>
+        </p:style>
+        <p:txBody>
+          <a:bodyPr rtlCol="0" anchor="ctr"/>
+          <a:lstStyle/>
+          <a:p>
+            <a:pPr algn="ctr"/>
+            <a:r>
+              <a:rPr lang="en-US" sz="1400" b="1" dirty="0"/>
+              <a:t>Pipeline</a:t>
+            </a:r>
+          </a:p>
+        </p:txBody>
+      </p:sp>
+      <p:cxnSp>
+        <p:nvCxnSpPr>
+          <p:cNvPr id="16" name="Straight Arrow Connector 15">
+            <a:extLst>
+              <a:ext uri="{FF2B5EF4-FFF2-40B4-BE49-F238E27FC236}">
+                <a16:creationId xmlns:a16="http://schemas.microsoft.com/office/drawing/2014/main" id="{0D0986D4-9AD0-454E-954B-F84D8690D873}"/>
+              </a:ext>
+            </a:extLst>
+          </p:cNvPr>
+          <p:cNvCxnSpPr>
+            <a:stCxn id="14" idx="1"/>
+            <a:endCxn id="12" idx="3"/>
+          </p:cNvCxnSpPr>
+          <p:nvPr/>
+        </p:nvCxnSpPr>
+        <p:spPr>
+          <a:xfrm flipH="1" flipV="1">
+            <a:off x="5945784" y="4422913"/>
+            <a:ext cx="644157" cy="675861"/>
+          </a:xfrm>
+          <a:prstGeom prst="straightConnector1">
+            <a:avLst/>
+          </a:prstGeom>
+          <a:ln>
+            <a:headEnd type="triangle" w="med" len="med"/>
+            <a:tailEnd type="triangle" w="med" len="med"/>
+          </a:ln>
+        </p:spPr>
+        <p:style>
+          <a:lnRef idx="3">
+            <a:schemeClr val="accent6"/>
+          </a:lnRef>
+          <a:fillRef idx="0">
+            <a:schemeClr val="accent6"/>
+          </a:fillRef>
+          <a:effectRef idx="2">
+            <a:schemeClr val="accent6"/>
+          </a:effectRef>
+          <a:fontRef idx="minor">
+            <a:schemeClr val="tx1"/>
+          </a:fontRef>
+        </p:style>
+      </p:cxnSp>
+      <p:cxnSp>
+        <p:nvCxnSpPr>
+          <p:cNvPr id="18" name="Straight Arrow Connector 17">
+            <a:extLst>
+              <a:ext uri="{FF2B5EF4-FFF2-40B4-BE49-F238E27FC236}">
+                <a16:creationId xmlns:a16="http://schemas.microsoft.com/office/drawing/2014/main" id="{D7E4D646-020F-4D8B-A079-9F6752CD4C8F}"/>
+              </a:ext>
+            </a:extLst>
+          </p:cNvPr>
+          <p:cNvCxnSpPr>
+            <a:cxnSpLocks/>
+            <a:stCxn id="14" idx="1"/>
+            <a:endCxn id="13" idx="3"/>
+          </p:cNvCxnSpPr>
+          <p:nvPr/>
+        </p:nvCxnSpPr>
+        <p:spPr>
+          <a:xfrm flipH="1">
+            <a:off x="5945784" y="5098774"/>
+            <a:ext cx="644157" cy="675861"/>
+          </a:xfrm>
+          <a:prstGeom prst="straightConnector1">
+            <a:avLst/>
+          </a:prstGeom>
+          <a:ln>
+            <a:headEnd type="triangle" w="med" len="med"/>
+            <a:tailEnd type="triangle" w="med" len="med"/>
+          </a:ln>
+        </p:spPr>
+        <p:style>
+          <a:lnRef idx="3">
+            <a:schemeClr val="accent6"/>
+          </a:lnRef>
+          <a:fillRef idx="0">
+            <a:schemeClr val="accent6"/>
+          </a:fillRef>
+          <a:effectRef idx="2">
+            <a:schemeClr val="accent6"/>
+          </a:effectRef>
+          <a:fontRef idx="minor">
+            <a:schemeClr val="tx1"/>
+          </a:fontRef>
+        </p:style>
+      </p:cxnSp>
+      <p:cxnSp>
+        <p:nvCxnSpPr>
+          <p:cNvPr id="21" name="Straight Arrow Connector 20">
+            <a:extLst>
+              <a:ext uri="{FF2B5EF4-FFF2-40B4-BE49-F238E27FC236}">
+                <a16:creationId xmlns:a16="http://schemas.microsoft.com/office/drawing/2014/main" id="{A2A86E57-DB5C-4D5E-8EB4-5A76EC301D39}"/>
+              </a:ext>
+            </a:extLst>
+          </p:cNvPr>
+          <p:cNvCxnSpPr>
+            <a:cxnSpLocks/>
+            <a:stCxn id="15" idx="1"/>
+            <a:endCxn id="14" idx="3"/>
+          </p:cNvCxnSpPr>
+          <p:nvPr/>
+        </p:nvCxnSpPr>
+        <p:spPr>
+          <a:xfrm flipH="1">
+            <a:off x="8934977" y="5098774"/>
+            <a:ext cx="644158" cy="0"/>
+          </a:xfrm>
+          <a:prstGeom prst="straightConnector1">
+            <a:avLst/>
+          </a:prstGeom>
+          <a:ln>
+            <a:tailEnd type="triangle"/>
+          </a:ln>
+        </p:spPr>
+        <p:style>
+          <a:lnRef idx="3">
+            <a:schemeClr val="accent6"/>
+          </a:lnRef>
+          <a:fillRef idx="0">
+            <a:schemeClr val="accent6"/>
+          </a:fillRef>
+          <a:effectRef idx="2">
+            <a:schemeClr val="accent6"/>
+          </a:effectRef>
+          <a:fontRef idx="minor">
+            <a:schemeClr val="tx1"/>
+          </a:fontRef>
+        </p:style>
+      </p:cxnSp>
+      <p:cxnSp>
+        <p:nvCxnSpPr>
+          <p:cNvPr id="25" name="Connector: Elbow 24">
+            <a:extLst>
+              <a:ext uri="{FF2B5EF4-FFF2-40B4-BE49-F238E27FC236}">
+                <a16:creationId xmlns:a16="http://schemas.microsoft.com/office/drawing/2014/main" id="{D2FEA663-74CD-4CCD-B332-DE2E363F75CF}"/>
+              </a:ext>
+            </a:extLst>
+          </p:cNvPr>
+          <p:cNvCxnSpPr>
+            <a:stCxn id="14" idx="1"/>
+            <a:endCxn id="9" idx="2"/>
+          </p:cNvCxnSpPr>
+          <p:nvPr/>
+        </p:nvCxnSpPr>
+        <p:spPr>
+          <a:xfrm rot="10800000">
+            <a:off x="1784073" y="4760844"/>
+            <a:ext cx="4805869" cy="337931"/>
+          </a:xfrm>
+          <a:prstGeom prst="bentConnector2">
+            <a:avLst/>
+          </a:prstGeom>
+          <a:ln>
+            <a:tailEnd type="triangle"/>
+          </a:ln>
+        </p:spPr>
+        <p:style>
+          <a:lnRef idx="3">
+            <a:schemeClr val="accent6"/>
+          </a:lnRef>
+          <a:fillRef idx="0">
+            <a:schemeClr val="accent6"/>
+          </a:fillRef>
+          <a:effectRef idx="2">
+            <a:schemeClr val="accent6"/>
+          </a:effectRef>
+          <a:fontRef idx="minor">
+            <a:schemeClr val="tx1"/>
+          </a:fontRef>
+        </p:style>
+      </p:cxnSp>
+      <p:cxnSp>
+        <p:nvCxnSpPr>
+          <p:cNvPr id="27" name="Connector: Elbow 26">
+            <a:extLst>
+              <a:ext uri="{FF2B5EF4-FFF2-40B4-BE49-F238E27FC236}">
+                <a16:creationId xmlns:a16="http://schemas.microsoft.com/office/drawing/2014/main" id="{10CD1563-4078-4C66-B0D6-943A98E16973}"/>
+              </a:ext>
+            </a:extLst>
+          </p:cNvPr>
+          <p:cNvCxnSpPr>
+            <a:cxnSpLocks/>
+            <a:stCxn id="14" idx="1"/>
+            <a:endCxn id="11" idx="0"/>
+          </p:cNvCxnSpPr>
+          <p:nvPr/>
+        </p:nvCxnSpPr>
+        <p:spPr>
+          <a:xfrm rot="10800000" flipV="1">
+            <a:off x="1784073" y="5098774"/>
+            <a:ext cx="4805869" cy="337930"/>
+          </a:xfrm>
+          <a:prstGeom prst="bentConnector2">
+            <a:avLst/>
+          </a:prstGeom>
+          <a:ln>
+            <a:tailEnd type="triangle"/>
+          </a:ln>
+        </p:spPr>
+        <p:style>
+          <a:lnRef idx="3">
+            <a:schemeClr val="accent6"/>
+          </a:lnRef>
+          <a:fillRef idx="0">
+            <a:schemeClr val="accent6"/>
+          </a:fillRef>
+          <a:effectRef idx="2">
+            <a:schemeClr val="accent6"/>
+          </a:effectRef>
+          <a:fontRef idx="minor">
+            <a:schemeClr val="tx1"/>
+          </a:fontRef>
+        </p:style>
+      </p:cxnSp>
+      <p:cxnSp>
+        <p:nvCxnSpPr>
+          <p:cNvPr id="30" name="Straight Arrow Connector 29">
+            <a:extLst>
+              <a:ext uri="{FF2B5EF4-FFF2-40B4-BE49-F238E27FC236}">
+                <a16:creationId xmlns:a16="http://schemas.microsoft.com/office/drawing/2014/main" id="{B329C559-6857-4F81-B592-02FB522C6296}"/>
+              </a:ext>
+            </a:extLst>
+          </p:cNvPr>
+          <p:cNvCxnSpPr>
+            <a:cxnSpLocks/>
+            <a:stCxn id="12" idx="1"/>
+            <a:endCxn id="9" idx="3"/>
+          </p:cNvCxnSpPr>
+          <p:nvPr/>
+        </p:nvCxnSpPr>
+        <p:spPr>
+          <a:xfrm flipH="1">
+            <a:off x="2956590" y="4422913"/>
+            <a:ext cx="644158" cy="0"/>
+          </a:xfrm>
+          <a:prstGeom prst="straightConnector1">
+            <a:avLst/>
+          </a:prstGeom>
+          <a:ln>
+            <a:tailEnd type="triangle"/>
+          </a:ln>
+        </p:spPr>
+        <p:style>
+          <a:lnRef idx="3">
+            <a:schemeClr val="accent6"/>
+          </a:lnRef>
+          <a:fillRef idx="0">
+            <a:schemeClr val="accent6"/>
+          </a:fillRef>
+          <a:effectRef idx="2">
+            <a:schemeClr val="accent6"/>
+          </a:effectRef>
+          <a:fontRef idx="minor">
+            <a:schemeClr val="tx1"/>
+          </a:fontRef>
+        </p:style>
+      </p:cxnSp>
+      <p:cxnSp>
+        <p:nvCxnSpPr>
+          <p:cNvPr id="33" name="Straight Arrow Connector 32">
+            <a:extLst>
+              <a:ext uri="{FF2B5EF4-FFF2-40B4-BE49-F238E27FC236}">
+                <a16:creationId xmlns:a16="http://schemas.microsoft.com/office/drawing/2014/main" id="{5400DE88-D188-4D1A-92B5-BE5B36AC90AB}"/>
+              </a:ext>
+            </a:extLst>
+          </p:cNvPr>
+          <p:cNvCxnSpPr>
+            <a:cxnSpLocks/>
+            <a:stCxn id="13" idx="1"/>
+            <a:endCxn id="11" idx="3"/>
+          </p:cNvCxnSpPr>
+          <p:nvPr/>
+        </p:nvCxnSpPr>
+        <p:spPr>
+          <a:xfrm flipH="1">
+            <a:off x="2956590" y="5774635"/>
+            <a:ext cx="644158" cy="0"/>
+          </a:xfrm>
+          <a:prstGeom prst="straightConnector1">
+            <a:avLst/>
+          </a:prstGeom>
+          <a:ln>
+            <a:tailEnd type="triangle"/>
+          </a:ln>
+        </p:spPr>
+        <p:style>
+          <a:lnRef idx="3">
+            <a:schemeClr val="accent6"/>
+          </a:lnRef>
+          <a:fillRef idx="0">
+            <a:schemeClr val="accent6"/>
+          </a:fillRef>
+          <a:effectRef idx="2">
+            <a:schemeClr val="accent6"/>
+          </a:effectRef>
+          <a:fontRef idx="minor">
+            <a:schemeClr val="tx1"/>
+          </a:fontRef>
+        </p:style>
+      </p:cxnSp>
+      <p:sp>
+        <p:nvSpPr>
+          <p:cNvPr id="39" name="TextBox 38">
+            <a:extLst>
+              <a:ext uri="{FF2B5EF4-FFF2-40B4-BE49-F238E27FC236}">
+                <a16:creationId xmlns:a16="http://schemas.microsoft.com/office/drawing/2014/main" id="{5ABD1748-C645-41AD-BC4B-28892A90C4EE}"/>
+              </a:ext>
+            </a:extLst>
+          </p:cNvPr>
+          <p:cNvSpPr txBox="1"/>
+          <p:nvPr/>
+        </p:nvSpPr>
+        <p:spPr>
+          <a:xfrm>
+            <a:off x="1716722" y="4867941"/>
+            <a:ext cx="879468" cy="230832"/>
+          </a:xfrm>
+          <a:prstGeom prst="rect">
+            <a:avLst/>
+          </a:prstGeom>
+          <a:noFill/>
+        </p:spPr>
+        <p:txBody>
+          <a:bodyPr wrap="square" rtlCol="0">
+            <a:spAutoFit/>
+          </a:bodyPr>
+          <a:lstStyle/>
+          <a:p>
+            <a:pPr algn="ctr"/>
+            <a:r>
+              <a:rPr lang="en-US" sz="900" b="1" dirty="0">
+                <a:solidFill>
+                  <a:schemeClr val="accent6"/>
+                </a:solidFill>
+              </a:rPr>
+              <a:t>Runs on</a:t>
+            </a:r>
+          </a:p>
+        </p:txBody>
+      </p:sp>
+      <p:sp>
+        <p:nvSpPr>
+          <p:cNvPr id="41" name="TextBox 40">
+            <a:extLst>
+              <a:ext uri="{FF2B5EF4-FFF2-40B4-BE49-F238E27FC236}">
+                <a16:creationId xmlns:a16="http://schemas.microsoft.com/office/drawing/2014/main" id="{3077A8D7-A1D7-4940-80EE-458D027F5856}"/>
+              </a:ext>
+            </a:extLst>
+          </p:cNvPr>
+          <p:cNvSpPr txBox="1"/>
+          <p:nvPr/>
+        </p:nvSpPr>
+        <p:spPr>
+          <a:xfrm>
+            <a:off x="2838935" y="4192080"/>
+            <a:ext cx="879468" cy="230832"/>
+          </a:xfrm>
+          <a:prstGeom prst="rect">
+            <a:avLst/>
+          </a:prstGeom>
+          <a:noFill/>
+        </p:spPr>
+        <p:txBody>
+          <a:bodyPr wrap="square" rtlCol="0">
+            <a:spAutoFit/>
+          </a:bodyPr>
+          <a:lstStyle/>
+          <a:p>
+            <a:pPr algn="ctr"/>
+            <a:r>
+              <a:rPr lang="en-US" sz="900" b="1" dirty="0">
+                <a:solidFill>
+                  <a:schemeClr val="accent6"/>
+                </a:solidFill>
+              </a:rPr>
+              <a:t>IN</a:t>
+            </a:r>
+          </a:p>
+        </p:txBody>
+      </p:sp>
+      <p:sp>
+        <p:nvSpPr>
+          <p:cNvPr id="42" name="TextBox 41">
+            <a:extLst>
+              <a:ext uri="{FF2B5EF4-FFF2-40B4-BE49-F238E27FC236}">
+                <a16:creationId xmlns:a16="http://schemas.microsoft.com/office/drawing/2014/main" id="{9E11BD76-6109-4BD1-AE17-9F2251DFD4A7}"/>
+              </a:ext>
+            </a:extLst>
+          </p:cNvPr>
+          <p:cNvSpPr txBox="1"/>
+          <p:nvPr/>
+        </p:nvSpPr>
+        <p:spPr>
+          <a:xfrm>
+            <a:off x="2838935" y="5531630"/>
+            <a:ext cx="879468" cy="230832"/>
+          </a:xfrm>
+          <a:prstGeom prst="rect">
+            <a:avLst/>
+          </a:prstGeom>
+          <a:noFill/>
+        </p:spPr>
+        <p:txBody>
+          <a:bodyPr wrap="square" rtlCol="0">
+            <a:spAutoFit/>
+          </a:bodyPr>
+          <a:lstStyle/>
+          <a:p>
+            <a:pPr algn="ctr"/>
+            <a:r>
+              <a:rPr lang="en-US" sz="900" b="1" dirty="0">
+                <a:solidFill>
+                  <a:schemeClr val="accent6"/>
+                </a:solidFill>
+              </a:rPr>
+              <a:t>IN</a:t>
+            </a:r>
+          </a:p>
+        </p:txBody>
+      </p:sp>
+      <p:sp>
+        <p:nvSpPr>
+          <p:cNvPr id="44" name="TextBox 43">
+            <a:extLst>
+              <a:ext uri="{FF2B5EF4-FFF2-40B4-BE49-F238E27FC236}">
+                <a16:creationId xmlns:a16="http://schemas.microsoft.com/office/drawing/2014/main" id="{5CBD0CBD-32A1-4178-9030-43A194809507}"/>
+              </a:ext>
+            </a:extLst>
+          </p:cNvPr>
+          <p:cNvSpPr txBox="1"/>
+          <p:nvPr/>
+        </p:nvSpPr>
+        <p:spPr>
+          <a:xfrm>
+            <a:off x="5945783" y="5475850"/>
+            <a:ext cx="879468" cy="507831"/>
+          </a:xfrm>
+          <a:prstGeom prst="rect">
+            <a:avLst/>
+          </a:prstGeom>
+          <a:noFill/>
+        </p:spPr>
+        <p:txBody>
+          <a:bodyPr wrap="square" rtlCol="0">
+            <a:spAutoFit/>
+          </a:bodyPr>
+          <a:lstStyle/>
+          <a:p>
+            <a:pPr algn="ctr"/>
+            <a:r>
+              <a:rPr lang="en-US" sz="900" b="1" dirty="0">
+                <a:solidFill>
+                  <a:schemeClr val="accent6"/>
+                </a:solidFill>
+              </a:rPr>
+              <a:t>Produce</a:t>
+            </a:r>
+          </a:p>
+          <a:p>
+            <a:pPr algn="ctr"/>
+            <a:r>
+              <a:rPr lang="en-US" sz="900" b="1" dirty="0">
+                <a:solidFill>
+                  <a:schemeClr val="accent6"/>
+                </a:solidFill>
+              </a:rPr>
+              <a:t>/ </a:t>
+            </a:r>
+          </a:p>
+          <a:p>
+            <a:pPr algn="ctr"/>
+            <a:r>
+              <a:rPr lang="en-US" sz="900" b="1" dirty="0" err="1">
+                <a:solidFill>
+                  <a:schemeClr val="accent6"/>
+                </a:solidFill>
+              </a:rPr>
+              <a:t>Concume</a:t>
+            </a:r>
+            <a:endParaRPr lang="en-US" sz="900" b="1" dirty="0">
+              <a:solidFill>
+                <a:schemeClr val="accent6"/>
+              </a:solidFill>
+            </a:endParaRPr>
+          </a:p>
+        </p:txBody>
+      </p:sp>
+      <p:sp>
+        <p:nvSpPr>
+          <p:cNvPr id="45" name="TextBox 44">
+            <a:extLst>
+              <a:ext uri="{FF2B5EF4-FFF2-40B4-BE49-F238E27FC236}">
+                <a16:creationId xmlns:a16="http://schemas.microsoft.com/office/drawing/2014/main" id="{C60E1BCF-77DF-43C4-92C3-3ECFD6A30CFF}"/>
+              </a:ext>
+            </a:extLst>
+          </p:cNvPr>
+          <p:cNvSpPr txBox="1"/>
+          <p:nvPr/>
+        </p:nvSpPr>
+        <p:spPr>
+          <a:xfrm>
+            <a:off x="5945783" y="4253011"/>
+            <a:ext cx="879468" cy="507831"/>
+          </a:xfrm>
+          <a:prstGeom prst="rect">
+            <a:avLst/>
+          </a:prstGeom>
+          <a:noFill/>
+        </p:spPr>
+        <p:txBody>
+          <a:bodyPr wrap="square" rtlCol="0">
+            <a:spAutoFit/>
+          </a:bodyPr>
+          <a:lstStyle/>
+          <a:p>
+            <a:pPr algn="ctr"/>
+            <a:r>
+              <a:rPr lang="en-US" sz="900" b="1" dirty="0">
+                <a:solidFill>
+                  <a:schemeClr val="accent6"/>
+                </a:solidFill>
+              </a:rPr>
+              <a:t>Produce</a:t>
+            </a:r>
+          </a:p>
+          <a:p>
+            <a:pPr algn="ctr"/>
+            <a:r>
+              <a:rPr lang="en-US" sz="900" b="1" dirty="0">
+                <a:solidFill>
+                  <a:schemeClr val="accent6"/>
+                </a:solidFill>
+              </a:rPr>
+              <a:t>/ </a:t>
+            </a:r>
+          </a:p>
+          <a:p>
+            <a:pPr algn="ctr"/>
+            <a:r>
+              <a:rPr lang="en-US" sz="900" b="1" dirty="0" err="1">
+                <a:solidFill>
+                  <a:schemeClr val="accent6"/>
+                </a:solidFill>
+              </a:rPr>
+              <a:t>Concume</a:t>
+            </a:r>
+            <a:endParaRPr lang="en-US" sz="900" b="1" dirty="0">
+              <a:solidFill>
+                <a:schemeClr val="accent6"/>
+              </a:solidFill>
+            </a:endParaRPr>
+          </a:p>
+        </p:txBody>
+      </p:sp>
+      <p:sp>
+        <p:nvSpPr>
+          <p:cNvPr id="46" name="TextBox 45">
+            <a:extLst>
+              <a:ext uri="{FF2B5EF4-FFF2-40B4-BE49-F238E27FC236}">
+                <a16:creationId xmlns:a16="http://schemas.microsoft.com/office/drawing/2014/main" id="{D9CD7322-C34E-43BA-B5E6-83793EDD9EC3}"/>
+              </a:ext>
+            </a:extLst>
+          </p:cNvPr>
+          <p:cNvSpPr txBox="1"/>
+          <p:nvPr/>
+        </p:nvSpPr>
+        <p:spPr>
+          <a:xfrm>
+            <a:off x="8817322" y="4753635"/>
+            <a:ext cx="879468" cy="369332"/>
+          </a:xfrm>
+          <a:prstGeom prst="rect">
+            <a:avLst/>
+          </a:prstGeom>
+          <a:noFill/>
+        </p:spPr>
+        <p:txBody>
+          <a:bodyPr wrap="square" rtlCol="0">
+            <a:spAutoFit/>
+          </a:bodyPr>
+          <a:lstStyle/>
+          <a:p>
+            <a:pPr algn="ctr"/>
+            <a:r>
+              <a:rPr lang="en-US" sz="900" b="1" dirty="0">
+                <a:solidFill>
+                  <a:schemeClr val="accent6"/>
+                </a:solidFill>
+              </a:rPr>
+              <a:t>Logical </a:t>
+            </a:r>
+          </a:p>
+          <a:p>
+            <a:pPr algn="ctr"/>
+            <a:r>
+              <a:rPr lang="en-US" sz="900" b="1" dirty="0">
+                <a:solidFill>
+                  <a:schemeClr val="accent6"/>
+                </a:solidFill>
+              </a:rPr>
+              <a:t>Group</a:t>
+            </a:r>
+          </a:p>
+        </p:txBody>
+      </p:sp>
+    </p:spTree>
+    <p:extLst>
+      <p:ext uri="{BB962C8B-B14F-4D97-AF65-F5344CB8AC3E}">
+        <p14:creationId xmlns:p14="http://schemas.microsoft.com/office/powerpoint/2010/main" val="1549081979"/>
+      </p:ext>
+    </p:extLst>
+  </p:cSld>
+  <p:clrMapOvr>
+    <a:masterClrMapping/>
+  </p:clrMapOvr>
+</p:sld>
+</file>
+
+<file path=ppt/slides/slide7.xml><?xml version="1.0" encoding="utf-8"?>
+<p:sld xmlns:a="http://schemas.openxmlformats.org/drawingml/2006/main" xmlns:r="http://schemas.openxmlformats.org/officeDocument/2006/relationships" xmlns:p="http://schemas.openxmlformats.org/presentationml/2006/main">
+  <p:cSld>
+    <p:spTree>
+      <p:nvGrpSpPr>
+        <p:cNvPr id="1" name=""/>
+        <p:cNvGrpSpPr/>
+        <p:nvPr/>
+      </p:nvGrpSpPr>
+      <p:grpSpPr>
+        <a:xfrm>
+          <a:off x="0" y="0"/>
+          <a:ext cx="0" cy="0"/>
+          <a:chOff x="0" y="0"/>
+          <a:chExt cx="0" cy="0"/>
+        </a:xfrm>
+      </p:grpSpPr>
+      <p:sp>
+        <p:nvSpPr>
+          <p:cNvPr id="2" name="Title 1">
+            <a:extLst>
+              <a:ext uri="{FF2B5EF4-FFF2-40B4-BE49-F238E27FC236}">
                 <a16:creationId xmlns:a16="http://schemas.microsoft.com/office/drawing/2014/main" id="{5DED85AB-E71C-4924-A3E1-2C87A5234DB5}"/>
               </a:ext>
             </a:extLst>
@@ -15445,7 +18425,7 @@
 </p:sld>
 </file>
 
-<file path=ppt/slides/slide7.xml><?xml version="1.0" encoding="utf-8"?>
+<file path=ppt/slides/slide8.xml><?xml version="1.0" encoding="utf-8"?>
 <p:sld xmlns:a="http://schemas.openxmlformats.org/drawingml/2006/main" xmlns:r="http://schemas.openxmlformats.org/officeDocument/2006/relationships" xmlns:p="http://schemas.openxmlformats.org/presentationml/2006/main">
   <p:cSld>
     <p:spTree>
@@ -17017,7 +19997,7 @@
 </p:sld>
 </file>
 
-<file path=ppt/slides/slide8.xml><?xml version="1.0" encoding="utf-8"?>
+<file path=ppt/slides/slide9.xml><?xml version="1.0" encoding="utf-8"?>
 <p:sld xmlns:a="http://schemas.openxmlformats.org/drawingml/2006/main" xmlns:r="http://schemas.openxmlformats.org/officeDocument/2006/relationships" xmlns:p="http://schemas.openxmlformats.org/presentationml/2006/main">
   <p:cSld>
     <p:spTree>
@@ -18698,1869 +21678,6 @@
     <p:extLst>
       <p:ext uri="{BB962C8B-B14F-4D97-AF65-F5344CB8AC3E}">
         <p14:creationId xmlns:p14="http://schemas.microsoft.com/office/powerpoint/2010/main" val="1991542469"/>
-      </p:ext>
-    </p:extLst>
-  </p:cSld>
-  <p:clrMapOvr>
-    <a:masterClrMapping/>
-  </p:clrMapOvr>
-</p:sld>
-</file>
-
-<file path=ppt/slides/slide9.xml><?xml version="1.0" encoding="utf-8"?>
-<p:sld xmlns:a="http://schemas.openxmlformats.org/drawingml/2006/main" xmlns:r="http://schemas.openxmlformats.org/officeDocument/2006/relationships" xmlns:p="http://schemas.openxmlformats.org/presentationml/2006/main">
-  <p:cSld>
-    <p:spTree>
-      <p:nvGrpSpPr>
-        <p:cNvPr id="1" name=""/>
-        <p:cNvGrpSpPr/>
-        <p:nvPr/>
-      </p:nvGrpSpPr>
-      <p:grpSpPr>
-        <a:xfrm>
-          <a:off x="0" y="0"/>
-          <a:ext cx="0" cy="0"/>
-          <a:chOff x="0" y="0"/>
-          <a:chExt cx="0" cy="0"/>
-        </a:xfrm>
-      </p:grpSpPr>
-      <p:sp>
-        <p:nvSpPr>
-          <p:cNvPr id="2" name="Title 1">
-            <a:extLst>
-              <a:ext uri="{FF2B5EF4-FFF2-40B4-BE49-F238E27FC236}">
-                <a16:creationId xmlns:a16="http://schemas.microsoft.com/office/drawing/2014/main" id="{EB121C98-1EA4-4ACE-8817-B3D6E75BCB48}"/>
-              </a:ext>
-            </a:extLst>
-          </p:cNvPr>
-          <p:cNvSpPr>
-            <a:spLocks noGrp="1"/>
-          </p:cNvSpPr>
-          <p:nvPr>
-            <p:ph type="title"/>
-          </p:nvPr>
-        </p:nvSpPr>
-        <p:spPr/>
-        <p:txBody>
-          <a:bodyPr/>
-          <a:lstStyle/>
-          <a:p>
-            <a:r>
-              <a:rPr lang="en-US" dirty="0"/>
-              <a:t>5. Run ML in a Batch</a:t>
-            </a:r>
-          </a:p>
-        </p:txBody>
-      </p:sp>
-      <p:sp>
-        <p:nvSpPr>
-          <p:cNvPr id="4" name="Text Placeholder 3">
-            <a:extLst>
-              <a:ext uri="{FF2B5EF4-FFF2-40B4-BE49-F238E27FC236}">
-                <a16:creationId xmlns:a16="http://schemas.microsoft.com/office/drawing/2014/main" id="{506E42F2-0333-4672-B9B3-41D33D2DC1BD}"/>
-              </a:ext>
-            </a:extLst>
-          </p:cNvPr>
-          <p:cNvSpPr>
-            <a:spLocks noGrp="1"/>
-          </p:cNvSpPr>
-          <p:nvPr>
-            <p:ph type="body" sz="quarter" idx="10"/>
-          </p:nvPr>
-        </p:nvSpPr>
-        <p:spPr/>
-        <p:txBody>
-          <a:bodyPr/>
-          <a:lstStyle/>
-          <a:p>
-            <a:endParaRPr lang="en-US"/>
-          </a:p>
-        </p:txBody>
-      </p:sp>
-      <p:sp>
-        <p:nvSpPr>
-          <p:cNvPr id="5" name="TextBox 4">
-            <a:extLst>
-              <a:ext uri="{FF2B5EF4-FFF2-40B4-BE49-F238E27FC236}">
-                <a16:creationId xmlns:a16="http://schemas.microsoft.com/office/drawing/2014/main" id="{901A374F-E220-4BE3-BBB0-4A8099C4815D}"/>
-              </a:ext>
-            </a:extLst>
-          </p:cNvPr>
-          <p:cNvSpPr txBox="1"/>
-          <p:nvPr/>
-        </p:nvSpPr>
-        <p:spPr>
-          <a:xfrm>
-            <a:off x="666841" y="2999758"/>
-            <a:ext cx="967418" cy="253916"/>
-          </a:xfrm>
-          <a:prstGeom prst="rect">
-            <a:avLst/>
-          </a:prstGeom>
-          <a:noFill/>
-        </p:spPr>
-        <p:txBody>
-          <a:bodyPr wrap="square" lIns="91440" tIns="45720" rIns="91440" bIns="45720" rtlCol="0">
-            <a:spAutoFit/>
-          </a:bodyPr>
-          <a:lstStyle/>
-          <a:p>
-            <a:pPr marL="0" marR="0" lvl="0" indent="0" algn="ctr" defTabSz="932597" rtl="0" eaLnBrk="1" fontAlgn="auto" latinLnBrk="0" hangingPunct="1">
-              <a:lnSpc>
-                <a:spcPct val="100000"/>
-              </a:lnSpc>
-              <a:spcBef>
-                <a:spcPts val="0"/>
-              </a:spcBef>
-              <a:spcAft>
-                <a:spcPts val="0"/>
-              </a:spcAft>
-              <a:buClrTx/>
-              <a:buSzTx/>
-              <a:buFontTx/>
-              <a:buNone/>
-              <a:tabLst/>
-              <a:defRPr/>
-            </a:pPr>
-            <a:r>
-              <a:rPr kumimoji="0" lang="en-US" sz="1050" b="0" i="0" u="none" strike="noStrike" kern="0" cap="none" spc="0" normalizeH="0" baseline="0" noProof="0" dirty="0">
-                <a:ln>
-                  <a:noFill/>
-                </a:ln>
-                <a:solidFill>
-                  <a:srgbClr val="505050"/>
-                </a:solidFill>
-                <a:effectLst/>
-                <a:uLnTx/>
-                <a:uFillTx/>
-                <a:latin typeface="Segoe UI Semibold" panose="020B0702040204020203" pitchFamily="34" charset="0"/>
-                <a:ea typeface="+mn-ea"/>
-                <a:cs typeface="Segoe UI Semibold" panose="020B0702040204020203" pitchFamily="34" charset="0"/>
-              </a:rPr>
-              <a:t>Web Service</a:t>
-            </a:r>
-          </a:p>
-        </p:txBody>
-      </p:sp>
-      <p:pic>
-        <p:nvPicPr>
-          <p:cNvPr id="6" name="Content Placeholder 11">
-            <a:extLst>
-              <a:ext uri="{FF2B5EF4-FFF2-40B4-BE49-F238E27FC236}">
-                <a16:creationId xmlns:a16="http://schemas.microsoft.com/office/drawing/2014/main" id="{E273149E-4D55-4B42-B3DA-113E868679CA}"/>
-              </a:ext>
-            </a:extLst>
-          </p:cNvPr>
-          <p:cNvPicPr>
-            <a:picLocks noChangeAspect="1"/>
-          </p:cNvPicPr>
-          <p:nvPr/>
-        </p:nvPicPr>
-        <p:blipFill>
-          <a:blip r:embed="rId2">
-            <a:extLst>
-              <a:ext uri="{28A0092B-C50C-407E-A947-70E740481C1C}">
-                <a14:useLocalDpi xmlns:a14="http://schemas.microsoft.com/office/drawing/2010/main" val="0"/>
-              </a:ext>
-            </a:extLst>
-          </a:blip>
-          <a:stretch>
-            <a:fillRect/>
-          </a:stretch>
-        </p:blipFill>
-        <p:spPr>
-          <a:xfrm>
-            <a:off x="760405" y="2125839"/>
-            <a:ext cx="780290" cy="780290"/>
-          </a:xfrm>
-          <a:prstGeom prst="rect">
-            <a:avLst/>
-          </a:prstGeom>
-        </p:spPr>
-      </p:pic>
-      <p:sp>
-        <p:nvSpPr>
-          <p:cNvPr id="7" name="Rectangle 6">
-            <a:extLst>
-              <a:ext uri="{FF2B5EF4-FFF2-40B4-BE49-F238E27FC236}">
-                <a16:creationId xmlns:a16="http://schemas.microsoft.com/office/drawing/2014/main" id="{FCA18B42-CFA3-428D-BD8B-8447A88B824B}"/>
-              </a:ext>
-            </a:extLst>
-          </p:cNvPr>
-          <p:cNvSpPr/>
-          <p:nvPr/>
-        </p:nvSpPr>
-        <p:spPr bwMode="auto">
-          <a:xfrm>
-            <a:off x="2008282" y="1312066"/>
-            <a:ext cx="8175437" cy="4023555"/>
-          </a:xfrm>
-          <a:prstGeom prst="rect">
-            <a:avLst/>
-          </a:prstGeom>
-          <a:noFill/>
-          <a:ln w="12700">
-            <a:solidFill>
-              <a:schemeClr val="tx2"/>
-            </a:solidFill>
-            <a:headEnd type="none" w="med" len="med"/>
-            <a:tailEnd type="none" w="med" len="med"/>
-          </a:ln>
-          <a:effectLst/>
-        </p:spPr>
-        <p:style>
-          <a:lnRef idx="1">
-            <a:schemeClr val="accent2"/>
-          </a:lnRef>
-          <a:fillRef idx="3">
-            <a:schemeClr val="accent2"/>
-          </a:fillRef>
-          <a:effectRef idx="2">
-            <a:schemeClr val="accent2"/>
-          </a:effectRef>
-          <a:fontRef idx="minor">
-            <a:schemeClr val="lt1"/>
-          </a:fontRef>
-        </p:style>
-        <p:txBody>
-          <a:bodyPr rot="0" spcFirstLastPara="0" vertOverflow="overflow" horzOverflow="overflow" vert="horz" wrap="square" lIns="182880" tIns="146304" rIns="182880" bIns="146304" numCol="1" spcCol="0" rtlCol="0" fromWordArt="0" anchor="t" anchorCtr="0" forceAA="0" compatLnSpc="1">
-            <a:prstTxWarp prst="textNoShape">
-              <a:avLst/>
-            </a:prstTxWarp>
-            <a:noAutofit/>
-          </a:bodyPr>
-          <a:lstStyle/>
-          <a:p>
-            <a:pPr marL="0" marR="0" lvl="0" indent="0" algn="ctr" defTabSz="932472" rtl="0" eaLnBrk="1" fontAlgn="base" latinLnBrk="0" hangingPunct="1">
-              <a:lnSpc>
-                <a:spcPct val="90000"/>
-              </a:lnSpc>
-              <a:spcBef>
-                <a:spcPct val="0"/>
-              </a:spcBef>
-              <a:spcAft>
-                <a:spcPct val="0"/>
-              </a:spcAft>
-              <a:buClrTx/>
-              <a:buSzTx/>
-              <a:buFontTx/>
-              <a:buNone/>
-              <a:tabLst/>
-              <a:defRPr/>
-            </a:pPr>
-            <a:endParaRPr kumimoji="0" lang="en-US" sz="2400" b="0" i="0" u="none" strike="noStrike" kern="1200" cap="none" spc="0" normalizeH="0" baseline="0" noProof="0" dirty="0">
-              <a:ln>
-                <a:noFill/>
-              </a:ln>
-              <a:gradFill>
-                <a:gsLst>
-                  <a:gs pos="0">
-                    <a:srgbClr val="FFFFFF"/>
-                  </a:gs>
-                  <a:gs pos="100000">
-                    <a:srgbClr val="FFFFFF"/>
-                  </a:gs>
-                </a:gsLst>
-                <a:lin ang="5400000" scaled="0"/>
-              </a:gradFill>
-              <a:effectLst/>
-              <a:uLnTx/>
-              <a:uFillTx/>
-              <a:latin typeface="Segoe UI"/>
-              <a:ea typeface="Segoe UI" pitchFamily="34" charset="0"/>
-              <a:cs typeface="Segoe UI" pitchFamily="34" charset="0"/>
-            </a:endParaRPr>
-          </a:p>
-        </p:txBody>
-      </p:sp>
-      <p:sp>
-        <p:nvSpPr>
-          <p:cNvPr id="8" name="Rectangle 7">
-            <a:extLst>
-              <a:ext uri="{FF2B5EF4-FFF2-40B4-BE49-F238E27FC236}">
-                <a16:creationId xmlns:a16="http://schemas.microsoft.com/office/drawing/2014/main" id="{B5C8E2AE-611C-4FAE-8AE6-F23DD936E05A}"/>
-              </a:ext>
-            </a:extLst>
-          </p:cNvPr>
-          <p:cNvSpPr/>
-          <p:nvPr/>
-        </p:nvSpPr>
-        <p:spPr bwMode="auto">
-          <a:xfrm>
-            <a:off x="8430647" y="1514811"/>
-            <a:ext cx="1432897" cy="307777"/>
-          </a:xfrm>
-          <a:prstGeom prst="rect">
-            <a:avLst/>
-          </a:prstGeom>
-          <a:noFill/>
-          <a:ln w="3175">
-            <a:noFill/>
-          </a:ln>
-        </p:spPr>
-        <p:style>
-          <a:lnRef idx="0">
-            <a:scrgbClr r="0" g="0" b="0"/>
-          </a:lnRef>
-          <a:fillRef idx="0">
-            <a:scrgbClr r="0" g="0" b="0"/>
-          </a:fillRef>
-          <a:effectRef idx="0">
-            <a:scrgbClr r="0" g="0" b="0"/>
-          </a:effectRef>
-          <a:fontRef idx="minor">
-            <a:schemeClr val="lt1"/>
-          </a:fontRef>
-        </p:style>
-        <p:txBody>
-          <a:bodyPr spcFirstLastPara="0" vert="horz" wrap="square" lIns="91440" tIns="45720" rIns="91440" bIns="45720" numCol="1" spcCol="1270" anchor="t" anchorCtr="0">
-            <a:spAutoFit/>
-          </a:bodyPr>
-          <a:lstStyle/>
-          <a:p>
-            <a:pPr marL="0" marR="0" lvl="0" indent="0" algn="ctr" defTabSz="710593" rtl="0" eaLnBrk="1" fontAlgn="auto" latinLnBrk="0" hangingPunct="1">
-              <a:lnSpc>
-                <a:spcPct val="100000"/>
-              </a:lnSpc>
-              <a:spcBef>
-                <a:spcPct val="0"/>
-              </a:spcBef>
-              <a:spcAft>
-                <a:spcPct val="35000"/>
-              </a:spcAft>
-              <a:buClrTx/>
-              <a:buSzTx/>
-              <a:buFontTx/>
-              <a:buNone/>
-              <a:tabLst/>
-              <a:defRPr/>
-            </a:pPr>
-            <a:r>
-              <a:rPr kumimoji="0" lang="en-US" sz="1400" b="0" i="0" u="none" strike="noStrike" kern="0" cap="none" spc="0" normalizeH="0" baseline="0" noProof="0" dirty="0">
-                <a:ln>
-                  <a:noFill/>
-                </a:ln>
-                <a:solidFill>
-                  <a:srgbClr val="0078D7"/>
-                </a:solidFill>
-                <a:effectLst/>
-                <a:uLnTx/>
-                <a:uFillTx/>
-                <a:latin typeface="Segoe UI Semibold" panose="020B0702040204020203" pitchFamily="34" charset="0"/>
-                <a:ea typeface="+mn-ea"/>
-                <a:cs typeface="Segoe UI Semibold" panose="020B0702040204020203" pitchFamily="34" charset="0"/>
-              </a:rPr>
-              <a:t>Model &amp; Serve</a:t>
-            </a:r>
-          </a:p>
-        </p:txBody>
-      </p:sp>
-      <p:sp>
-        <p:nvSpPr>
-          <p:cNvPr id="9" name="Rectangle 8">
-            <a:extLst>
-              <a:ext uri="{FF2B5EF4-FFF2-40B4-BE49-F238E27FC236}">
-                <a16:creationId xmlns:a16="http://schemas.microsoft.com/office/drawing/2014/main" id="{32C056B2-DAC0-4210-899A-0DD3FE71DBFF}"/>
-              </a:ext>
-            </a:extLst>
-          </p:cNvPr>
-          <p:cNvSpPr/>
-          <p:nvPr/>
-        </p:nvSpPr>
-        <p:spPr bwMode="auto">
-          <a:xfrm>
-            <a:off x="6423624" y="1514811"/>
-            <a:ext cx="1377453" cy="307777"/>
-          </a:xfrm>
-          <a:prstGeom prst="rect">
-            <a:avLst/>
-          </a:prstGeom>
-          <a:noFill/>
-          <a:ln w="3175">
-            <a:noFill/>
-          </a:ln>
-        </p:spPr>
-        <p:style>
-          <a:lnRef idx="0">
-            <a:scrgbClr r="0" g="0" b="0"/>
-          </a:lnRef>
-          <a:fillRef idx="0">
-            <a:scrgbClr r="0" g="0" b="0"/>
-          </a:fillRef>
-          <a:effectRef idx="0">
-            <a:scrgbClr r="0" g="0" b="0"/>
-          </a:effectRef>
-          <a:fontRef idx="minor">
-            <a:schemeClr val="lt1"/>
-          </a:fontRef>
-        </p:style>
-        <p:txBody>
-          <a:bodyPr spcFirstLastPara="0" vert="horz" wrap="square" lIns="91440" tIns="45720" rIns="91440" bIns="45720" numCol="1" spcCol="1270" anchor="t" anchorCtr="0">
-            <a:spAutoFit/>
-          </a:bodyPr>
-          <a:lstStyle/>
-          <a:p>
-            <a:pPr marL="0" marR="0" lvl="0" indent="0" algn="ctr" defTabSz="710593" rtl="0" eaLnBrk="1" fontAlgn="auto" latinLnBrk="0" hangingPunct="1">
-              <a:lnSpc>
-                <a:spcPct val="100000"/>
-              </a:lnSpc>
-              <a:spcBef>
-                <a:spcPct val="0"/>
-              </a:spcBef>
-              <a:spcAft>
-                <a:spcPct val="35000"/>
-              </a:spcAft>
-              <a:buClrTx/>
-              <a:buSzTx/>
-              <a:buFontTx/>
-              <a:buNone/>
-              <a:tabLst/>
-              <a:defRPr/>
-            </a:pPr>
-            <a:r>
-              <a:rPr kumimoji="0" lang="en-US" sz="1400" b="0" i="0" u="none" strike="noStrike" kern="0" cap="none" spc="0" normalizeH="0" baseline="0" noProof="0" dirty="0">
-                <a:ln>
-                  <a:noFill/>
-                </a:ln>
-                <a:solidFill>
-                  <a:srgbClr val="0078D7"/>
-                </a:solidFill>
-                <a:effectLst/>
-                <a:uLnTx/>
-                <a:uFillTx/>
-                <a:latin typeface="Segoe UI Semibold" panose="020B0702040204020203" pitchFamily="34" charset="0"/>
-                <a:ea typeface="+mn-ea"/>
-                <a:cs typeface="Segoe UI Semibold" panose="020B0702040204020203" pitchFamily="34" charset="0"/>
-              </a:rPr>
-              <a:t>Prep &amp; Train</a:t>
-            </a:r>
-          </a:p>
-        </p:txBody>
-      </p:sp>
-      <p:sp>
-        <p:nvSpPr>
-          <p:cNvPr id="10" name="Rectangle 9">
-            <a:extLst>
-              <a:ext uri="{FF2B5EF4-FFF2-40B4-BE49-F238E27FC236}">
-                <a16:creationId xmlns:a16="http://schemas.microsoft.com/office/drawing/2014/main" id="{D77565BA-EC05-4935-B6C0-36E19D7A0AE5}"/>
-              </a:ext>
-            </a:extLst>
-          </p:cNvPr>
-          <p:cNvSpPr/>
-          <p:nvPr/>
-        </p:nvSpPr>
-        <p:spPr bwMode="auto">
-          <a:xfrm>
-            <a:off x="4379443" y="1514811"/>
-            <a:ext cx="1392554" cy="307777"/>
-          </a:xfrm>
-          <a:prstGeom prst="rect">
-            <a:avLst/>
-          </a:prstGeom>
-          <a:noFill/>
-          <a:ln w="3175">
-            <a:noFill/>
-          </a:ln>
-        </p:spPr>
-        <p:style>
-          <a:lnRef idx="0">
-            <a:scrgbClr r="0" g="0" b="0"/>
-          </a:lnRef>
-          <a:fillRef idx="0">
-            <a:scrgbClr r="0" g="0" b="0"/>
-          </a:fillRef>
-          <a:effectRef idx="0">
-            <a:scrgbClr r="0" g="0" b="0"/>
-          </a:effectRef>
-          <a:fontRef idx="minor">
-            <a:schemeClr val="lt1"/>
-          </a:fontRef>
-        </p:style>
-        <p:txBody>
-          <a:bodyPr spcFirstLastPara="0" vert="horz" wrap="square" lIns="91440" tIns="45720" rIns="91440" bIns="45720" numCol="1" spcCol="1270" anchor="t" anchorCtr="0">
-            <a:spAutoFit/>
-          </a:bodyPr>
-          <a:lstStyle/>
-          <a:p>
-            <a:pPr marL="0" marR="0" lvl="0" indent="0" algn="ctr" defTabSz="522599" rtl="0" eaLnBrk="1" fontAlgn="auto" latinLnBrk="0" hangingPunct="1">
-              <a:lnSpc>
-                <a:spcPct val="100000"/>
-              </a:lnSpc>
-              <a:spcBef>
-                <a:spcPct val="0"/>
-              </a:spcBef>
-              <a:spcAft>
-                <a:spcPct val="35000"/>
-              </a:spcAft>
-              <a:buClrTx/>
-              <a:buSzTx/>
-              <a:buFontTx/>
-              <a:buNone/>
-              <a:tabLst/>
-              <a:defRPr/>
-            </a:pPr>
-            <a:r>
-              <a:rPr kumimoji="0" lang="en-US" sz="1400" b="0" i="0" u="none" strike="noStrike" kern="0" cap="none" spc="0" normalizeH="0" baseline="0" noProof="0" dirty="0">
-                <a:ln>
-                  <a:noFill/>
-                </a:ln>
-                <a:solidFill>
-                  <a:srgbClr val="0078D7"/>
-                </a:solidFill>
-                <a:effectLst/>
-                <a:uLnTx/>
-                <a:uFillTx/>
-                <a:latin typeface="Segoe UI Semibold" panose="020B0702040204020203" pitchFamily="34" charset="0"/>
-                <a:ea typeface="+mn-ea"/>
-                <a:cs typeface="Segoe UI Semibold" panose="020B0702040204020203" pitchFamily="34" charset="0"/>
-              </a:rPr>
-              <a:t>Store</a:t>
-            </a:r>
-          </a:p>
-        </p:txBody>
-      </p:sp>
-      <p:sp>
-        <p:nvSpPr>
-          <p:cNvPr id="11" name="Rectangle 10">
-            <a:extLst>
-              <a:ext uri="{FF2B5EF4-FFF2-40B4-BE49-F238E27FC236}">
-                <a16:creationId xmlns:a16="http://schemas.microsoft.com/office/drawing/2014/main" id="{B24C8F5C-B2B7-48E0-9030-A0732434489D}"/>
-              </a:ext>
-            </a:extLst>
-          </p:cNvPr>
-          <p:cNvSpPr/>
-          <p:nvPr/>
-        </p:nvSpPr>
-        <p:spPr bwMode="auto">
-          <a:xfrm>
-            <a:off x="2423926" y="1514811"/>
-            <a:ext cx="1384695" cy="307777"/>
-          </a:xfrm>
-          <a:prstGeom prst="rect">
-            <a:avLst/>
-          </a:prstGeom>
-          <a:noFill/>
-          <a:ln w="3175">
-            <a:noFill/>
-          </a:ln>
-        </p:spPr>
-        <p:style>
-          <a:lnRef idx="0">
-            <a:scrgbClr r="0" g="0" b="0"/>
-          </a:lnRef>
-          <a:fillRef idx="0">
-            <a:scrgbClr r="0" g="0" b="0"/>
-          </a:fillRef>
-          <a:effectRef idx="0">
-            <a:scrgbClr r="0" g="0" b="0"/>
-          </a:effectRef>
-          <a:fontRef idx="minor">
-            <a:schemeClr val="lt1"/>
-          </a:fontRef>
-        </p:style>
-        <p:txBody>
-          <a:bodyPr spcFirstLastPara="0" vert="horz" wrap="square" lIns="91440" tIns="45720" rIns="91440" bIns="45720" numCol="1" spcCol="1270" anchor="t" anchorCtr="0">
-            <a:spAutoFit/>
-          </a:bodyPr>
-          <a:lstStyle/>
-          <a:p>
-            <a:pPr marL="0" marR="0" lvl="0" indent="0" algn="ctr" defTabSz="710593" rtl="0" eaLnBrk="1" fontAlgn="auto" latinLnBrk="0" hangingPunct="1">
-              <a:lnSpc>
-                <a:spcPct val="100000"/>
-              </a:lnSpc>
-              <a:spcBef>
-                <a:spcPct val="0"/>
-              </a:spcBef>
-              <a:spcAft>
-                <a:spcPct val="35000"/>
-              </a:spcAft>
-              <a:buClrTx/>
-              <a:buSzTx/>
-              <a:buFontTx/>
-              <a:buNone/>
-              <a:tabLst/>
-              <a:defRPr/>
-            </a:pPr>
-            <a:r>
-              <a:rPr kumimoji="0" lang="en-US" sz="1400" b="0" i="0" u="none" strike="noStrike" kern="0" cap="none" spc="0" normalizeH="0" baseline="0" noProof="0" dirty="0">
-                <a:ln>
-                  <a:noFill/>
-                </a:ln>
-                <a:solidFill>
-                  <a:srgbClr val="0078D7"/>
-                </a:solidFill>
-                <a:effectLst/>
-                <a:uLnTx/>
-                <a:uFillTx/>
-                <a:latin typeface="Segoe UI Semibold" panose="020B0702040204020203" pitchFamily="34" charset="0"/>
-                <a:ea typeface="+mn-ea"/>
-                <a:cs typeface="Segoe UI Semibold" panose="020B0702040204020203" pitchFamily="34" charset="0"/>
-              </a:rPr>
-              <a:t>Ingest</a:t>
-            </a:r>
-          </a:p>
-        </p:txBody>
-      </p:sp>
-      <p:sp>
-        <p:nvSpPr>
-          <p:cNvPr id="12" name="Rectangle 11">
-            <a:extLst>
-              <a:ext uri="{FF2B5EF4-FFF2-40B4-BE49-F238E27FC236}">
-                <a16:creationId xmlns:a16="http://schemas.microsoft.com/office/drawing/2014/main" id="{A360B252-EED7-4404-AA98-E617E10595BE}"/>
-              </a:ext>
-            </a:extLst>
-          </p:cNvPr>
-          <p:cNvSpPr/>
-          <p:nvPr/>
-        </p:nvSpPr>
-        <p:spPr>
-          <a:xfrm>
-            <a:off x="8520015" y="2977512"/>
-            <a:ext cx="1163884" cy="253916"/>
-          </a:xfrm>
-          <a:prstGeom prst="rect">
-            <a:avLst/>
-          </a:prstGeom>
-        </p:spPr>
-        <p:txBody>
-          <a:bodyPr wrap="square">
-            <a:spAutoFit/>
-          </a:bodyPr>
-          <a:lstStyle/>
-          <a:p>
-            <a:pPr marL="0" marR="0" lvl="0" indent="0" algn="ctr" defTabSz="932597" rtl="0" eaLnBrk="1" fontAlgn="auto" latinLnBrk="0" hangingPunct="1">
-              <a:lnSpc>
-                <a:spcPct val="100000"/>
-              </a:lnSpc>
-              <a:spcBef>
-                <a:spcPts val="0"/>
-              </a:spcBef>
-              <a:spcAft>
-                <a:spcPts val="0"/>
-              </a:spcAft>
-              <a:buClrTx/>
-              <a:buSzTx/>
-              <a:buFontTx/>
-              <a:buNone/>
-              <a:tabLst/>
-              <a:defRPr/>
-            </a:pPr>
-            <a:r>
-              <a:rPr kumimoji="0" lang="en-US" sz="1050" b="0" i="0" u="none" strike="noStrike" kern="0" cap="none" spc="0" normalizeH="0" baseline="0" noProof="0" dirty="0">
-                <a:ln>
-                  <a:noFill/>
-                </a:ln>
-                <a:solidFill>
-                  <a:srgbClr val="505050"/>
-                </a:solidFill>
-                <a:effectLst/>
-                <a:uLnTx/>
-                <a:uFillTx/>
-                <a:latin typeface="Segoe UI Semibold" panose="020B0702040204020203" pitchFamily="34" charset="0"/>
-                <a:ea typeface="+mn-ea"/>
-                <a:cs typeface="Segoe UI Semibold" panose="020B0702040204020203" pitchFamily="34" charset="0"/>
-              </a:rPr>
-              <a:t>SQL Database</a:t>
-            </a:r>
-          </a:p>
-        </p:txBody>
-      </p:sp>
-      <p:grpSp>
-        <p:nvGrpSpPr>
-          <p:cNvPr id="13" name="Group 12">
-            <a:extLst>
-              <a:ext uri="{FF2B5EF4-FFF2-40B4-BE49-F238E27FC236}">
-                <a16:creationId xmlns:a16="http://schemas.microsoft.com/office/drawing/2014/main" id="{1C708A3A-98BD-4861-9850-34C936D435FB}"/>
-              </a:ext>
-            </a:extLst>
-          </p:cNvPr>
-          <p:cNvGrpSpPr/>
-          <p:nvPr/>
-        </p:nvGrpSpPr>
-        <p:grpSpPr>
-          <a:xfrm>
-            <a:off x="4651477" y="2235826"/>
-            <a:ext cx="860592" cy="995602"/>
-            <a:chOff x="4064302" y="3325697"/>
-            <a:chExt cx="860592" cy="995602"/>
-          </a:xfrm>
-        </p:grpSpPr>
-        <p:sp>
-          <p:nvSpPr>
-            <p:cNvPr id="14" name="Rectangle 13">
-              <a:extLst>
-                <a:ext uri="{FF2B5EF4-FFF2-40B4-BE49-F238E27FC236}">
-                  <a16:creationId xmlns:a16="http://schemas.microsoft.com/office/drawing/2014/main" id="{F737F1F3-6511-47AF-A419-7D7EF81A4A4C}"/>
-                </a:ext>
-              </a:extLst>
-            </p:cNvPr>
-            <p:cNvSpPr/>
-            <p:nvPr/>
-          </p:nvSpPr>
-          <p:spPr>
-            <a:xfrm>
-              <a:off x="4064302" y="4067383"/>
-              <a:ext cx="860592" cy="253916"/>
-            </a:xfrm>
-            <a:prstGeom prst="rect">
-              <a:avLst/>
-            </a:prstGeom>
-          </p:spPr>
-          <p:txBody>
-            <a:bodyPr wrap="square">
-              <a:spAutoFit/>
-            </a:bodyPr>
-            <a:lstStyle/>
-            <a:p>
-              <a:pPr marL="0" marR="0" lvl="0" indent="0" algn="ctr" defTabSz="914400" rtl="0" eaLnBrk="1" fontAlgn="auto" latinLnBrk="0" hangingPunct="1">
-                <a:lnSpc>
-                  <a:spcPct val="100000"/>
-                </a:lnSpc>
-                <a:spcBef>
-                  <a:spcPts val="0"/>
-                </a:spcBef>
-                <a:spcAft>
-                  <a:spcPts val="0"/>
-                </a:spcAft>
-                <a:buClrTx/>
-                <a:buSzTx/>
-                <a:buFontTx/>
-                <a:buNone/>
-                <a:tabLst/>
-                <a:defRPr/>
-              </a:pPr>
-              <a:r>
-                <a:rPr kumimoji="0" lang="en-US" sz="1050" b="0" i="0" u="none" strike="noStrike" kern="0" cap="none" spc="0" normalizeH="0" baseline="0" noProof="0" dirty="0">
-                  <a:ln>
-                    <a:noFill/>
-                  </a:ln>
-                  <a:solidFill>
-                    <a:srgbClr val="505050"/>
-                  </a:solidFill>
-                  <a:effectLst/>
-                  <a:uLnTx/>
-                  <a:uFillTx/>
-                  <a:latin typeface="Segoe UI Semibold" panose="020B0702040204020203" pitchFamily="34" charset="0"/>
-                  <a:ea typeface="+mn-ea"/>
-                  <a:cs typeface="Segoe UI Semibold" panose="020B0702040204020203" pitchFamily="34" charset="0"/>
-                </a:rPr>
-                <a:t>Blobs</a:t>
-              </a:r>
-            </a:p>
-          </p:txBody>
-        </p:sp>
-        <p:pic>
-          <p:nvPicPr>
-            <p:cNvPr id="15" name="Picture 14" descr="A stop sign&#10;&#10;Description generated with high confidence">
-              <a:extLst>
-                <a:ext uri="{FF2B5EF4-FFF2-40B4-BE49-F238E27FC236}">
-                  <a16:creationId xmlns:a16="http://schemas.microsoft.com/office/drawing/2014/main" id="{9A9E1EE2-BCFA-4DB1-939B-0B666176D145}"/>
-                </a:ext>
-              </a:extLst>
-            </p:cNvPr>
-            <p:cNvPicPr>
-              <a:picLocks noChangeAspect="1"/>
-            </p:cNvPicPr>
-            <p:nvPr/>
-          </p:nvPicPr>
-          <p:blipFill>
-            <a:blip r:embed="rId3">
-              <a:extLst>
-                <a:ext uri="{28A0092B-C50C-407E-A947-70E740481C1C}">
-                  <a14:useLocalDpi xmlns:a14="http://schemas.microsoft.com/office/drawing/2010/main" val="0"/>
-                </a:ext>
-              </a:extLst>
-            </a:blip>
-            <a:stretch>
-              <a:fillRect/>
-            </a:stretch>
-          </p:blipFill>
-          <p:spPr>
-            <a:xfrm>
-              <a:off x="4104453" y="3325697"/>
-              <a:ext cx="780290" cy="780290"/>
-            </a:xfrm>
-            <a:prstGeom prst="rect">
-              <a:avLst/>
-            </a:prstGeom>
-          </p:spPr>
-        </p:pic>
-      </p:grpSp>
-      <p:grpSp>
-        <p:nvGrpSpPr>
-          <p:cNvPr id="16" name="Group 15">
-            <a:extLst>
-              <a:ext uri="{FF2B5EF4-FFF2-40B4-BE49-F238E27FC236}">
-                <a16:creationId xmlns:a16="http://schemas.microsoft.com/office/drawing/2014/main" id="{98B55D6A-373D-4F0C-BCC4-108B3DFCCCBE}"/>
-              </a:ext>
-            </a:extLst>
-          </p:cNvPr>
-          <p:cNvGrpSpPr/>
-          <p:nvPr/>
-        </p:nvGrpSpPr>
-        <p:grpSpPr>
-          <a:xfrm>
-            <a:off x="2881144" y="5527901"/>
-            <a:ext cx="860592" cy="1034206"/>
-            <a:chOff x="2293969" y="5512832"/>
-            <a:chExt cx="860592" cy="1034206"/>
-          </a:xfrm>
-        </p:grpSpPr>
-        <p:pic>
-          <p:nvPicPr>
-            <p:cNvPr id="17" name="Picture 16">
-              <a:extLst>
-                <a:ext uri="{FF2B5EF4-FFF2-40B4-BE49-F238E27FC236}">
-                  <a16:creationId xmlns:a16="http://schemas.microsoft.com/office/drawing/2014/main" id="{83AC9C7D-C816-40E1-8044-5ECEE41E8EDF}"/>
-                </a:ext>
-              </a:extLst>
-            </p:cNvPr>
-            <p:cNvPicPr>
-              <a:picLocks noChangeAspect="1"/>
-            </p:cNvPicPr>
-            <p:nvPr/>
-          </p:nvPicPr>
-          <p:blipFill>
-            <a:blip r:embed="rId4">
-              <a:extLst>
-                <a:ext uri="{28A0092B-C50C-407E-A947-70E740481C1C}">
-                  <a14:useLocalDpi xmlns:a14="http://schemas.microsoft.com/office/drawing/2010/main" val="0"/>
-                </a:ext>
-              </a:extLst>
-            </a:blip>
-            <a:stretch>
-              <a:fillRect/>
-            </a:stretch>
-          </p:blipFill>
-          <p:spPr>
-            <a:xfrm>
-              <a:off x="2325896" y="5512832"/>
-              <a:ext cx="780290" cy="780290"/>
-            </a:xfrm>
-            <a:prstGeom prst="rect">
-              <a:avLst/>
-            </a:prstGeom>
-          </p:spPr>
-        </p:pic>
-        <p:sp>
-          <p:nvSpPr>
-            <p:cNvPr id="18" name="Rectangle 17">
-              <a:extLst>
-                <a:ext uri="{FF2B5EF4-FFF2-40B4-BE49-F238E27FC236}">
-                  <a16:creationId xmlns:a16="http://schemas.microsoft.com/office/drawing/2014/main" id="{2B6E201E-69D1-4E97-84C3-5E228A7ABCFF}"/>
-                </a:ext>
-              </a:extLst>
-            </p:cNvPr>
-            <p:cNvSpPr/>
-            <p:nvPr/>
-          </p:nvSpPr>
-          <p:spPr>
-            <a:xfrm>
-              <a:off x="2293969" y="6293122"/>
-              <a:ext cx="860592" cy="253916"/>
-            </a:xfrm>
-            <a:prstGeom prst="rect">
-              <a:avLst/>
-            </a:prstGeom>
-          </p:spPr>
-          <p:txBody>
-            <a:bodyPr wrap="square">
-              <a:spAutoFit/>
-            </a:bodyPr>
-            <a:lstStyle/>
-            <a:p>
-              <a:pPr marL="0" marR="0" lvl="0" indent="0" algn="ctr" defTabSz="914400" rtl="0" eaLnBrk="1" fontAlgn="auto" latinLnBrk="0" hangingPunct="1">
-                <a:lnSpc>
-                  <a:spcPct val="100000"/>
-                </a:lnSpc>
-                <a:spcBef>
-                  <a:spcPts val="0"/>
-                </a:spcBef>
-                <a:spcAft>
-                  <a:spcPts val="0"/>
-                </a:spcAft>
-                <a:buClrTx/>
-                <a:buSzTx/>
-                <a:buFontTx/>
-                <a:buNone/>
-                <a:tabLst/>
-                <a:defRPr/>
-              </a:pPr>
-              <a:r>
-                <a:rPr kumimoji="0" lang="en-US" sz="1050" b="0" i="0" u="none" strike="noStrike" kern="0" cap="none" spc="0" normalizeH="0" baseline="0" noProof="0" dirty="0">
-                  <a:ln>
-                    <a:noFill/>
-                  </a:ln>
-                  <a:solidFill>
-                    <a:srgbClr val="505050"/>
-                  </a:solidFill>
-                  <a:effectLst/>
-                  <a:uLnTx/>
-                  <a:uFillTx/>
-                  <a:latin typeface="Segoe UI Semibold" panose="020B0702040204020203" pitchFamily="34" charset="0"/>
-                  <a:ea typeface="+mn-ea"/>
-                  <a:cs typeface="Segoe UI Semibold" panose="020B0702040204020203" pitchFamily="34" charset="0"/>
-                </a:rPr>
-                <a:t>AKV</a:t>
-              </a:r>
-            </a:p>
-          </p:txBody>
-        </p:sp>
-      </p:grpSp>
-      <p:grpSp>
-        <p:nvGrpSpPr>
-          <p:cNvPr id="19" name="Group 18">
-            <a:extLst>
-              <a:ext uri="{FF2B5EF4-FFF2-40B4-BE49-F238E27FC236}">
-                <a16:creationId xmlns:a16="http://schemas.microsoft.com/office/drawing/2014/main" id="{05AE2C53-3BA2-4A32-92CD-BAE1F85A7AAE}"/>
-              </a:ext>
-            </a:extLst>
-          </p:cNvPr>
-          <p:cNvGrpSpPr/>
-          <p:nvPr/>
-        </p:nvGrpSpPr>
-        <p:grpSpPr>
-          <a:xfrm>
-            <a:off x="6369801" y="2025333"/>
-            <a:ext cx="1381617" cy="1249963"/>
-            <a:chOff x="5557683" y="3115204"/>
-            <a:chExt cx="1381617" cy="1249963"/>
-          </a:xfrm>
-        </p:grpSpPr>
-        <p:sp>
-          <p:nvSpPr>
-            <p:cNvPr id="20" name="Rectangle 19">
-              <a:extLst>
-                <a:ext uri="{FF2B5EF4-FFF2-40B4-BE49-F238E27FC236}">
-                  <a16:creationId xmlns:a16="http://schemas.microsoft.com/office/drawing/2014/main" id="{8CC5C208-C858-4679-974F-19F137AB7BFA}"/>
-                </a:ext>
-              </a:extLst>
-            </p:cNvPr>
-            <p:cNvSpPr/>
-            <p:nvPr/>
-          </p:nvSpPr>
-          <p:spPr>
-            <a:xfrm>
-              <a:off x="5557683" y="4111251"/>
-              <a:ext cx="1381617" cy="253916"/>
-            </a:xfrm>
-            <a:prstGeom prst="rect">
-              <a:avLst/>
-            </a:prstGeom>
-          </p:spPr>
-          <p:txBody>
-            <a:bodyPr wrap="square">
-              <a:spAutoFit/>
-            </a:bodyPr>
-            <a:lstStyle/>
-            <a:p>
-              <a:pPr marL="0" marR="0" lvl="0" indent="0" algn="ctr" defTabSz="914192" rtl="0" eaLnBrk="1" fontAlgn="auto" latinLnBrk="0" hangingPunct="1">
-                <a:lnSpc>
-                  <a:spcPct val="100000"/>
-                </a:lnSpc>
-                <a:spcBef>
-                  <a:spcPts val="0"/>
-                </a:spcBef>
-                <a:spcAft>
-                  <a:spcPts val="0"/>
-                </a:spcAft>
-                <a:buClrTx/>
-                <a:buSzTx/>
-                <a:buFontTx/>
-                <a:buNone/>
-                <a:tabLst/>
-                <a:defRPr/>
-              </a:pPr>
-              <a:r>
-                <a:rPr lang="en-US" sz="1050" kern="0" dirty="0">
-                  <a:solidFill>
-                    <a:srgbClr val="505050"/>
-                  </a:solidFill>
-                  <a:latin typeface="Segoe UI Semibold" panose="020B0702040204020203" pitchFamily="34" charset="0"/>
-                  <a:ea typeface="MS PGothic" panose="020B0600070205080204" pitchFamily="34" charset="-128"/>
-                  <a:cs typeface="Segoe UI Semibold" panose="020B0702040204020203" pitchFamily="34" charset="0"/>
-                </a:rPr>
-                <a:t>Databricks</a:t>
-              </a:r>
-            </a:p>
-          </p:txBody>
-        </p:sp>
-        <p:pic>
-          <p:nvPicPr>
-            <p:cNvPr id="21" name="Picture 4" descr="Image result for databricks">
-              <a:extLst>
-                <a:ext uri="{FF2B5EF4-FFF2-40B4-BE49-F238E27FC236}">
-                  <a16:creationId xmlns:a16="http://schemas.microsoft.com/office/drawing/2014/main" id="{83BC0486-BBEE-4C72-8412-46C09C12959E}"/>
-                </a:ext>
-              </a:extLst>
-            </p:cNvPr>
-            <p:cNvPicPr>
-              <a:picLocks noChangeAspect="1" noChangeArrowheads="1"/>
-            </p:cNvPicPr>
-            <p:nvPr/>
-          </p:nvPicPr>
-          <p:blipFill>
-            <a:blip r:embed="rId5">
-              <a:clrChange>
-                <a:clrFrom>
-                  <a:srgbClr val="FFFFFF"/>
-                </a:clrFrom>
-                <a:clrTo>
-                  <a:srgbClr val="FFFFFF">
-                    <a:alpha val="0"/>
-                  </a:srgbClr>
-                </a:clrTo>
-              </a:clrChange>
-              <a:extLst>
-                <a:ext uri="{28A0092B-C50C-407E-A947-70E740481C1C}">
-                  <a14:useLocalDpi xmlns:a14="http://schemas.microsoft.com/office/drawing/2010/main" val="0"/>
-                </a:ext>
-              </a:extLst>
-            </a:blip>
-            <a:srcRect/>
-            <a:stretch>
-              <a:fillRect/>
-            </a:stretch>
-          </p:blipFill>
-          <p:spPr bwMode="auto">
-            <a:xfrm>
-              <a:off x="5657057" y="3115204"/>
-              <a:ext cx="1182868" cy="1182868"/>
-            </a:xfrm>
-            <a:prstGeom prst="rect">
-              <a:avLst/>
-            </a:prstGeom>
-            <a:noFill/>
-            <a:extLst>
-              <a:ext uri="{909E8E84-426E-40DD-AFC4-6F175D3DCCD1}">
-                <a14:hiddenFill xmlns:a14="http://schemas.microsoft.com/office/drawing/2010/main">
-                  <a:solidFill>
-                    <a:srgbClr val="FFFFFF"/>
-                  </a:solidFill>
-                </a14:hiddenFill>
-              </a:ext>
-            </a:extLst>
-          </p:spPr>
-        </p:pic>
-      </p:grpSp>
-      <p:grpSp>
-        <p:nvGrpSpPr>
-          <p:cNvPr id="22" name="Group 21">
-            <a:extLst>
-              <a:ext uri="{FF2B5EF4-FFF2-40B4-BE49-F238E27FC236}">
-                <a16:creationId xmlns:a16="http://schemas.microsoft.com/office/drawing/2014/main" id="{112EC862-6A18-448C-AA18-6F6CBB6EFAC4}"/>
-              </a:ext>
-            </a:extLst>
-          </p:cNvPr>
-          <p:cNvGrpSpPr/>
-          <p:nvPr/>
-        </p:nvGrpSpPr>
-        <p:grpSpPr>
-          <a:xfrm>
-            <a:off x="6108553" y="3920329"/>
-            <a:ext cx="1917467" cy="1052261"/>
-            <a:chOff x="5399147" y="4515474"/>
-            <a:chExt cx="1917467" cy="1052261"/>
-          </a:xfrm>
-        </p:grpSpPr>
-        <p:sp>
-          <p:nvSpPr>
-            <p:cNvPr id="23" name="Rectangle 22">
-              <a:extLst>
-                <a:ext uri="{FF2B5EF4-FFF2-40B4-BE49-F238E27FC236}">
-                  <a16:creationId xmlns:a16="http://schemas.microsoft.com/office/drawing/2014/main" id="{E6129983-C29E-4F8F-B004-A942016E8A3C}"/>
-                </a:ext>
-              </a:extLst>
-            </p:cNvPr>
-            <p:cNvSpPr/>
-            <p:nvPr/>
-          </p:nvSpPr>
-          <p:spPr>
-            <a:xfrm>
-              <a:off x="5399147" y="5313819"/>
-              <a:ext cx="1917467" cy="253916"/>
-            </a:xfrm>
-            <a:prstGeom prst="rect">
-              <a:avLst/>
-            </a:prstGeom>
-          </p:spPr>
-          <p:txBody>
-            <a:bodyPr wrap="square">
-              <a:spAutoFit/>
-            </a:bodyPr>
-            <a:lstStyle/>
-            <a:p>
-              <a:pPr marL="0" marR="0" lvl="0" indent="0" algn="ctr" defTabSz="914192" rtl="0" eaLnBrk="1" fontAlgn="auto" latinLnBrk="0" hangingPunct="1">
-                <a:lnSpc>
-                  <a:spcPct val="100000"/>
-                </a:lnSpc>
-                <a:spcBef>
-                  <a:spcPts val="0"/>
-                </a:spcBef>
-                <a:spcAft>
-                  <a:spcPts val="0"/>
-                </a:spcAft>
-                <a:buClrTx/>
-                <a:buSzTx/>
-                <a:buFontTx/>
-                <a:buNone/>
-                <a:tabLst/>
-                <a:defRPr/>
-              </a:pPr>
-              <a:r>
-                <a:rPr kumimoji="0" lang="en-US" sz="1050" b="0" i="0" u="none" strike="noStrike" kern="0" cap="none" spc="0" normalizeH="0" baseline="0" noProof="0" dirty="0">
-                  <a:ln>
-                    <a:noFill/>
-                  </a:ln>
-                  <a:solidFill>
-                    <a:srgbClr val="505050"/>
-                  </a:solidFill>
-                  <a:effectLst/>
-                  <a:uLnTx/>
-                  <a:uFillTx/>
-                  <a:latin typeface="Segoe UI Semibold" panose="020B0702040204020203" pitchFamily="34" charset="0"/>
-                  <a:ea typeface="MS PGothic" panose="020B0600070205080204" pitchFamily="34" charset="-128"/>
-                  <a:cs typeface="Segoe UI Semibold" panose="020B0702040204020203" pitchFamily="34" charset="0"/>
-                </a:rPr>
-                <a:t>Machine Learning </a:t>
-              </a:r>
-              <a:r>
-                <a:rPr lang="en-US" sz="1050" kern="0" dirty="0">
-                  <a:solidFill>
-                    <a:srgbClr val="505050"/>
-                  </a:solidFill>
-                  <a:latin typeface="Segoe UI Semibold" panose="020B0702040204020203" pitchFamily="34" charset="0"/>
-                  <a:ea typeface="MS PGothic" panose="020B0600070205080204" pitchFamily="34" charset="-128"/>
-                  <a:cs typeface="Segoe UI Semibold" panose="020B0702040204020203" pitchFamily="34" charset="0"/>
-                </a:rPr>
-                <a:t>Studio</a:t>
-              </a:r>
-              <a:endParaRPr kumimoji="0" lang="en-US" sz="1050" b="0" i="0" u="none" strike="noStrike" kern="0" cap="none" spc="0" normalizeH="0" baseline="0" noProof="0" dirty="0">
-                <a:ln>
-                  <a:noFill/>
-                </a:ln>
-                <a:solidFill>
-                  <a:srgbClr val="505050"/>
-                </a:solidFill>
-                <a:effectLst/>
-                <a:uLnTx/>
-                <a:uFillTx/>
-                <a:latin typeface="Segoe UI Semibold" panose="020B0702040204020203" pitchFamily="34" charset="0"/>
-                <a:ea typeface="MS PGothic" panose="020B0600070205080204" pitchFamily="34" charset="-128"/>
-                <a:cs typeface="Segoe UI Semibold" panose="020B0702040204020203" pitchFamily="34" charset="0"/>
-              </a:endParaRPr>
-            </a:p>
-          </p:txBody>
-        </p:sp>
-        <p:pic>
-          <p:nvPicPr>
-            <p:cNvPr id="24" name="Picture 23">
-              <a:extLst>
-                <a:ext uri="{FF2B5EF4-FFF2-40B4-BE49-F238E27FC236}">
-                  <a16:creationId xmlns:a16="http://schemas.microsoft.com/office/drawing/2014/main" id="{798A42A9-32E8-40B7-9BE6-A71FACD12B55}"/>
-                </a:ext>
-              </a:extLst>
-            </p:cNvPr>
-            <p:cNvPicPr>
-              <a:picLocks noChangeAspect="1"/>
-            </p:cNvPicPr>
-            <p:nvPr/>
-          </p:nvPicPr>
-          <p:blipFill>
-            <a:blip r:embed="rId6">
-              <a:extLst>
-                <a:ext uri="{28A0092B-C50C-407E-A947-70E740481C1C}">
-                  <a14:useLocalDpi xmlns:a14="http://schemas.microsoft.com/office/drawing/2010/main" val="0"/>
-                </a:ext>
-              </a:extLst>
-            </a:blip>
-            <a:stretch>
-              <a:fillRect/>
-            </a:stretch>
-          </p:blipFill>
-          <p:spPr>
-            <a:xfrm>
-              <a:off x="5967735" y="4515474"/>
-              <a:ext cx="780290" cy="780290"/>
-            </a:xfrm>
-            <a:prstGeom prst="rect">
-              <a:avLst/>
-            </a:prstGeom>
-          </p:spPr>
-        </p:pic>
-      </p:grpSp>
-      <p:pic>
-        <p:nvPicPr>
-          <p:cNvPr id="25" name="Picture 24" descr="A close up of a sign&#10;&#10;Description generated with high confidence">
-            <a:extLst>
-              <a:ext uri="{FF2B5EF4-FFF2-40B4-BE49-F238E27FC236}">
-                <a16:creationId xmlns:a16="http://schemas.microsoft.com/office/drawing/2014/main" id="{50169FB7-1B6C-45E1-886C-72F89DEE93AE}"/>
-              </a:ext>
-            </a:extLst>
-          </p:cNvPr>
-          <p:cNvPicPr>
-            <a:picLocks noChangeAspect="1"/>
-          </p:cNvPicPr>
-          <p:nvPr/>
-        </p:nvPicPr>
-        <p:blipFill>
-          <a:blip r:embed="rId7">
-            <a:extLst>
-              <a:ext uri="{28A0092B-C50C-407E-A947-70E740481C1C}">
-                <a14:useLocalDpi xmlns:a14="http://schemas.microsoft.com/office/drawing/2010/main" val="0"/>
-              </a:ext>
-            </a:extLst>
-          </a:blip>
-          <a:stretch>
-            <a:fillRect/>
-          </a:stretch>
-        </p:blipFill>
-        <p:spPr>
-          <a:xfrm>
-            <a:off x="8711812" y="2183385"/>
-            <a:ext cx="780290" cy="780290"/>
-          </a:xfrm>
-          <a:prstGeom prst="rect">
-            <a:avLst/>
-          </a:prstGeom>
-        </p:spPr>
-      </p:pic>
-      <p:grpSp>
-        <p:nvGrpSpPr>
-          <p:cNvPr id="26" name="Group 25">
-            <a:extLst>
-              <a:ext uri="{FF2B5EF4-FFF2-40B4-BE49-F238E27FC236}">
-                <a16:creationId xmlns:a16="http://schemas.microsoft.com/office/drawing/2014/main" id="{68EEFA0E-1C64-4FE7-BB5E-66BA12914DAF}"/>
-              </a:ext>
-            </a:extLst>
-          </p:cNvPr>
-          <p:cNvGrpSpPr/>
-          <p:nvPr/>
-        </p:nvGrpSpPr>
-        <p:grpSpPr>
-          <a:xfrm>
-            <a:off x="2728462" y="2149145"/>
-            <a:ext cx="1165956" cy="1034206"/>
-            <a:chOff x="1937217" y="3317591"/>
-            <a:chExt cx="1165956" cy="1034206"/>
-          </a:xfrm>
-        </p:grpSpPr>
-        <p:sp>
-          <p:nvSpPr>
-            <p:cNvPr id="27" name="Rectangle 26">
-              <a:extLst>
-                <a:ext uri="{FF2B5EF4-FFF2-40B4-BE49-F238E27FC236}">
-                  <a16:creationId xmlns:a16="http://schemas.microsoft.com/office/drawing/2014/main" id="{40BC2589-5998-4879-B3F5-AC311A86D83F}"/>
-                </a:ext>
-              </a:extLst>
-            </p:cNvPr>
-            <p:cNvSpPr/>
-            <p:nvPr/>
-          </p:nvSpPr>
-          <p:spPr>
-            <a:xfrm>
-              <a:off x="1937217" y="4097881"/>
-              <a:ext cx="1165956" cy="253916"/>
-            </a:xfrm>
-            <a:prstGeom prst="rect">
-              <a:avLst/>
-            </a:prstGeom>
-          </p:spPr>
-          <p:txBody>
-            <a:bodyPr wrap="square">
-              <a:spAutoFit/>
-            </a:bodyPr>
-            <a:lstStyle/>
-            <a:p>
-              <a:pPr marL="0" marR="0" lvl="0" indent="0" algn="ctr" defTabSz="914192" rtl="0" eaLnBrk="1" fontAlgn="auto" latinLnBrk="0" hangingPunct="1">
-                <a:lnSpc>
-                  <a:spcPct val="100000"/>
-                </a:lnSpc>
-                <a:spcBef>
-                  <a:spcPts val="0"/>
-                </a:spcBef>
-                <a:spcAft>
-                  <a:spcPts val="0"/>
-                </a:spcAft>
-                <a:buClrTx/>
-                <a:buSzTx/>
-                <a:buFontTx/>
-                <a:buNone/>
-                <a:tabLst/>
-                <a:defRPr/>
-              </a:pPr>
-              <a:r>
-                <a:rPr kumimoji="0" lang="en-US" sz="1050" b="0" i="0" u="none" strike="noStrike" kern="0" cap="none" spc="0" normalizeH="0" baseline="0" noProof="0" dirty="0">
-                  <a:ln>
-                    <a:noFill/>
-                  </a:ln>
-                  <a:solidFill>
-                    <a:srgbClr val="505050"/>
-                  </a:solidFill>
-                  <a:effectLst/>
-                  <a:uLnTx/>
-                  <a:uFillTx/>
-                  <a:latin typeface="Segoe UI Semibold" panose="020B0702040204020203" pitchFamily="34" charset="0"/>
-                  <a:ea typeface="MS PGothic" panose="020B0600070205080204" pitchFamily="34" charset="-128"/>
-                  <a:cs typeface="Segoe UI Semibold" panose="020B0702040204020203" pitchFamily="34" charset="0"/>
-                </a:rPr>
-                <a:t>Data Factory</a:t>
-              </a:r>
-            </a:p>
-          </p:txBody>
-        </p:sp>
-        <p:pic>
-          <p:nvPicPr>
-            <p:cNvPr id="28" name="Picture 27">
-              <a:extLst>
-                <a:ext uri="{FF2B5EF4-FFF2-40B4-BE49-F238E27FC236}">
-                  <a16:creationId xmlns:a16="http://schemas.microsoft.com/office/drawing/2014/main" id="{8DB7F6F2-29E2-49AF-B650-174F1BC40ABC}"/>
-                </a:ext>
-              </a:extLst>
-            </p:cNvPr>
-            <p:cNvPicPr>
-              <a:picLocks noChangeAspect="1"/>
-            </p:cNvPicPr>
-            <p:nvPr/>
-          </p:nvPicPr>
-          <p:blipFill>
-            <a:blip r:embed="rId8">
-              <a:extLst>
-                <a:ext uri="{28A0092B-C50C-407E-A947-70E740481C1C}">
-                  <a14:useLocalDpi xmlns:a14="http://schemas.microsoft.com/office/drawing/2010/main" val="0"/>
-                </a:ext>
-              </a:extLst>
-            </a:blip>
-            <a:stretch>
-              <a:fillRect/>
-            </a:stretch>
-          </p:blipFill>
-          <p:spPr>
-            <a:xfrm>
-              <a:off x="2130050" y="3317591"/>
-              <a:ext cx="780290" cy="780290"/>
-            </a:xfrm>
-            <a:prstGeom prst="rect">
-              <a:avLst/>
-            </a:prstGeom>
-          </p:spPr>
-        </p:pic>
-      </p:grpSp>
-      <p:sp>
-        <p:nvSpPr>
-          <p:cNvPr id="29" name="Rectangle 28">
-            <a:extLst>
-              <a:ext uri="{FF2B5EF4-FFF2-40B4-BE49-F238E27FC236}">
-                <a16:creationId xmlns:a16="http://schemas.microsoft.com/office/drawing/2014/main" id="{511B96B3-0B55-4B12-BA0C-3009ED86E754}"/>
-              </a:ext>
-            </a:extLst>
-          </p:cNvPr>
-          <p:cNvSpPr/>
-          <p:nvPr/>
-        </p:nvSpPr>
-        <p:spPr bwMode="auto">
-          <a:xfrm>
-            <a:off x="2008282" y="5413528"/>
-            <a:ext cx="8175437" cy="1262952"/>
-          </a:xfrm>
-          <a:prstGeom prst="rect">
-            <a:avLst/>
-          </a:prstGeom>
-          <a:noFill/>
-          <a:ln w="12700">
-            <a:solidFill>
-              <a:schemeClr val="tx2"/>
-            </a:solidFill>
-            <a:headEnd type="none" w="med" len="med"/>
-            <a:tailEnd type="none" w="med" len="med"/>
-          </a:ln>
-          <a:effectLst/>
-        </p:spPr>
-        <p:style>
-          <a:lnRef idx="1">
-            <a:schemeClr val="accent2"/>
-          </a:lnRef>
-          <a:fillRef idx="3">
-            <a:schemeClr val="accent2"/>
-          </a:fillRef>
-          <a:effectRef idx="2">
-            <a:schemeClr val="accent2"/>
-          </a:effectRef>
-          <a:fontRef idx="minor">
-            <a:schemeClr val="lt1"/>
-          </a:fontRef>
-        </p:style>
-        <p:txBody>
-          <a:bodyPr rot="0" spcFirstLastPara="0" vertOverflow="overflow" horzOverflow="overflow" vert="horz" wrap="square" lIns="182880" tIns="146304" rIns="182880" bIns="146304" numCol="1" spcCol="0" rtlCol="0" fromWordArt="0" anchor="t" anchorCtr="0" forceAA="0" compatLnSpc="1">
-            <a:prstTxWarp prst="textNoShape">
-              <a:avLst/>
-            </a:prstTxWarp>
-            <a:noAutofit/>
-          </a:bodyPr>
-          <a:lstStyle/>
-          <a:p>
-            <a:pPr marL="0" marR="0" lvl="0" indent="0" algn="ctr" defTabSz="932472" rtl="0" eaLnBrk="1" fontAlgn="base" latinLnBrk="0" hangingPunct="1">
-              <a:lnSpc>
-                <a:spcPct val="90000"/>
-              </a:lnSpc>
-              <a:spcBef>
-                <a:spcPct val="0"/>
-              </a:spcBef>
-              <a:spcAft>
-                <a:spcPct val="0"/>
-              </a:spcAft>
-              <a:buClrTx/>
-              <a:buSzTx/>
-              <a:buFontTx/>
-              <a:buNone/>
-              <a:tabLst/>
-              <a:defRPr/>
-            </a:pPr>
-            <a:endParaRPr kumimoji="0" lang="en-US" sz="2400" b="0" i="0" u="none" strike="noStrike" kern="1200" cap="none" spc="0" normalizeH="0" baseline="0" noProof="0" dirty="0">
-              <a:ln>
-                <a:noFill/>
-              </a:ln>
-              <a:gradFill>
-                <a:gsLst>
-                  <a:gs pos="0">
-                    <a:srgbClr val="FFFFFF"/>
-                  </a:gs>
-                  <a:gs pos="100000">
-                    <a:srgbClr val="FFFFFF"/>
-                  </a:gs>
-                </a:gsLst>
-                <a:lin ang="5400000" scaled="0"/>
-              </a:gradFill>
-              <a:effectLst/>
-              <a:uLnTx/>
-              <a:uFillTx/>
-              <a:latin typeface="Segoe UI"/>
-              <a:ea typeface="Segoe UI" pitchFamily="34" charset="0"/>
-              <a:cs typeface="Segoe UI" pitchFamily="34" charset="0"/>
-            </a:endParaRPr>
-          </a:p>
-        </p:txBody>
-      </p:sp>
-      <p:sp>
-        <p:nvSpPr>
-          <p:cNvPr id="30" name="Rectangle 29">
-            <a:extLst>
-              <a:ext uri="{FF2B5EF4-FFF2-40B4-BE49-F238E27FC236}">
-                <a16:creationId xmlns:a16="http://schemas.microsoft.com/office/drawing/2014/main" id="{A792D267-517F-44A8-BD1E-0224C0520800}"/>
-              </a:ext>
-            </a:extLst>
-          </p:cNvPr>
-          <p:cNvSpPr/>
-          <p:nvPr/>
-        </p:nvSpPr>
-        <p:spPr bwMode="auto">
-          <a:xfrm>
-            <a:off x="10335242" y="1514811"/>
-            <a:ext cx="1432897" cy="307777"/>
-          </a:xfrm>
-          <a:prstGeom prst="rect">
-            <a:avLst/>
-          </a:prstGeom>
-          <a:noFill/>
-          <a:ln w="3175">
-            <a:noFill/>
-          </a:ln>
-        </p:spPr>
-        <p:style>
-          <a:lnRef idx="0">
-            <a:scrgbClr r="0" g="0" b="0"/>
-          </a:lnRef>
-          <a:fillRef idx="0">
-            <a:scrgbClr r="0" g="0" b="0"/>
-          </a:fillRef>
-          <a:effectRef idx="0">
-            <a:scrgbClr r="0" g="0" b="0"/>
-          </a:effectRef>
-          <a:fontRef idx="minor">
-            <a:schemeClr val="lt1"/>
-          </a:fontRef>
-        </p:style>
-        <p:txBody>
-          <a:bodyPr spcFirstLastPara="0" vert="horz" wrap="square" lIns="91440" tIns="45720" rIns="91440" bIns="45720" numCol="1" spcCol="1270" anchor="t" anchorCtr="0">
-            <a:spAutoFit/>
-          </a:bodyPr>
-          <a:lstStyle/>
-          <a:p>
-            <a:pPr marL="0" marR="0" lvl="0" indent="0" algn="ctr" defTabSz="710593" rtl="0" eaLnBrk="1" fontAlgn="auto" latinLnBrk="0" hangingPunct="1">
-              <a:lnSpc>
-                <a:spcPct val="100000"/>
-              </a:lnSpc>
-              <a:spcBef>
-                <a:spcPct val="0"/>
-              </a:spcBef>
-              <a:spcAft>
-                <a:spcPct val="35000"/>
-              </a:spcAft>
-              <a:buClrTx/>
-              <a:buSzTx/>
-              <a:buFontTx/>
-              <a:buNone/>
-              <a:tabLst/>
-              <a:defRPr/>
-            </a:pPr>
-            <a:r>
-              <a:rPr kumimoji="0" lang="en-US" sz="1400" b="0" i="0" u="none" strike="noStrike" kern="0" cap="none" spc="0" normalizeH="0" baseline="0" noProof="0" dirty="0">
-                <a:ln>
-                  <a:noFill/>
-                </a:ln>
-                <a:solidFill>
-                  <a:srgbClr val="0078D7"/>
-                </a:solidFill>
-                <a:effectLst/>
-                <a:uLnTx/>
-                <a:uFillTx/>
-                <a:latin typeface="Segoe UI Semibold" panose="020B0702040204020203" pitchFamily="34" charset="0"/>
-                <a:ea typeface="+mn-ea"/>
-                <a:cs typeface="Segoe UI Semibold" panose="020B0702040204020203" pitchFamily="34" charset="0"/>
-              </a:rPr>
-              <a:t>Intelligence</a:t>
-            </a:r>
-          </a:p>
-        </p:txBody>
-      </p:sp>
-      <p:grpSp>
-        <p:nvGrpSpPr>
-          <p:cNvPr id="31" name="Group 30">
-            <a:extLst>
-              <a:ext uri="{FF2B5EF4-FFF2-40B4-BE49-F238E27FC236}">
-                <a16:creationId xmlns:a16="http://schemas.microsoft.com/office/drawing/2014/main" id="{89E7614B-FDE2-42A3-88E7-0A944FD83A62}"/>
-              </a:ext>
-            </a:extLst>
-          </p:cNvPr>
-          <p:cNvGrpSpPr/>
-          <p:nvPr/>
-        </p:nvGrpSpPr>
-        <p:grpSpPr>
-          <a:xfrm>
-            <a:off x="8492266" y="3910177"/>
-            <a:ext cx="1309656" cy="1062413"/>
-            <a:chOff x="8492266" y="3842422"/>
-            <a:chExt cx="1309656" cy="1062413"/>
-          </a:xfrm>
-        </p:grpSpPr>
-        <p:pic>
-          <p:nvPicPr>
-            <p:cNvPr id="32" name="Picture 31" descr="A picture containing vector graphics&#10;&#10;Description generated with high confidence">
-              <a:extLst>
-                <a:ext uri="{FF2B5EF4-FFF2-40B4-BE49-F238E27FC236}">
-                  <a16:creationId xmlns:a16="http://schemas.microsoft.com/office/drawing/2014/main" id="{EC86D363-06D3-453D-8CE6-551737C3551A}"/>
-                </a:ext>
-              </a:extLst>
-            </p:cNvPr>
-            <p:cNvPicPr>
-              <a:picLocks noChangeAspect="1"/>
-            </p:cNvPicPr>
-            <p:nvPr/>
-          </p:nvPicPr>
-          <p:blipFill>
-            <a:blip r:embed="rId9">
-              <a:extLst>
-                <a:ext uri="{28A0092B-C50C-407E-A947-70E740481C1C}">
-                  <a14:useLocalDpi xmlns:a14="http://schemas.microsoft.com/office/drawing/2010/main" val="0"/>
-                </a:ext>
-              </a:extLst>
-            </a:blip>
-            <a:stretch>
-              <a:fillRect/>
-            </a:stretch>
-          </p:blipFill>
-          <p:spPr>
-            <a:xfrm>
-              <a:off x="8756950" y="3842422"/>
-              <a:ext cx="780290" cy="780290"/>
-            </a:xfrm>
-            <a:prstGeom prst="rect">
-              <a:avLst/>
-            </a:prstGeom>
-          </p:spPr>
-        </p:pic>
-        <p:sp>
-          <p:nvSpPr>
-            <p:cNvPr id="33" name="Rectangle 32">
-              <a:extLst>
-                <a:ext uri="{FF2B5EF4-FFF2-40B4-BE49-F238E27FC236}">
-                  <a16:creationId xmlns:a16="http://schemas.microsoft.com/office/drawing/2014/main" id="{7FD2A5B0-8126-49B4-87CE-83FE659939FC}"/>
-                </a:ext>
-              </a:extLst>
-            </p:cNvPr>
-            <p:cNvSpPr/>
-            <p:nvPr/>
-          </p:nvSpPr>
-          <p:spPr>
-            <a:xfrm>
-              <a:off x="8492266" y="4650919"/>
-              <a:ext cx="1309656" cy="253916"/>
-            </a:xfrm>
-            <a:prstGeom prst="rect">
-              <a:avLst/>
-            </a:prstGeom>
-          </p:spPr>
-          <p:txBody>
-            <a:bodyPr wrap="square">
-              <a:spAutoFit/>
-            </a:bodyPr>
-            <a:lstStyle/>
-            <a:p>
-              <a:pPr marL="0" marR="0" lvl="0" indent="0" algn="ctr" defTabSz="914192" rtl="0" eaLnBrk="1" fontAlgn="auto" latinLnBrk="0" hangingPunct="1">
-                <a:lnSpc>
-                  <a:spcPct val="100000"/>
-                </a:lnSpc>
-                <a:spcBef>
-                  <a:spcPts val="0"/>
-                </a:spcBef>
-                <a:spcAft>
-                  <a:spcPts val="0"/>
-                </a:spcAft>
-                <a:buClrTx/>
-                <a:buSzTx/>
-                <a:buFontTx/>
-                <a:buNone/>
-                <a:tabLst/>
-                <a:defRPr/>
-              </a:pPr>
-              <a:r>
-                <a:rPr kumimoji="0" lang="en-US" sz="1050" b="0" i="0" u="none" strike="noStrike" kern="0" cap="none" spc="0" normalizeH="0" baseline="0" noProof="0" dirty="0">
-                  <a:ln>
-                    <a:noFill/>
-                  </a:ln>
-                  <a:solidFill>
-                    <a:srgbClr val="505050"/>
-                  </a:solidFill>
-                  <a:effectLst/>
-                  <a:uLnTx/>
-                  <a:uFillTx/>
-                  <a:latin typeface="Segoe UI Semibold" panose="020B0702040204020203" pitchFamily="34" charset="0"/>
-                  <a:ea typeface="MS PGothic" panose="020B0600070205080204" pitchFamily="34" charset="-128"/>
-                  <a:cs typeface="Segoe UI Semibold" panose="020B0702040204020203" pitchFamily="34" charset="0"/>
-                </a:rPr>
-                <a:t>ML Web Service</a:t>
-              </a:r>
-            </a:p>
-          </p:txBody>
-        </p:sp>
-      </p:grpSp>
-      <p:cxnSp>
-        <p:nvCxnSpPr>
-          <p:cNvPr id="34" name="Straight Arrow Connector 33">
-            <a:extLst>
-              <a:ext uri="{FF2B5EF4-FFF2-40B4-BE49-F238E27FC236}">
-                <a16:creationId xmlns:a16="http://schemas.microsoft.com/office/drawing/2014/main" id="{47516809-3FD5-4CBA-BC8A-444D092D2CE4}"/>
-              </a:ext>
-            </a:extLst>
-          </p:cNvPr>
-          <p:cNvCxnSpPr>
-            <a:cxnSpLocks/>
-          </p:cNvCxnSpPr>
-          <p:nvPr/>
-        </p:nvCxnSpPr>
-        <p:spPr>
-          <a:xfrm>
-            <a:off x="9147094" y="3275296"/>
-            <a:ext cx="0" cy="540845"/>
-          </a:xfrm>
-          <a:prstGeom prst="straightConnector1">
-            <a:avLst/>
-          </a:prstGeom>
-          <a:ln>
-            <a:headEnd type="none" w="med" len="med"/>
-            <a:tailEnd type="arrow" w="med" len="med"/>
-          </a:ln>
-        </p:spPr>
-        <p:style>
-          <a:lnRef idx="3">
-            <a:schemeClr val="accent1"/>
-          </a:lnRef>
-          <a:fillRef idx="0">
-            <a:schemeClr val="accent1"/>
-          </a:fillRef>
-          <a:effectRef idx="2">
-            <a:schemeClr val="accent1"/>
-          </a:effectRef>
-          <a:fontRef idx="minor">
-            <a:schemeClr val="tx1"/>
-          </a:fontRef>
-        </p:style>
-      </p:cxnSp>
-      <p:cxnSp>
-        <p:nvCxnSpPr>
-          <p:cNvPr id="39" name="Straight Arrow Connector 38">
-            <a:extLst>
-              <a:ext uri="{FF2B5EF4-FFF2-40B4-BE49-F238E27FC236}">
-                <a16:creationId xmlns:a16="http://schemas.microsoft.com/office/drawing/2014/main" id="{EAF49339-BB45-423C-8684-875EBE122235}"/>
-              </a:ext>
-            </a:extLst>
-          </p:cNvPr>
-          <p:cNvCxnSpPr/>
-          <p:nvPr/>
-        </p:nvCxnSpPr>
-        <p:spPr>
-          <a:xfrm flipV="1">
-            <a:off x="7457431" y="4310474"/>
-            <a:ext cx="1231643" cy="5127"/>
-          </a:xfrm>
-          <a:prstGeom prst="straightConnector1">
-            <a:avLst/>
-          </a:prstGeom>
-          <a:ln>
-            <a:headEnd type="oval" w="med" len="med"/>
-            <a:tailEnd type="oval" w="med" len="med"/>
-          </a:ln>
-        </p:spPr>
-        <p:style>
-          <a:lnRef idx="3">
-            <a:schemeClr val="accent6"/>
-          </a:lnRef>
-          <a:fillRef idx="0">
-            <a:schemeClr val="accent6"/>
-          </a:fillRef>
-          <a:effectRef idx="2">
-            <a:schemeClr val="accent6"/>
-          </a:effectRef>
-          <a:fontRef idx="minor">
-            <a:schemeClr val="tx1"/>
-          </a:fontRef>
-        </p:style>
-      </p:cxnSp>
-      <p:cxnSp>
-        <p:nvCxnSpPr>
-          <p:cNvPr id="40" name="Straight Arrow Connector 39">
-            <a:extLst>
-              <a:ext uri="{FF2B5EF4-FFF2-40B4-BE49-F238E27FC236}">
-                <a16:creationId xmlns:a16="http://schemas.microsoft.com/office/drawing/2014/main" id="{D73C6256-FFA3-4A27-85C0-76D5AE583BAD}"/>
-              </a:ext>
-            </a:extLst>
-          </p:cNvPr>
-          <p:cNvCxnSpPr>
-            <a:cxnSpLocks/>
-          </p:cNvCxnSpPr>
-          <p:nvPr/>
-        </p:nvCxnSpPr>
-        <p:spPr>
-          <a:xfrm flipH="1" flipV="1">
-            <a:off x="5471919" y="2963676"/>
-            <a:ext cx="3368938" cy="1016946"/>
-          </a:xfrm>
-          <a:prstGeom prst="straightConnector1">
-            <a:avLst/>
-          </a:prstGeom>
-          <a:ln>
-            <a:headEnd type="none" w="med" len="med"/>
-            <a:tailEnd type="arrow" w="med" len="med"/>
-          </a:ln>
-        </p:spPr>
-        <p:style>
-          <a:lnRef idx="3">
-            <a:schemeClr val="accent1"/>
-          </a:lnRef>
-          <a:fillRef idx="0">
-            <a:schemeClr val="accent1"/>
-          </a:fillRef>
-          <a:effectRef idx="2">
-            <a:schemeClr val="accent1"/>
-          </a:effectRef>
-          <a:fontRef idx="minor">
-            <a:schemeClr val="tx1"/>
-          </a:fontRef>
-        </p:style>
-      </p:cxnSp>
-      <p:cxnSp>
-        <p:nvCxnSpPr>
-          <p:cNvPr id="43" name="Straight Arrow Connector 42">
-            <a:extLst>
-              <a:ext uri="{FF2B5EF4-FFF2-40B4-BE49-F238E27FC236}">
-                <a16:creationId xmlns:a16="http://schemas.microsoft.com/office/drawing/2014/main" id="{2D38E30E-8AF8-4DC4-BF1D-DF989A64E028}"/>
-              </a:ext>
-            </a:extLst>
-          </p:cNvPr>
-          <p:cNvCxnSpPr>
-            <a:cxnSpLocks/>
-            <a:stCxn id="27" idx="2"/>
-          </p:cNvCxnSpPr>
-          <p:nvPr/>
-        </p:nvCxnSpPr>
-        <p:spPr>
-          <a:xfrm>
-            <a:off x="3311440" y="3183351"/>
-            <a:ext cx="3260" cy="2308019"/>
-          </a:xfrm>
-          <a:prstGeom prst="straightConnector1">
-            <a:avLst/>
-          </a:prstGeom>
-          <a:ln>
-            <a:headEnd type="oval" w="med" len="med"/>
-            <a:tailEnd type="oval" w="med" len="med"/>
-          </a:ln>
-        </p:spPr>
-        <p:style>
-          <a:lnRef idx="3">
-            <a:schemeClr val="accent6"/>
-          </a:lnRef>
-          <a:fillRef idx="0">
-            <a:schemeClr val="accent6"/>
-          </a:fillRef>
-          <a:effectRef idx="2">
-            <a:schemeClr val="accent6"/>
-          </a:effectRef>
-          <a:fontRef idx="minor">
-            <a:schemeClr val="tx1"/>
-          </a:fontRef>
-        </p:style>
-      </p:cxnSp>
-      <p:cxnSp>
-        <p:nvCxnSpPr>
-          <p:cNvPr id="49" name="Connector: Elbow 48">
-            <a:extLst>
-              <a:ext uri="{FF2B5EF4-FFF2-40B4-BE49-F238E27FC236}">
-                <a16:creationId xmlns:a16="http://schemas.microsoft.com/office/drawing/2014/main" id="{D7228200-E159-4479-83D1-6429329772EB}"/>
-              </a:ext>
-            </a:extLst>
-          </p:cNvPr>
-          <p:cNvCxnSpPr>
-            <a:cxnSpLocks/>
-            <a:stCxn id="27" idx="2"/>
-            <a:endCxn id="12" idx="2"/>
-          </p:cNvCxnSpPr>
-          <p:nvPr/>
-        </p:nvCxnSpPr>
-        <p:spPr>
-          <a:xfrm rot="16200000" flipH="1">
-            <a:off x="6182660" y="312130"/>
-            <a:ext cx="48077" cy="5790517"/>
-          </a:xfrm>
-          <a:prstGeom prst="bentConnector3">
-            <a:avLst>
-              <a:gd name="adj1" fmla="val 575487"/>
-            </a:avLst>
-          </a:prstGeom>
-          <a:ln>
-            <a:headEnd type="oval" w="med" len="med"/>
-            <a:tailEnd type="oval" w="med" len="med"/>
-          </a:ln>
-        </p:spPr>
-        <p:style>
-          <a:lnRef idx="3">
-            <a:schemeClr val="accent6"/>
-          </a:lnRef>
-          <a:fillRef idx="0">
-            <a:schemeClr val="accent6"/>
-          </a:fillRef>
-          <a:effectRef idx="2">
-            <a:schemeClr val="accent6"/>
-          </a:effectRef>
-          <a:fontRef idx="minor">
-            <a:schemeClr val="tx1"/>
-          </a:fontRef>
-        </p:style>
-      </p:cxnSp>
-    </p:spTree>
-    <p:extLst>
-      <p:ext uri="{BB962C8B-B14F-4D97-AF65-F5344CB8AC3E}">
-        <p14:creationId xmlns:p14="http://schemas.microsoft.com/office/powerpoint/2010/main" val="1166646050"/>
       </p:ext>
     </p:extLst>
   </p:cSld>

</xml_diff>